<commit_message>
added 3-pass depletion to stream-network example
</commit_message>
<xml_diff>
--- a/Week 9 -- Movement and network models/Lecture 9/Lecture 9 -- stream network.pptx
+++ b/Week 9 -- Movement and network models/Lecture 9/Lecture 9 -- stream network.pptx
@@ -5,17 +5,20 @@
     <p:sldMasterId id="2147483672" r:id="rId1"/>
   </p:sldMasterIdLst>
   <p:notesMasterIdLst>
-    <p:notesMasterId r:id="rId10"/>
+    <p:notesMasterId r:id="rId13"/>
   </p:notesMasterIdLst>
   <p:sldIdLst>
     <p:sldId id="266" r:id="rId2"/>
     <p:sldId id="284" r:id="rId3"/>
     <p:sldId id="282" r:id="rId4"/>
-    <p:sldId id="283" r:id="rId5"/>
-    <p:sldId id="286" r:id="rId6"/>
-    <p:sldId id="287" r:id="rId7"/>
-    <p:sldId id="288" r:id="rId8"/>
-    <p:sldId id="289" r:id="rId9"/>
+    <p:sldId id="290" r:id="rId5"/>
+    <p:sldId id="291" r:id="rId6"/>
+    <p:sldId id="283" r:id="rId7"/>
+    <p:sldId id="286" r:id="rId8"/>
+    <p:sldId id="287" r:id="rId9"/>
+    <p:sldId id="288" r:id="rId10"/>
+    <p:sldId id="289" r:id="rId11"/>
+    <p:sldId id="292" r:id="rId12"/>
   </p:sldIdLst>
   <p:sldSz cx="9144000" cy="6858000" type="screen4x3"/>
   <p:notesSz cx="6858000" cy="9144000"/>
@@ -207,7 +210,7 @@
           <a:p>
             <a:fld id="{1522831B-4FE3-4D45-950B-0D2C6BB2DD76}" type="datetimeFigureOut">
               <a:rPr lang="en-US" smtClean="0"/>
-              <a:t>5/16/2018</a:t>
+              <a:t>5/22/2018</a:t>
             </a:fld>
             <a:endParaRPr lang="en-US"/>
           </a:p>
@@ -3448,11 +3451,7 @@
           <a:p>
             <a:r>
               <a:rPr lang="en-US" dirty="0" smtClean="0"/>
-              <a:t>Lecture 9:  </a:t>
-            </a:r>
-            <a:r>
-              <a:rPr lang="en-US" dirty="0" smtClean="0"/>
-              <a:t>Stream-network spatial models</a:t>
+              <a:t>Lecture 9:  Stream-network spatial models</a:t>
             </a:r>
             <a:endParaRPr lang="en-US" dirty="0"/>
           </a:p>
@@ -3537,6 +3536,633 @@
     <p:extLst>
       <p:ext uri="{BB962C8B-B14F-4D97-AF65-F5344CB8AC3E}">
         <p14:creationId xmlns:p14="http://schemas.microsoft.com/office/powerpoint/2010/main" val="1564591226"/>
+      </p:ext>
+    </p:extLst>
+  </p:cSld>
+  <p:clrMapOvr>
+    <a:masterClrMapping/>
+  </p:clrMapOvr>
+  <p:timing>
+    <p:tnLst>
+      <p:par>
+        <p:cTn id="1" dur="indefinite" restart="never" nodeType="tmRoot"/>
+      </p:par>
+    </p:tnLst>
+  </p:timing>
+</p:sld>
+</file>
+
+<file path=ppt/slides/slide10.xml><?xml version="1.0" encoding="utf-8"?>
+<p:sld xmlns:a="http://schemas.openxmlformats.org/drawingml/2006/main" xmlns:r="http://schemas.openxmlformats.org/officeDocument/2006/relationships" xmlns:p="http://schemas.openxmlformats.org/presentationml/2006/main">
+  <p:cSld>
+    <p:spTree>
+      <p:nvGrpSpPr>
+        <p:cNvPr id="1" name=""/>
+        <p:cNvGrpSpPr/>
+        <p:nvPr/>
+      </p:nvGrpSpPr>
+      <p:grpSpPr>
+        <a:xfrm>
+          <a:off x="0" y="0"/>
+          <a:ext cx="0" cy="0"/>
+          <a:chOff x="0" y="0"/>
+          <a:chExt cx="0" cy="0"/>
+        </a:xfrm>
+      </p:grpSpPr>
+      <p:sp>
+        <p:nvSpPr>
+          <p:cNvPr id="2" name="Title 1"/>
+          <p:cNvSpPr>
+            <a:spLocks noGrp="1"/>
+          </p:cNvSpPr>
+          <p:nvPr>
+            <p:ph type="title"/>
+          </p:nvPr>
+        </p:nvSpPr>
+        <p:spPr/>
+        <p:txBody>
+          <a:bodyPr/>
+          <a:lstStyle/>
+          <a:p>
+            <a:r>
+              <a:rPr lang="en-US" dirty="0"/>
+              <a:t>Stream networks</a:t>
+            </a:r>
+            <a:endParaRPr lang="en-GB" dirty="0"/>
+          </a:p>
+        </p:txBody>
+      </p:sp>
+      <p:sp>
+        <p:nvSpPr>
+          <p:cNvPr id="3" name="Content Placeholder 2"/>
+          <p:cNvSpPr>
+            <a:spLocks noGrp="1"/>
+          </p:cNvSpPr>
+          <p:nvPr>
+            <p:ph idx="1"/>
+          </p:nvPr>
+        </p:nvSpPr>
+        <p:spPr>
+          <a:xfrm>
+            <a:off x="76200" y="1923690"/>
+            <a:ext cx="8991599" cy="4858109"/>
+          </a:xfrm>
+        </p:spPr>
+        <p:txBody>
+          <a:bodyPr>
+            <a:normAutofit/>
+          </a:bodyPr>
+          <a:lstStyle/>
+          <a:p>
+            <a:pPr marL="0" indent="0">
+              <a:buNone/>
+            </a:pPr>
+            <a:endParaRPr lang="en-US" dirty="0" smtClean="0"/>
+          </a:p>
+          <a:p>
+            <a:pPr marL="0" indent="0">
+              <a:buNone/>
+            </a:pPr>
+            <a:endParaRPr lang="en-US" dirty="0"/>
+          </a:p>
+          <a:p>
+            <a:pPr marL="0" indent="0">
+              <a:buNone/>
+            </a:pPr>
+            <a:r>
+              <a:rPr lang="en-US" dirty="0" smtClean="0"/>
+              <a:t>[see code to confirm that both approaches give same result]</a:t>
+            </a:r>
+          </a:p>
+        </p:txBody>
+      </p:sp>
+      <p:sp>
+        <p:nvSpPr>
+          <p:cNvPr id="6" name="Content Placeholder 2"/>
+          <p:cNvSpPr txBox="1">
+            <a:spLocks/>
+          </p:cNvSpPr>
+          <p:nvPr/>
+        </p:nvSpPr>
+        <p:spPr>
+          <a:xfrm>
+            <a:off x="76200" y="838199"/>
+            <a:ext cx="8991600" cy="1241439"/>
+          </a:xfrm>
+          <a:prstGeom prst="rect">
+            <a:avLst/>
+          </a:prstGeom>
+        </p:spPr>
+        <p:txBody>
+          <a:bodyPr vert="horz" lIns="91440" tIns="45720" rIns="91440" bIns="45720" rtlCol="0">
+            <a:normAutofit/>
+          </a:bodyPr>
+          <a:lstStyle>
+            <a:lvl1pPr marL="342900" indent="-342900" algn="l" defTabSz="914400" rtl="0" eaLnBrk="1" latinLnBrk="0" hangingPunct="1">
+              <a:spcBef>
+                <a:spcPts val="600"/>
+              </a:spcBef>
+              <a:spcAft>
+                <a:spcPts val="600"/>
+              </a:spcAft>
+              <a:buFont typeface="Arial" pitchFamily="34" charset="0"/>
+              <a:buChar char="•"/>
+              <a:defRPr sz="2800" kern="1200">
+                <a:solidFill>
+                  <a:schemeClr val="tx1"/>
+                </a:solidFill>
+                <a:latin typeface="+mn-lt"/>
+                <a:ea typeface="+mn-ea"/>
+                <a:cs typeface="+mn-cs"/>
+              </a:defRPr>
+            </a:lvl1pPr>
+            <a:lvl2pPr marL="742950" indent="-285750" algn="l" defTabSz="914400" rtl="0" eaLnBrk="1" latinLnBrk="0" hangingPunct="1">
+              <a:spcBef>
+                <a:spcPts val="600"/>
+              </a:spcBef>
+              <a:spcAft>
+                <a:spcPts val="600"/>
+              </a:spcAft>
+              <a:buFont typeface="Arial" pitchFamily="34" charset="0"/>
+              <a:buChar char="–"/>
+              <a:defRPr sz="2400" kern="1200">
+                <a:solidFill>
+                  <a:schemeClr val="tx1"/>
+                </a:solidFill>
+                <a:latin typeface="+mn-lt"/>
+                <a:ea typeface="+mn-ea"/>
+                <a:cs typeface="+mn-cs"/>
+              </a:defRPr>
+            </a:lvl2pPr>
+            <a:lvl3pPr marL="1143000" indent="-228600" algn="l" defTabSz="914400" rtl="0" eaLnBrk="1" latinLnBrk="0" hangingPunct="1">
+              <a:spcBef>
+                <a:spcPts val="600"/>
+              </a:spcBef>
+              <a:spcAft>
+                <a:spcPts val="600"/>
+              </a:spcAft>
+              <a:buFont typeface="Arial" pitchFamily="34" charset="0"/>
+              <a:buChar char="•"/>
+              <a:defRPr sz="2000" kern="1200">
+                <a:solidFill>
+                  <a:schemeClr val="tx1"/>
+                </a:solidFill>
+                <a:latin typeface="+mn-lt"/>
+                <a:ea typeface="+mn-ea"/>
+                <a:cs typeface="+mn-cs"/>
+              </a:defRPr>
+            </a:lvl3pPr>
+            <a:lvl4pPr marL="1600200" indent="-228600" algn="l" defTabSz="914400" rtl="0" eaLnBrk="1" latinLnBrk="0" hangingPunct="1">
+              <a:spcBef>
+                <a:spcPts val="600"/>
+              </a:spcBef>
+              <a:spcAft>
+                <a:spcPts val="600"/>
+              </a:spcAft>
+              <a:buFont typeface="Arial" pitchFamily="34" charset="0"/>
+              <a:buChar char="–"/>
+              <a:defRPr sz="1800" kern="1200">
+                <a:solidFill>
+                  <a:schemeClr val="tx1"/>
+                </a:solidFill>
+                <a:latin typeface="+mn-lt"/>
+                <a:ea typeface="+mn-ea"/>
+                <a:cs typeface="+mn-cs"/>
+              </a:defRPr>
+            </a:lvl4pPr>
+            <a:lvl5pPr marL="2057400" indent="-228600" algn="l" defTabSz="914400" rtl="0" eaLnBrk="1" latinLnBrk="0" hangingPunct="1">
+              <a:spcBef>
+                <a:spcPts val="600"/>
+              </a:spcBef>
+              <a:spcAft>
+                <a:spcPts val="600"/>
+              </a:spcAft>
+              <a:buFont typeface="Arial" pitchFamily="34" charset="0"/>
+              <a:buChar char="»"/>
+              <a:defRPr sz="1800" kern="1200">
+                <a:solidFill>
+                  <a:schemeClr val="tx1"/>
+                </a:solidFill>
+                <a:latin typeface="+mn-lt"/>
+                <a:ea typeface="+mn-ea"/>
+                <a:cs typeface="+mn-cs"/>
+              </a:defRPr>
+            </a:lvl5pPr>
+            <a:lvl6pPr marL="2514600" indent="-228600" algn="l" defTabSz="914400" rtl="0" eaLnBrk="1" latinLnBrk="0" hangingPunct="1">
+              <a:spcBef>
+                <a:spcPct val="20000"/>
+              </a:spcBef>
+              <a:buFont typeface="Arial" pitchFamily="34" charset="0"/>
+              <a:buChar char="•"/>
+              <a:defRPr sz="2000" kern="1200">
+                <a:solidFill>
+                  <a:schemeClr val="tx1"/>
+                </a:solidFill>
+                <a:latin typeface="+mn-lt"/>
+                <a:ea typeface="+mn-ea"/>
+                <a:cs typeface="+mn-cs"/>
+              </a:defRPr>
+            </a:lvl6pPr>
+            <a:lvl7pPr marL="2971800" indent="-228600" algn="l" defTabSz="914400" rtl="0" eaLnBrk="1" latinLnBrk="0" hangingPunct="1">
+              <a:spcBef>
+                <a:spcPct val="20000"/>
+              </a:spcBef>
+              <a:buFont typeface="Arial" pitchFamily="34" charset="0"/>
+              <a:buChar char="•"/>
+              <a:defRPr sz="2000" kern="1200">
+                <a:solidFill>
+                  <a:schemeClr val="tx1"/>
+                </a:solidFill>
+                <a:latin typeface="+mn-lt"/>
+                <a:ea typeface="+mn-ea"/>
+                <a:cs typeface="+mn-cs"/>
+              </a:defRPr>
+            </a:lvl7pPr>
+            <a:lvl8pPr marL="3429000" indent="-228600" algn="l" defTabSz="914400" rtl="0" eaLnBrk="1" latinLnBrk="0" hangingPunct="1">
+              <a:spcBef>
+                <a:spcPct val="20000"/>
+              </a:spcBef>
+              <a:buFont typeface="Arial" pitchFamily="34" charset="0"/>
+              <a:buChar char="•"/>
+              <a:defRPr sz="2000" kern="1200">
+                <a:solidFill>
+                  <a:schemeClr val="tx1"/>
+                </a:solidFill>
+                <a:latin typeface="+mn-lt"/>
+                <a:ea typeface="+mn-ea"/>
+                <a:cs typeface="+mn-cs"/>
+              </a:defRPr>
+            </a:lvl8pPr>
+            <a:lvl9pPr marL="3886200" indent="-228600" algn="l" defTabSz="914400" rtl="0" eaLnBrk="1" latinLnBrk="0" hangingPunct="1">
+              <a:spcBef>
+                <a:spcPct val="20000"/>
+              </a:spcBef>
+              <a:buFont typeface="Arial" pitchFamily="34" charset="0"/>
+              <a:buChar char="•"/>
+              <a:defRPr sz="2000" kern="1200">
+                <a:solidFill>
+                  <a:schemeClr val="tx1"/>
+                </a:solidFill>
+                <a:latin typeface="+mn-lt"/>
+                <a:ea typeface="+mn-ea"/>
+                <a:cs typeface="+mn-cs"/>
+              </a:defRPr>
+            </a:lvl9pPr>
+          </a:lstStyle>
+          <a:p>
+            <a:pPr marL="0" indent="0">
+              <a:buFont typeface="Arial" pitchFamily="34" charset="0"/>
+              <a:buNone/>
+            </a:pPr>
+            <a:r>
+              <a:rPr lang="en-US" smtClean="0"/>
+              <a:t>How to define spatial model on streams?</a:t>
+            </a:r>
+          </a:p>
+          <a:p>
+            <a:r>
+              <a:rPr lang="en-US" smtClean="0"/>
+              <a:t>Define an directed acyclic graph (DAG) for network</a:t>
+            </a:r>
+            <a:endParaRPr lang="en-GB" dirty="0"/>
+          </a:p>
+        </p:txBody>
+      </p:sp>
+    </p:spTree>
+    <p:extLst>
+      <p:ext uri="{BB962C8B-B14F-4D97-AF65-F5344CB8AC3E}">
+        <p14:creationId xmlns:p14="http://schemas.microsoft.com/office/powerpoint/2010/main" val="3791673848"/>
+      </p:ext>
+    </p:extLst>
+  </p:cSld>
+  <p:clrMapOvr>
+    <a:masterClrMapping/>
+  </p:clrMapOvr>
+  <p:timing>
+    <p:tnLst>
+      <p:par>
+        <p:cTn id="1" dur="indefinite" restart="never" nodeType="tmRoot"/>
+      </p:par>
+    </p:tnLst>
+  </p:timing>
+</p:sld>
+</file>
+
+<file path=ppt/slides/slide11.xml><?xml version="1.0" encoding="utf-8"?>
+<p:sld xmlns:a="http://schemas.openxmlformats.org/drawingml/2006/main" xmlns:r="http://schemas.openxmlformats.org/officeDocument/2006/relationships" xmlns:p="http://schemas.openxmlformats.org/presentationml/2006/main">
+  <p:cSld>
+    <p:spTree>
+      <p:nvGrpSpPr>
+        <p:cNvPr id="1" name=""/>
+        <p:cNvGrpSpPr/>
+        <p:nvPr/>
+      </p:nvGrpSpPr>
+      <p:grpSpPr>
+        <a:xfrm>
+          <a:off x="0" y="0"/>
+          <a:ext cx="0" cy="0"/>
+          <a:chOff x="0" y="0"/>
+          <a:chExt cx="0" cy="0"/>
+        </a:xfrm>
+      </p:grpSpPr>
+      <p:sp>
+        <p:nvSpPr>
+          <p:cNvPr id="2" name="Title 1"/>
+          <p:cNvSpPr>
+            <a:spLocks noGrp="1"/>
+          </p:cNvSpPr>
+          <p:nvPr>
+            <p:ph type="title"/>
+          </p:nvPr>
+        </p:nvSpPr>
+        <p:spPr/>
+        <p:txBody>
+          <a:bodyPr/>
+          <a:lstStyle/>
+          <a:p>
+            <a:r>
+              <a:rPr lang="en-US" dirty="0"/>
+              <a:t>Stream networks</a:t>
+            </a:r>
+            <a:endParaRPr lang="en-GB" dirty="0"/>
+          </a:p>
+        </p:txBody>
+      </p:sp>
+      <mc:AlternateContent xmlns:mc="http://schemas.openxmlformats.org/markup-compatibility/2006">
+        <mc:Choice xmlns:a14="http://schemas.microsoft.com/office/drawing/2010/main" Requires="a14">
+          <p:sp>
+            <p:nvSpPr>
+              <p:cNvPr id="3" name="Content Placeholder 2"/>
+              <p:cNvSpPr>
+                <a:spLocks noGrp="1"/>
+              </p:cNvSpPr>
+              <p:nvPr>
+                <p:ph idx="1"/>
+              </p:nvPr>
+            </p:nvSpPr>
+            <p:spPr>
+              <a:xfrm>
+                <a:off x="76200" y="1923690"/>
+                <a:ext cx="8991599" cy="4858109"/>
+              </a:xfrm>
+            </p:spPr>
+            <p:txBody>
+              <a:bodyPr>
+                <a:normAutofit/>
+              </a:bodyPr>
+              <a:lstStyle/>
+              <a:p>
+                <a:r>
+                  <a:rPr lang="en-US" dirty="0" smtClean="0"/>
+                  <a:t>Add spatial variation in detection probability </a:t>
+                </a:r>
+                <a14:m>
+                  <m:oMath xmlns:m="http://schemas.openxmlformats.org/officeDocument/2006/math">
+                    <m:r>
+                      <a:rPr lang="en-US" b="0" i="1" smtClean="0">
+                        <a:latin typeface="Cambria Math" panose="02040503050406030204" pitchFamily="18" charset="0"/>
+                      </a:rPr>
+                      <m:t>𝑝</m:t>
+                    </m:r>
+                  </m:oMath>
+                </a14:m>
+                <a:r>
+                  <a:rPr lang="en-US" dirty="0" smtClean="0"/>
+                  <a:t> using stream-network distance</a:t>
+                </a:r>
+                <a:endParaRPr lang="en-US" dirty="0" smtClean="0"/>
+              </a:p>
+            </p:txBody>
+          </p:sp>
+        </mc:Choice>
+        <mc:Fallback>
+          <p:sp>
+            <p:nvSpPr>
+              <p:cNvPr id="3" name="Content Placeholder 2"/>
+              <p:cNvSpPr>
+                <a:spLocks noGrp="1" noRot="1" noChangeAspect="1" noMove="1" noResize="1" noEditPoints="1" noAdjustHandles="1" noChangeArrowheads="1" noChangeShapeType="1" noTextEdit="1"/>
+              </p:cNvSpPr>
+              <p:nvPr>
+                <p:ph idx="1"/>
+              </p:nvPr>
+            </p:nvSpPr>
+            <p:spPr>
+              <a:xfrm>
+                <a:off x="76200" y="1923690"/>
+                <a:ext cx="8991599" cy="4858109"/>
+              </a:xfrm>
+              <a:blipFill>
+                <a:blip r:embed="rId2"/>
+                <a:stretch>
+                  <a:fillRect l="-1221" t="-1256"/>
+                </a:stretch>
+              </a:blipFill>
+            </p:spPr>
+            <p:txBody>
+              <a:bodyPr/>
+              <a:lstStyle/>
+              <a:p>
+                <a:r>
+                  <a:rPr lang="en-GB">
+                    <a:noFill/>
+                  </a:rPr>
+                  <a:t> </a:t>
+                </a:r>
+              </a:p>
+            </p:txBody>
+          </p:sp>
+        </mc:Fallback>
+      </mc:AlternateContent>
+      <p:sp>
+        <p:nvSpPr>
+          <p:cNvPr id="6" name="Content Placeholder 2"/>
+          <p:cNvSpPr txBox="1">
+            <a:spLocks/>
+          </p:cNvSpPr>
+          <p:nvPr/>
+        </p:nvSpPr>
+        <p:spPr>
+          <a:xfrm>
+            <a:off x="76200" y="838199"/>
+            <a:ext cx="8991600" cy="1241439"/>
+          </a:xfrm>
+          <a:prstGeom prst="rect">
+            <a:avLst/>
+          </a:prstGeom>
+        </p:spPr>
+        <p:txBody>
+          <a:bodyPr vert="horz" lIns="91440" tIns="45720" rIns="91440" bIns="45720" rtlCol="0">
+            <a:normAutofit/>
+          </a:bodyPr>
+          <a:lstStyle>
+            <a:lvl1pPr marL="342900" indent="-342900" algn="l" defTabSz="914400" rtl="0" eaLnBrk="1" latinLnBrk="0" hangingPunct="1">
+              <a:spcBef>
+                <a:spcPts val="600"/>
+              </a:spcBef>
+              <a:spcAft>
+                <a:spcPts val="600"/>
+              </a:spcAft>
+              <a:buFont typeface="Arial" pitchFamily="34" charset="0"/>
+              <a:buChar char="•"/>
+              <a:defRPr sz="2800" kern="1200">
+                <a:solidFill>
+                  <a:schemeClr val="tx1"/>
+                </a:solidFill>
+                <a:latin typeface="+mn-lt"/>
+                <a:ea typeface="+mn-ea"/>
+                <a:cs typeface="+mn-cs"/>
+              </a:defRPr>
+            </a:lvl1pPr>
+            <a:lvl2pPr marL="742950" indent="-285750" algn="l" defTabSz="914400" rtl="0" eaLnBrk="1" latinLnBrk="0" hangingPunct="1">
+              <a:spcBef>
+                <a:spcPts val="600"/>
+              </a:spcBef>
+              <a:spcAft>
+                <a:spcPts val="600"/>
+              </a:spcAft>
+              <a:buFont typeface="Arial" pitchFamily="34" charset="0"/>
+              <a:buChar char="–"/>
+              <a:defRPr sz="2400" kern="1200">
+                <a:solidFill>
+                  <a:schemeClr val="tx1"/>
+                </a:solidFill>
+                <a:latin typeface="+mn-lt"/>
+                <a:ea typeface="+mn-ea"/>
+                <a:cs typeface="+mn-cs"/>
+              </a:defRPr>
+            </a:lvl2pPr>
+            <a:lvl3pPr marL="1143000" indent="-228600" algn="l" defTabSz="914400" rtl="0" eaLnBrk="1" latinLnBrk="0" hangingPunct="1">
+              <a:spcBef>
+                <a:spcPts val="600"/>
+              </a:spcBef>
+              <a:spcAft>
+                <a:spcPts val="600"/>
+              </a:spcAft>
+              <a:buFont typeface="Arial" pitchFamily="34" charset="0"/>
+              <a:buChar char="•"/>
+              <a:defRPr sz="2000" kern="1200">
+                <a:solidFill>
+                  <a:schemeClr val="tx1"/>
+                </a:solidFill>
+                <a:latin typeface="+mn-lt"/>
+                <a:ea typeface="+mn-ea"/>
+                <a:cs typeface="+mn-cs"/>
+              </a:defRPr>
+            </a:lvl3pPr>
+            <a:lvl4pPr marL="1600200" indent="-228600" algn="l" defTabSz="914400" rtl="0" eaLnBrk="1" latinLnBrk="0" hangingPunct="1">
+              <a:spcBef>
+                <a:spcPts val="600"/>
+              </a:spcBef>
+              <a:spcAft>
+                <a:spcPts val="600"/>
+              </a:spcAft>
+              <a:buFont typeface="Arial" pitchFamily="34" charset="0"/>
+              <a:buChar char="–"/>
+              <a:defRPr sz="1800" kern="1200">
+                <a:solidFill>
+                  <a:schemeClr val="tx1"/>
+                </a:solidFill>
+                <a:latin typeface="+mn-lt"/>
+                <a:ea typeface="+mn-ea"/>
+                <a:cs typeface="+mn-cs"/>
+              </a:defRPr>
+            </a:lvl4pPr>
+            <a:lvl5pPr marL="2057400" indent="-228600" algn="l" defTabSz="914400" rtl="0" eaLnBrk="1" latinLnBrk="0" hangingPunct="1">
+              <a:spcBef>
+                <a:spcPts val="600"/>
+              </a:spcBef>
+              <a:spcAft>
+                <a:spcPts val="600"/>
+              </a:spcAft>
+              <a:buFont typeface="Arial" pitchFamily="34" charset="0"/>
+              <a:buChar char="»"/>
+              <a:defRPr sz="1800" kern="1200">
+                <a:solidFill>
+                  <a:schemeClr val="tx1"/>
+                </a:solidFill>
+                <a:latin typeface="+mn-lt"/>
+                <a:ea typeface="+mn-ea"/>
+                <a:cs typeface="+mn-cs"/>
+              </a:defRPr>
+            </a:lvl5pPr>
+            <a:lvl6pPr marL="2514600" indent="-228600" algn="l" defTabSz="914400" rtl="0" eaLnBrk="1" latinLnBrk="0" hangingPunct="1">
+              <a:spcBef>
+                <a:spcPct val="20000"/>
+              </a:spcBef>
+              <a:buFont typeface="Arial" pitchFamily="34" charset="0"/>
+              <a:buChar char="•"/>
+              <a:defRPr sz="2000" kern="1200">
+                <a:solidFill>
+                  <a:schemeClr val="tx1"/>
+                </a:solidFill>
+                <a:latin typeface="+mn-lt"/>
+                <a:ea typeface="+mn-ea"/>
+                <a:cs typeface="+mn-cs"/>
+              </a:defRPr>
+            </a:lvl6pPr>
+            <a:lvl7pPr marL="2971800" indent="-228600" algn="l" defTabSz="914400" rtl="0" eaLnBrk="1" latinLnBrk="0" hangingPunct="1">
+              <a:spcBef>
+                <a:spcPct val="20000"/>
+              </a:spcBef>
+              <a:buFont typeface="Arial" pitchFamily="34" charset="0"/>
+              <a:buChar char="•"/>
+              <a:defRPr sz="2000" kern="1200">
+                <a:solidFill>
+                  <a:schemeClr val="tx1"/>
+                </a:solidFill>
+                <a:latin typeface="+mn-lt"/>
+                <a:ea typeface="+mn-ea"/>
+                <a:cs typeface="+mn-cs"/>
+              </a:defRPr>
+            </a:lvl7pPr>
+            <a:lvl8pPr marL="3429000" indent="-228600" algn="l" defTabSz="914400" rtl="0" eaLnBrk="1" latinLnBrk="0" hangingPunct="1">
+              <a:spcBef>
+                <a:spcPct val="20000"/>
+              </a:spcBef>
+              <a:buFont typeface="Arial" pitchFamily="34" charset="0"/>
+              <a:buChar char="•"/>
+              <a:defRPr sz="2000" kern="1200">
+                <a:solidFill>
+                  <a:schemeClr val="tx1"/>
+                </a:solidFill>
+                <a:latin typeface="+mn-lt"/>
+                <a:ea typeface="+mn-ea"/>
+                <a:cs typeface="+mn-cs"/>
+              </a:defRPr>
+            </a:lvl8pPr>
+            <a:lvl9pPr marL="3886200" indent="-228600" algn="l" defTabSz="914400" rtl="0" eaLnBrk="1" latinLnBrk="0" hangingPunct="1">
+              <a:spcBef>
+                <a:spcPct val="20000"/>
+              </a:spcBef>
+              <a:buFont typeface="Arial" pitchFamily="34" charset="0"/>
+              <a:buChar char="•"/>
+              <a:defRPr sz="2000" kern="1200">
+                <a:solidFill>
+                  <a:schemeClr val="tx1"/>
+                </a:solidFill>
+                <a:latin typeface="+mn-lt"/>
+                <a:ea typeface="+mn-ea"/>
+                <a:cs typeface="+mn-cs"/>
+              </a:defRPr>
+            </a:lvl9pPr>
+          </a:lstStyle>
+          <a:p>
+            <a:pPr marL="0" indent="0">
+              <a:buFont typeface="Arial" pitchFamily="34" charset="0"/>
+              <a:buNone/>
+            </a:pPr>
+            <a:r>
+              <a:rPr lang="en-US" dirty="0" smtClean="0"/>
+              <a:t>Exercise</a:t>
+            </a:r>
+            <a:endParaRPr lang="en-GB" dirty="0"/>
+          </a:p>
+        </p:txBody>
+      </p:sp>
+    </p:spTree>
+    <p:extLst>
+      <p:ext uri="{BB962C8B-B14F-4D97-AF65-F5344CB8AC3E}">
+        <p14:creationId xmlns:p14="http://schemas.microsoft.com/office/powerpoint/2010/main" val="278955095"/>
       </p:ext>
     </p:extLst>
   </p:cSld>
@@ -4558,11 +5184,11 @@
   <p:clrMapOvr>
     <a:masterClrMapping/>
   </p:clrMapOvr>
-  <mc:AlternateContent xmlns:mc="http://schemas.openxmlformats.org/markup-compatibility/2006">
-    <mc:Choice xmlns:p14="http://schemas.microsoft.com/office/powerpoint/2010/main" Requires="p14">
+  <mc:AlternateContent xmlns:mc="http://schemas.openxmlformats.org/markup-compatibility/2006" xmlns:p14="http://schemas.microsoft.com/office/powerpoint/2010/main">
+    <mc:Choice Requires="p14">
       <p:transition spd="slow" p14:dur="2000"/>
     </mc:Choice>
-    <mc:Fallback>
+    <mc:Fallback xmlns="">
       <p:transition spd="slow"/>
     </mc:Fallback>
   </mc:AlternateContent>
@@ -4750,7 +5376,1441 @@
         <p:spPr>
           <a:xfrm>
             <a:off x="76200" y="838200"/>
-            <a:ext cx="8991600" cy="705928"/>
+            <a:ext cx="8991599" cy="5943600"/>
+          </a:xfrm>
+        </p:spPr>
+        <p:txBody>
+          <a:bodyPr>
+            <a:normAutofit/>
+          </a:bodyPr>
+          <a:lstStyle/>
+          <a:p>
+            <a:pPr marL="0" indent="0">
+              <a:buNone/>
+            </a:pPr>
+            <a:r>
+              <a:rPr lang="en-US" dirty="0" smtClean="0"/>
+              <a:t>How to estimate detection probability?</a:t>
+            </a:r>
+            <a:endParaRPr lang="en-US" dirty="0"/>
+          </a:p>
+          <a:p>
+            <a:r>
+              <a:rPr lang="en-US" dirty="0" smtClean="0"/>
+              <a:t>Design an experiment with replicated sampling!</a:t>
+            </a:r>
+          </a:p>
+          <a:p>
+            <a:pPr lvl="1"/>
+            <a:r>
+              <a:rPr lang="en-US" dirty="0" smtClean="0"/>
+              <a:t>Closed-population tag-recapture</a:t>
+            </a:r>
+          </a:p>
+          <a:p>
+            <a:pPr lvl="1"/>
+            <a:r>
+              <a:rPr lang="en-US" dirty="0" smtClean="0"/>
+              <a:t>Occupancy models</a:t>
+            </a:r>
+          </a:p>
+          <a:p>
+            <a:pPr lvl="1"/>
+            <a:r>
+              <a:rPr lang="en-US" dirty="0" smtClean="0"/>
+              <a:t>Triple-pass depletion sampling</a:t>
+            </a:r>
+          </a:p>
+          <a:p>
+            <a:pPr lvl="1"/>
+            <a:r>
+              <a:rPr lang="en-US" dirty="0" smtClean="0"/>
+              <a:t>…</a:t>
+            </a:r>
+          </a:p>
+          <a:p>
+            <a:r>
+              <a:rPr lang="en-US" dirty="0" smtClean="0"/>
+              <a:t>Extensions to model-based replicates</a:t>
+            </a:r>
+          </a:p>
+          <a:p>
+            <a:pPr lvl="1"/>
+            <a:r>
+              <a:rPr lang="en-US" dirty="0" smtClean="0"/>
+              <a:t>Open-population tag-recapture</a:t>
+            </a:r>
+          </a:p>
+          <a:p>
+            <a:pPr lvl="1"/>
+            <a:r>
+              <a:rPr lang="en-US" dirty="0" smtClean="0"/>
+              <a:t>Dynamic occupancy models</a:t>
+            </a:r>
+          </a:p>
+          <a:p>
+            <a:pPr lvl="1"/>
+            <a:r>
+              <a:rPr lang="en-US" dirty="0" smtClean="0"/>
+              <a:t>…</a:t>
+            </a:r>
+            <a:endParaRPr lang="en-US" dirty="0" smtClean="0"/>
+          </a:p>
+          <a:p>
+            <a:endParaRPr lang="en-US" dirty="0" smtClean="0"/>
+          </a:p>
+        </p:txBody>
+      </p:sp>
+    </p:spTree>
+    <p:extLst>
+      <p:ext uri="{BB962C8B-B14F-4D97-AF65-F5344CB8AC3E}">
+        <p14:creationId xmlns:p14="http://schemas.microsoft.com/office/powerpoint/2010/main" val="2423784849"/>
+      </p:ext>
+    </p:extLst>
+  </p:cSld>
+  <p:clrMapOvr>
+    <a:masterClrMapping/>
+  </p:clrMapOvr>
+  <p:timing>
+    <p:tnLst>
+      <p:par>
+        <p:cTn id="1" dur="indefinite" restart="never" nodeType="tmRoot"/>
+      </p:par>
+    </p:tnLst>
+  </p:timing>
+</p:sld>
+</file>
+
+<file path=ppt/slides/slide5.xml><?xml version="1.0" encoding="utf-8"?>
+<p:sld xmlns:a="http://schemas.openxmlformats.org/drawingml/2006/main" xmlns:r="http://schemas.openxmlformats.org/officeDocument/2006/relationships" xmlns:p="http://schemas.openxmlformats.org/presentationml/2006/main">
+  <p:cSld>
+    <p:spTree>
+      <p:nvGrpSpPr>
+        <p:cNvPr id="1" name=""/>
+        <p:cNvGrpSpPr/>
+        <p:nvPr/>
+      </p:nvGrpSpPr>
+      <p:grpSpPr>
+        <a:xfrm>
+          <a:off x="0" y="0"/>
+          <a:ext cx="0" cy="0"/>
+          <a:chOff x="0" y="0"/>
+          <a:chExt cx="0" cy="0"/>
+        </a:xfrm>
+      </p:grpSpPr>
+      <p:sp>
+        <p:nvSpPr>
+          <p:cNvPr id="2" name="Title 1"/>
+          <p:cNvSpPr>
+            <a:spLocks noGrp="1"/>
+          </p:cNvSpPr>
+          <p:nvPr>
+            <p:ph type="title"/>
+          </p:nvPr>
+        </p:nvSpPr>
+        <p:spPr/>
+        <p:txBody>
+          <a:bodyPr/>
+          <a:lstStyle/>
+          <a:p>
+            <a:r>
+              <a:rPr lang="en-US" dirty="0"/>
+              <a:t>Stream networks</a:t>
+            </a:r>
+            <a:endParaRPr lang="en-GB" dirty="0"/>
+          </a:p>
+        </p:txBody>
+      </p:sp>
+      <mc:AlternateContent xmlns:mc="http://schemas.openxmlformats.org/markup-compatibility/2006">
+        <mc:Choice xmlns:a14="http://schemas.microsoft.com/office/drawing/2010/main" Requires="a14">
+          <p:sp>
+            <p:nvSpPr>
+              <p:cNvPr id="3" name="Content Placeholder 2"/>
+              <p:cNvSpPr>
+                <a:spLocks noGrp="1"/>
+              </p:cNvSpPr>
+              <p:nvPr>
+                <p:ph idx="1"/>
+              </p:nvPr>
+            </p:nvSpPr>
+            <p:spPr>
+              <a:xfrm>
+                <a:off x="76201" y="838200"/>
+                <a:ext cx="4375030" cy="5943600"/>
+              </a:xfrm>
+            </p:spPr>
+            <p:txBody>
+              <a:bodyPr>
+                <a:normAutofit fontScale="92500" lnSpcReduction="20000"/>
+              </a:bodyPr>
+              <a:lstStyle/>
+              <a:p>
+                <a:pPr marL="0" indent="0">
+                  <a:buNone/>
+                </a:pPr>
+                <a:r>
+                  <a:rPr lang="en-US" dirty="0" smtClean="0"/>
+                  <a:t>Triple-pass depletion</a:t>
+                </a:r>
+              </a:p>
+              <a:p>
+                <a:pPr marL="0" indent="0">
+                  <a:buNone/>
+                </a:pPr>
+                <a:r>
+                  <a:rPr lang="en-US" dirty="0" smtClean="0"/>
+                  <a:t>Goal:</a:t>
+                </a:r>
+              </a:p>
+              <a:p>
+                <a:pPr lvl="1"/>
+                <a:r>
+                  <a:rPr lang="en-US" dirty="0" smtClean="0"/>
+                  <a:t>Estimate detection probability </a:t>
+                </a:r>
+                <a14:m>
+                  <m:oMath xmlns:m="http://schemas.openxmlformats.org/officeDocument/2006/math">
+                    <m:r>
+                      <a:rPr lang="en-US" b="0" i="1" smtClean="0">
+                        <a:latin typeface="Cambria Math" panose="02040503050406030204" pitchFamily="18" charset="0"/>
+                      </a:rPr>
+                      <m:t>𝑝</m:t>
+                    </m:r>
+                  </m:oMath>
+                </a14:m>
+                <a:r>
+                  <a:rPr lang="en-US" dirty="0" smtClean="0"/>
+                  <a:t> for stream fishes</a:t>
+                </a:r>
+                <a:endParaRPr lang="en-US" dirty="0" smtClean="0"/>
+              </a:p>
+              <a:p>
+                <a:pPr marL="0" indent="0">
+                  <a:buNone/>
+                </a:pPr>
+                <a:r>
+                  <a:rPr lang="en-US" dirty="0" smtClean="0"/>
+                  <a:t>Design</a:t>
+                </a:r>
+              </a:p>
+              <a:p>
+                <a:pPr lvl="1"/>
+                <a:r>
+                  <a:rPr lang="en-US" dirty="0" smtClean="0"/>
+                  <a:t>Put nets above and below a stream segment</a:t>
+                </a:r>
+              </a:p>
+              <a:p>
+                <a:pPr lvl="2"/>
+                <a:r>
+                  <a:rPr lang="en-US" dirty="0" smtClean="0"/>
+                  <a:t>Closed population within nets</a:t>
+                </a:r>
+              </a:p>
+              <a:p>
+                <a:pPr lvl="1"/>
+                <a:r>
+                  <a:rPr lang="en-US" dirty="0" smtClean="0"/>
+                  <a:t>Repeatedly sample fishes within nets</a:t>
+                </a:r>
+              </a:p>
+              <a:p>
+                <a:pPr lvl="2"/>
+                <a:r>
+                  <a:rPr lang="en-US" dirty="0" smtClean="0"/>
+                  <a:t>Remove sampled individuals</a:t>
+                </a:r>
+              </a:p>
+              <a:p>
+                <a:pPr lvl="1"/>
+                <a:r>
+                  <a:rPr lang="en-US" dirty="0" smtClean="0"/>
+                  <a:t>Assum</a:t>
+                </a:r>
+                <a:r>
+                  <a:rPr lang="en-US" dirty="0" smtClean="0"/>
+                  <a:t>ptions</a:t>
+                </a:r>
+                <a:r>
+                  <a:rPr lang="en-US" dirty="0" smtClean="0"/>
+                  <a:t> </a:t>
+                </a:r>
+              </a:p>
+              <a:p>
+                <a:pPr lvl="2"/>
+                <a:r>
+                  <a:rPr lang="en-US" dirty="0" smtClean="0"/>
+                  <a:t>individuals are identical </a:t>
+                </a:r>
+              </a:p>
+              <a:p>
+                <a:pPr lvl="2"/>
+                <a:r>
+                  <a:rPr lang="en-US" dirty="0" smtClean="0"/>
+                  <a:t>Individuals </a:t>
+                </a:r>
+                <a:r>
+                  <a:rPr lang="en-US" dirty="0" smtClean="0"/>
+                  <a:t>have an equal exposure to each sampling pass</a:t>
+                </a:r>
+                <a:endParaRPr lang="en-US" dirty="0" smtClean="0"/>
+              </a:p>
+            </p:txBody>
+          </p:sp>
+        </mc:Choice>
+        <mc:Fallback>
+          <p:sp>
+            <p:nvSpPr>
+              <p:cNvPr id="3" name="Content Placeholder 2"/>
+              <p:cNvSpPr>
+                <a:spLocks noGrp="1" noRot="1" noChangeAspect="1" noMove="1" noResize="1" noEditPoints="1" noAdjustHandles="1" noChangeArrowheads="1" noChangeShapeType="1" noTextEdit="1"/>
+              </p:cNvSpPr>
+              <p:nvPr>
+                <p:ph idx="1"/>
+              </p:nvPr>
+            </p:nvSpPr>
+            <p:spPr>
+              <a:xfrm>
+                <a:off x="76201" y="838200"/>
+                <a:ext cx="4375030" cy="5943600"/>
+              </a:xfrm>
+              <a:blipFill>
+                <a:blip r:embed="rId2"/>
+                <a:stretch>
+                  <a:fillRect l="-2510" t="-2154" r="-2510"/>
+                </a:stretch>
+              </a:blipFill>
+            </p:spPr>
+            <p:txBody>
+              <a:bodyPr/>
+              <a:lstStyle/>
+              <a:p>
+                <a:r>
+                  <a:rPr lang="en-GB">
+                    <a:noFill/>
+                  </a:rPr>
+                  <a:t> </a:t>
+                </a:r>
+              </a:p>
+            </p:txBody>
+          </p:sp>
+        </mc:Fallback>
+      </mc:AlternateContent>
+      <mc:AlternateContent xmlns:mc="http://schemas.openxmlformats.org/markup-compatibility/2006">
+        <mc:Choice xmlns:a14="http://schemas.microsoft.com/office/drawing/2010/main" Requires="a14">
+          <p:graphicFrame>
+            <p:nvGraphicFramePr>
+              <p:cNvPr id="4" name="Table 3"/>
+              <p:cNvGraphicFramePr>
+                <a:graphicFrameLocks noGrp="1"/>
+              </p:cNvGraphicFramePr>
+              <p:nvPr/>
+            </p:nvGraphicFramePr>
+            <p:xfrm>
+              <a:off x="4451231" y="1903563"/>
+              <a:ext cx="4646762" cy="2530416"/>
+            </p:xfrm>
+            <a:graphic>
+              <a:graphicData uri="http://schemas.openxmlformats.org/drawingml/2006/table">
+                <a:tbl>
+                  <a:tblPr firstRow="1" bandRow="1">
+                    <a:tableStyleId>{5C22544A-7EE6-4342-B048-85BDC9FD1C3A}</a:tableStyleId>
+                  </a:tblPr>
+                  <a:tblGrid>
+                    <a:gridCol w="2544792">
+                      <a:extLst>
+                        <a:ext uri="{9D8B030D-6E8A-4147-A177-3AD203B41FA5}">
+                          <a16:colId xmlns:a16="http://schemas.microsoft.com/office/drawing/2014/main" val="1685379409"/>
+                        </a:ext>
+                      </a:extLst>
+                    </a:gridCol>
+                    <a:gridCol w="2101970">
+                      <a:extLst>
+                        <a:ext uri="{9D8B030D-6E8A-4147-A177-3AD203B41FA5}">
+                          <a16:colId xmlns:a16="http://schemas.microsoft.com/office/drawing/2014/main" val="2760055028"/>
+                        </a:ext>
+                      </a:extLst>
+                    </a:gridCol>
+                  </a:tblGrid>
+                  <a:tr h="625128">
+                    <a:tc>
+                      <a:txBody>
+                        <a:bodyPr/>
+                        <a:lstStyle/>
+                        <a:p>
+                          <a:pPr algn="ctr"/>
+                          <a:r>
+                            <a:rPr lang="en-US" dirty="0" smtClean="0"/>
+                            <a:t>Event</a:t>
+                          </a:r>
+                        </a:p>
+                      </a:txBody>
+                      <a:tcPr/>
+                    </a:tc>
+                    <a:tc>
+                      <a:txBody>
+                        <a:bodyPr/>
+                        <a:lstStyle/>
+                        <a:p>
+                          <a:pPr algn="ctr"/>
+                          <a:r>
+                            <a:rPr lang="en-US" dirty="0" smtClean="0"/>
+                            <a:t>Probability</a:t>
+                          </a:r>
+                          <a:endParaRPr lang="en-GB" dirty="0"/>
+                        </a:p>
+                      </a:txBody>
+                      <a:tcPr/>
+                    </a:tc>
+                    <a:extLst>
+                      <a:ext uri="{0D108BD9-81ED-4DB2-BD59-A6C34878D82A}">
+                        <a16:rowId xmlns:a16="http://schemas.microsoft.com/office/drawing/2014/main" val="3488912155"/>
+                      </a:ext>
+                    </a:extLst>
+                  </a:tr>
+                  <a:tr h="625128">
+                    <a:tc>
+                      <a:txBody>
+                        <a:bodyPr/>
+                        <a:lstStyle/>
+                        <a:p>
+                          <a14:m>
+                            <m:oMathPara xmlns:m="http://schemas.openxmlformats.org/officeDocument/2006/math">
+                              <m:oMathParaPr>
+                                <m:jc m:val="centerGroup"/>
+                              </m:oMathParaPr>
+                              <m:oMath xmlns:m="http://schemas.openxmlformats.org/officeDocument/2006/math">
+                                <m:r>
+                                  <m:rPr>
+                                    <m:sty m:val="p"/>
+                                  </m:rPr>
+                                  <a:rPr lang="en-US" b="0" i="0" smtClean="0">
+                                    <a:latin typeface="Cambria Math" panose="02040503050406030204" pitchFamily="18" charset="0"/>
+                                  </a:rPr>
+                                  <m:t>Pr</m:t>
+                                </m:r>
+                                <m:r>
+                                  <a:rPr lang="en-US" b="0" i="1" smtClean="0">
+                                    <a:latin typeface="Cambria Math" panose="02040503050406030204" pitchFamily="18" charset="0"/>
+                                  </a:rPr>
+                                  <m:t>⁡(</m:t>
+                                </m:r>
+                                <m:sSub>
+                                  <m:sSubPr>
+                                    <m:ctrlPr>
+                                      <a:rPr lang="en-US" b="0" i="1" smtClean="0">
+                                        <a:latin typeface="Cambria Math" panose="02040503050406030204" pitchFamily="18" charset="0"/>
+                                      </a:rPr>
+                                    </m:ctrlPr>
+                                  </m:sSubPr>
+                                  <m:e>
+                                    <m:r>
+                                      <a:rPr lang="en-US" b="0" i="1" smtClean="0">
+                                        <a:latin typeface="Cambria Math" panose="02040503050406030204" pitchFamily="18" charset="0"/>
+                                      </a:rPr>
+                                      <m:t>𝐷</m:t>
+                                    </m:r>
+                                  </m:e>
+                                  <m:sub>
+                                    <m:r>
+                                      <a:rPr lang="en-US" b="0" i="1" smtClean="0">
+                                        <a:latin typeface="Cambria Math" panose="02040503050406030204" pitchFamily="18" charset="0"/>
+                                      </a:rPr>
+                                      <m:t>𝑧</m:t>
+                                    </m:r>
+                                    <m:r>
+                                      <a:rPr lang="en-US" b="0" i="1" smtClean="0">
+                                        <a:latin typeface="Cambria Math" panose="02040503050406030204" pitchFamily="18" charset="0"/>
+                                      </a:rPr>
+                                      <m:t>=1</m:t>
+                                    </m:r>
+                                  </m:sub>
+                                </m:sSub>
+                                <m:r>
+                                  <a:rPr lang="en-US" b="0" i="1" smtClean="0">
+                                    <a:latin typeface="Cambria Math" panose="02040503050406030204" pitchFamily="18" charset="0"/>
+                                  </a:rPr>
+                                  <m:t>=1</m:t>
+                                </m:r>
+                                <m:r>
+                                  <a:rPr lang="en-US" b="0" i="1" smtClean="0">
+                                    <a:latin typeface="Cambria Math" panose="02040503050406030204" pitchFamily="18" charset="0"/>
+                                  </a:rPr>
+                                  <m:t>)</m:t>
+                                </m:r>
+                              </m:oMath>
+                            </m:oMathPara>
+                          </a14:m>
+                          <a:endParaRPr lang="en-GB" dirty="0"/>
+                        </a:p>
+                      </a:txBody>
+                      <a:tcPr/>
+                    </a:tc>
+                    <a:tc>
+                      <a:txBody>
+                        <a:bodyPr/>
+                        <a:lstStyle/>
+                        <a:p>
+                          <a14:m>
+                            <m:oMathPara xmlns:m="http://schemas.openxmlformats.org/officeDocument/2006/math">
+                              <m:oMathParaPr>
+                                <m:jc m:val="centerGroup"/>
+                              </m:oMathParaPr>
+                              <m:oMath xmlns:m="http://schemas.openxmlformats.org/officeDocument/2006/math">
+                                <m:sSub>
+                                  <m:sSubPr>
+                                    <m:ctrlPr>
+                                      <a:rPr lang="en-US" b="0" i="1" smtClean="0">
+                                        <a:latin typeface="Cambria Math" panose="02040503050406030204" pitchFamily="18" charset="0"/>
+                                      </a:rPr>
+                                    </m:ctrlPr>
+                                  </m:sSubPr>
+                                  <m:e>
+                                    <m:r>
+                                      <a:rPr lang="en-US" b="0" i="1" smtClean="0">
+                                        <a:latin typeface="Cambria Math" panose="02040503050406030204" pitchFamily="18" charset="0"/>
+                                      </a:rPr>
+                                      <m:t>𝑝</m:t>
+                                    </m:r>
+                                  </m:e>
+                                  <m:sub>
+                                    <m:r>
+                                      <a:rPr lang="en-US" b="0" i="1" smtClean="0">
+                                        <a:latin typeface="Cambria Math" panose="02040503050406030204" pitchFamily="18" charset="0"/>
+                                      </a:rPr>
+                                      <m:t>1</m:t>
+                                    </m:r>
+                                  </m:sub>
+                                </m:sSub>
+                                <m:r>
+                                  <a:rPr lang="en-US" b="0" i="0" smtClean="0">
+                                    <a:latin typeface="Cambria Math" panose="02040503050406030204" pitchFamily="18" charset="0"/>
+                                  </a:rPr>
+                                  <m:t>=</m:t>
+                                </m:r>
+                                <m:r>
+                                  <a:rPr lang="en-US" b="0" i="1" smtClean="0">
+                                    <a:latin typeface="Cambria Math" panose="02040503050406030204" pitchFamily="18" charset="0"/>
+                                  </a:rPr>
+                                  <m:t>𝑝</m:t>
+                                </m:r>
+                              </m:oMath>
+                            </m:oMathPara>
+                          </a14:m>
+                          <a:endParaRPr lang="en-GB" dirty="0"/>
+                        </a:p>
+                      </a:txBody>
+                      <a:tcPr/>
+                    </a:tc>
+                    <a:extLst>
+                      <a:ext uri="{0D108BD9-81ED-4DB2-BD59-A6C34878D82A}">
+                        <a16:rowId xmlns:a16="http://schemas.microsoft.com/office/drawing/2014/main" val="3489489442"/>
+                      </a:ext>
+                    </a:extLst>
+                  </a:tr>
+                  <a:tr h="625128">
+                    <a:tc>
+                      <a:txBody>
+                        <a:bodyPr/>
+                        <a:lstStyle/>
+                        <a:p>
+                          <a14:m>
+                            <m:oMathPara xmlns:m="http://schemas.openxmlformats.org/officeDocument/2006/math">
+                              <m:oMathParaPr>
+                                <m:jc m:val="centerGroup"/>
+                              </m:oMathParaPr>
+                              <m:oMath xmlns:m="http://schemas.openxmlformats.org/officeDocument/2006/math">
+                                <m:r>
+                                  <m:rPr>
+                                    <m:sty m:val="p"/>
+                                  </m:rPr>
+                                  <a:rPr lang="en-US" b="0" i="0" smtClean="0">
+                                    <a:latin typeface="Cambria Math" panose="02040503050406030204" pitchFamily="18" charset="0"/>
+                                  </a:rPr>
+                                  <m:t>Pr</m:t>
+                                </m:r>
+                                <m:r>
+                                  <a:rPr lang="en-US" b="0" i="1" smtClean="0">
+                                    <a:latin typeface="Cambria Math" panose="02040503050406030204" pitchFamily="18" charset="0"/>
+                                  </a:rPr>
+                                  <m:t>⁡(</m:t>
+                                </m:r>
+                                <m:sSub>
+                                  <m:sSubPr>
+                                    <m:ctrlPr>
+                                      <a:rPr lang="en-US" b="0" i="1" smtClean="0">
+                                        <a:latin typeface="Cambria Math" panose="02040503050406030204" pitchFamily="18" charset="0"/>
+                                      </a:rPr>
+                                    </m:ctrlPr>
+                                  </m:sSubPr>
+                                  <m:e>
+                                    <m:r>
+                                      <a:rPr lang="en-US" b="0" i="1" smtClean="0">
+                                        <a:latin typeface="Cambria Math" panose="02040503050406030204" pitchFamily="18" charset="0"/>
+                                      </a:rPr>
+                                      <m:t>𝐷</m:t>
+                                    </m:r>
+                                  </m:e>
+                                  <m:sub>
+                                    <m:r>
+                                      <a:rPr lang="en-US" b="0" i="1" smtClean="0">
+                                        <a:latin typeface="Cambria Math" panose="02040503050406030204" pitchFamily="18" charset="0"/>
+                                      </a:rPr>
+                                      <m:t>𝑧</m:t>
+                                    </m:r>
+                                    <m:r>
+                                      <a:rPr lang="en-US" b="0" i="1" smtClean="0">
+                                        <a:latin typeface="Cambria Math" panose="02040503050406030204" pitchFamily="18" charset="0"/>
+                                      </a:rPr>
+                                      <m:t>=2</m:t>
+                                    </m:r>
+                                  </m:sub>
+                                </m:sSub>
+                                <m:r>
+                                  <a:rPr lang="en-US" b="0" i="1" smtClean="0">
+                                    <a:latin typeface="Cambria Math" panose="02040503050406030204" pitchFamily="18" charset="0"/>
+                                  </a:rPr>
+                                  <m:t>=1|</m:t>
+                                </m:r>
+                                <m:sSub>
+                                  <m:sSubPr>
+                                    <m:ctrlPr>
+                                      <a:rPr lang="en-US" b="0" i="1" smtClean="0">
+                                        <a:latin typeface="Cambria Math" panose="02040503050406030204" pitchFamily="18" charset="0"/>
+                                      </a:rPr>
+                                    </m:ctrlPr>
+                                  </m:sSubPr>
+                                  <m:e>
+                                    <m:r>
+                                      <a:rPr lang="en-US" b="0" i="1" smtClean="0">
+                                        <a:latin typeface="Cambria Math" panose="02040503050406030204" pitchFamily="18" charset="0"/>
+                                      </a:rPr>
+                                      <m:t>𝐷</m:t>
+                                    </m:r>
+                                  </m:e>
+                                  <m:sub>
+                                    <m:r>
+                                      <a:rPr lang="en-US" b="0" i="1" smtClean="0">
+                                        <a:latin typeface="Cambria Math" panose="02040503050406030204" pitchFamily="18" charset="0"/>
+                                      </a:rPr>
+                                      <m:t>𝑧</m:t>
+                                    </m:r>
+                                    <m:r>
+                                      <a:rPr lang="en-US" b="0" i="1" smtClean="0">
+                                        <a:latin typeface="Cambria Math" panose="02040503050406030204" pitchFamily="18" charset="0"/>
+                                      </a:rPr>
+                                      <m:t>=1</m:t>
+                                    </m:r>
+                                  </m:sub>
+                                </m:sSub>
+                                <m:r>
+                                  <a:rPr lang="en-US" b="0" i="1" smtClean="0">
+                                    <a:latin typeface="Cambria Math" panose="02040503050406030204" pitchFamily="18" charset="0"/>
+                                  </a:rPr>
+                                  <m:t>=0</m:t>
+                                </m:r>
+                                <m:r>
+                                  <a:rPr lang="en-US" b="0" i="1" smtClean="0">
+                                    <a:latin typeface="Cambria Math" panose="02040503050406030204" pitchFamily="18" charset="0"/>
+                                  </a:rPr>
+                                  <m:t>)</m:t>
+                                </m:r>
+                              </m:oMath>
+                            </m:oMathPara>
+                          </a14:m>
+                          <a:endParaRPr lang="en-GB" dirty="0"/>
+                        </a:p>
+                      </a:txBody>
+                      <a:tcPr/>
+                    </a:tc>
+                    <a:tc>
+                      <a:txBody>
+                        <a:bodyPr/>
+                        <a:lstStyle/>
+                        <a:p>
+                          <a:pPr marL="0" marR="0" lvl="0" indent="0" algn="l" defTabSz="914400" rtl="0" eaLnBrk="1" fontAlgn="auto" latinLnBrk="0" hangingPunct="1">
+                            <a:lnSpc>
+                              <a:spcPct val="100000"/>
+                            </a:lnSpc>
+                            <a:spcBef>
+                              <a:spcPts val="0"/>
+                            </a:spcBef>
+                            <a:spcAft>
+                              <a:spcPts val="0"/>
+                            </a:spcAft>
+                            <a:buClrTx/>
+                            <a:buSzTx/>
+                            <a:buFontTx/>
+                            <a:buNone/>
+                            <a:tabLst/>
+                            <a:defRPr/>
+                          </a:pPr>
+                          <a14:m>
+                            <m:oMathPara xmlns:m="http://schemas.openxmlformats.org/officeDocument/2006/math">
+                              <m:oMathParaPr>
+                                <m:jc m:val="centerGroup"/>
+                              </m:oMathParaPr>
+                              <m:oMath xmlns:m="http://schemas.openxmlformats.org/officeDocument/2006/math">
+                                <m:sSub>
+                                  <m:sSubPr>
+                                    <m:ctrlPr>
+                                      <a:rPr lang="en-US" b="0" i="1" smtClean="0">
+                                        <a:latin typeface="Cambria Math" panose="02040503050406030204" pitchFamily="18" charset="0"/>
+                                      </a:rPr>
+                                    </m:ctrlPr>
+                                  </m:sSubPr>
+                                  <m:e>
+                                    <m:r>
+                                      <a:rPr lang="en-US" b="0" i="1" smtClean="0">
+                                        <a:latin typeface="Cambria Math" panose="02040503050406030204" pitchFamily="18" charset="0"/>
+                                      </a:rPr>
+                                      <m:t>𝑝</m:t>
+                                    </m:r>
+                                  </m:e>
+                                  <m:sub>
+                                    <m:r>
+                                      <a:rPr lang="en-US" b="0" i="1" smtClean="0">
+                                        <a:latin typeface="Cambria Math" panose="02040503050406030204" pitchFamily="18" charset="0"/>
+                                      </a:rPr>
+                                      <m:t>𝑧</m:t>
+                                    </m:r>
+                                  </m:sub>
+                                </m:sSub>
+                                <m:r>
+                                  <a:rPr lang="en-US" b="0" i="0" smtClean="0">
+                                    <a:latin typeface="Cambria Math" panose="02040503050406030204" pitchFamily="18" charset="0"/>
+                                  </a:rPr>
+                                  <m:t>=</m:t>
+                                </m:r>
+                                <m:r>
+                                  <a:rPr lang="en-US" b="0" i="1" smtClean="0">
+                                    <a:latin typeface="Cambria Math" panose="02040503050406030204" pitchFamily="18" charset="0"/>
+                                  </a:rPr>
+                                  <m:t>𝑝</m:t>
+                                </m:r>
+                                <m:r>
+                                  <a:rPr lang="en-US" b="0" i="1" smtClean="0">
+                                    <a:latin typeface="Cambria Math" panose="02040503050406030204" pitchFamily="18" charset="0"/>
+                                  </a:rPr>
+                                  <m:t>(1−</m:t>
+                                </m:r>
+                                <m:r>
+                                  <a:rPr lang="en-US" b="0" i="1" smtClean="0">
+                                    <a:latin typeface="Cambria Math" panose="02040503050406030204" pitchFamily="18" charset="0"/>
+                                  </a:rPr>
+                                  <m:t>𝑝</m:t>
+                                </m:r>
+                                <m:r>
+                                  <a:rPr lang="en-US" b="0" i="1" smtClean="0">
+                                    <a:latin typeface="Cambria Math" panose="02040503050406030204" pitchFamily="18" charset="0"/>
+                                  </a:rPr>
+                                  <m:t>)</m:t>
+                                </m:r>
+                              </m:oMath>
+                            </m:oMathPara>
+                          </a14:m>
+                          <a:endParaRPr lang="en-GB" dirty="0"/>
+                        </a:p>
+                        <a:p>
+                          <a:endParaRPr lang="en-GB" dirty="0"/>
+                        </a:p>
+                      </a:txBody>
+                      <a:tcPr/>
+                    </a:tc>
+                    <a:extLst>
+                      <a:ext uri="{0D108BD9-81ED-4DB2-BD59-A6C34878D82A}">
+                        <a16:rowId xmlns:a16="http://schemas.microsoft.com/office/drawing/2014/main" val="3820406972"/>
+                      </a:ext>
+                    </a:extLst>
+                  </a:tr>
+                  <a:tr h="625128">
+                    <a:tc>
+                      <a:txBody>
+                        <a:bodyPr/>
+                        <a:lstStyle/>
+                        <a:p>
+                          <a:pPr/>
+                          <a14:m>
+                            <m:oMathPara xmlns:m="http://schemas.openxmlformats.org/officeDocument/2006/math">
+                              <m:oMathParaPr>
+                                <m:jc m:val="centerGroup"/>
+                              </m:oMathParaPr>
+                              <m:oMath xmlns:m="http://schemas.openxmlformats.org/officeDocument/2006/math">
+                                <m:r>
+                                  <m:rPr>
+                                    <m:sty m:val="p"/>
+                                  </m:rPr>
+                                  <a:rPr lang="en-US" b="0" i="0" smtClean="0">
+                                    <a:latin typeface="Cambria Math" panose="02040503050406030204" pitchFamily="18" charset="0"/>
+                                  </a:rPr>
+                                  <m:t>Pr</m:t>
+                                </m:r>
+                                <m:r>
+                                  <a:rPr lang="en-US" b="0" i="1" smtClean="0">
+                                    <a:latin typeface="Cambria Math" panose="02040503050406030204" pitchFamily="18" charset="0"/>
+                                  </a:rPr>
+                                  <m:t>⁡(</m:t>
+                                </m:r>
+                                <m:sSub>
+                                  <m:sSubPr>
+                                    <m:ctrlPr>
+                                      <a:rPr lang="en-US" b="0" i="1" smtClean="0">
+                                        <a:latin typeface="Cambria Math" panose="02040503050406030204" pitchFamily="18" charset="0"/>
+                                      </a:rPr>
+                                    </m:ctrlPr>
+                                  </m:sSubPr>
+                                  <m:e>
+                                    <m:r>
+                                      <a:rPr lang="en-US" b="0" i="1" smtClean="0">
+                                        <a:latin typeface="Cambria Math" panose="02040503050406030204" pitchFamily="18" charset="0"/>
+                                      </a:rPr>
+                                      <m:t>𝐷</m:t>
+                                    </m:r>
+                                  </m:e>
+                                  <m:sub>
+                                    <m:r>
+                                      <a:rPr lang="en-US" b="0" i="1" smtClean="0">
+                                        <a:latin typeface="Cambria Math" panose="02040503050406030204" pitchFamily="18" charset="0"/>
+                                      </a:rPr>
+                                      <m:t>𝑧</m:t>
+                                    </m:r>
+                                    <m:r>
+                                      <a:rPr lang="en-US" b="0" i="1" smtClean="0">
+                                        <a:latin typeface="Cambria Math" panose="02040503050406030204" pitchFamily="18" charset="0"/>
+                                      </a:rPr>
+                                      <m:t>=3</m:t>
+                                    </m:r>
+                                  </m:sub>
+                                </m:sSub>
+                                <m:r>
+                                  <a:rPr lang="en-US" b="0" i="1" smtClean="0">
+                                    <a:latin typeface="Cambria Math" panose="02040503050406030204" pitchFamily="18" charset="0"/>
+                                  </a:rPr>
+                                  <m:t>=1|</m:t>
+                                </m:r>
+                                <m:sSub>
+                                  <m:sSubPr>
+                                    <m:ctrlPr>
+                                      <a:rPr lang="en-US" b="0" i="1" smtClean="0">
+                                        <a:latin typeface="Cambria Math" panose="02040503050406030204" pitchFamily="18" charset="0"/>
+                                      </a:rPr>
+                                    </m:ctrlPr>
+                                  </m:sSubPr>
+                                  <m:e>
+                                    <m:r>
+                                      <a:rPr lang="en-US" b="0" i="1" smtClean="0">
+                                        <a:latin typeface="Cambria Math" panose="02040503050406030204" pitchFamily="18" charset="0"/>
+                                      </a:rPr>
+                                      <m:t>𝐷</m:t>
+                                    </m:r>
+                                  </m:e>
+                                  <m:sub>
+                                    <m:r>
+                                      <a:rPr lang="en-US" b="0" i="1" smtClean="0">
+                                        <a:latin typeface="Cambria Math" panose="02040503050406030204" pitchFamily="18" charset="0"/>
+                                      </a:rPr>
+                                      <m:t>𝑧</m:t>
+                                    </m:r>
+                                    <m:r>
+                                      <a:rPr lang="en-US" b="0" i="1" smtClean="0">
+                                        <a:latin typeface="Cambria Math" panose="02040503050406030204" pitchFamily="18" charset="0"/>
+                                      </a:rPr>
+                                      <m:t>=1</m:t>
+                                    </m:r>
+                                  </m:sub>
+                                </m:sSub>
+                                <m:r>
+                                  <a:rPr lang="en-US" b="0" i="1" smtClean="0">
+                                    <a:latin typeface="Cambria Math" panose="02040503050406030204" pitchFamily="18" charset="0"/>
+                                  </a:rPr>
+                                  <m:t>=0</m:t>
+                                </m:r>
+                                <m:r>
+                                  <a:rPr lang="en-US" b="0" i="1" smtClean="0">
+                                    <a:latin typeface="Cambria Math" panose="02040503050406030204" pitchFamily="18" charset="0"/>
+                                  </a:rPr>
+                                  <m:t>,</m:t>
+                                </m:r>
+                                <m:sSub>
+                                  <m:sSubPr>
+                                    <m:ctrlPr>
+                                      <a:rPr lang="en-US" b="0" i="1" smtClean="0">
+                                        <a:latin typeface="Cambria Math" panose="02040503050406030204" pitchFamily="18" charset="0"/>
+                                      </a:rPr>
+                                    </m:ctrlPr>
+                                  </m:sSubPr>
+                                  <m:e>
+                                    <m:r>
+                                      <a:rPr lang="en-US" b="0" i="1" smtClean="0">
+                                        <a:latin typeface="Cambria Math" panose="02040503050406030204" pitchFamily="18" charset="0"/>
+                                      </a:rPr>
+                                      <m:t>𝐷</m:t>
+                                    </m:r>
+                                  </m:e>
+                                  <m:sub>
+                                    <m:r>
+                                      <a:rPr lang="en-US" b="0" i="1" smtClean="0">
+                                        <a:latin typeface="Cambria Math" panose="02040503050406030204" pitchFamily="18" charset="0"/>
+                                      </a:rPr>
+                                      <m:t>𝑧</m:t>
+                                    </m:r>
+                                    <m:r>
+                                      <a:rPr lang="en-US" b="0" i="1" smtClean="0">
+                                        <a:latin typeface="Cambria Math" panose="02040503050406030204" pitchFamily="18" charset="0"/>
+                                      </a:rPr>
+                                      <m:t>=2</m:t>
+                                    </m:r>
+                                  </m:sub>
+                                </m:sSub>
+                                <m:r>
+                                  <a:rPr lang="en-US" b="0" i="1" smtClean="0">
+                                    <a:latin typeface="Cambria Math" panose="02040503050406030204" pitchFamily="18" charset="0"/>
+                                  </a:rPr>
+                                  <m:t>=0)</m:t>
+                                </m:r>
+                              </m:oMath>
+                            </m:oMathPara>
+                          </a14:m>
+                          <a:endParaRPr lang="en-GB" dirty="0"/>
+                        </a:p>
+                      </a:txBody>
+                      <a:tcPr/>
+                    </a:tc>
+                    <a:tc>
+                      <a:txBody>
+                        <a:bodyPr/>
+                        <a:lstStyle/>
+                        <a:p>
+                          <a:pPr marL="0" marR="0" lvl="0" indent="0" algn="l" defTabSz="914400" rtl="0" eaLnBrk="1" fontAlgn="auto" latinLnBrk="0" hangingPunct="1">
+                            <a:lnSpc>
+                              <a:spcPct val="100000"/>
+                            </a:lnSpc>
+                            <a:spcBef>
+                              <a:spcPts val="0"/>
+                            </a:spcBef>
+                            <a:spcAft>
+                              <a:spcPts val="0"/>
+                            </a:spcAft>
+                            <a:buClrTx/>
+                            <a:buSzTx/>
+                            <a:buFontTx/>
+                            <a:buNone/>
+                            <a:tabLst/>
+                            <a:defRPr/>
+                          </a:pPr>
+                          <a14:m>
+                            <m:oMathPara xmlns:m="http://schemas.openxmlformats.org/officeDocument/2006/math">
+                              <m:oMathParaPr>
+                                <m:jc m:val="centerGroup"/>
+                              </m:oMathParaPr>
+                              <m:oMath xmlns:m="http://schemas.openxmlformats.org/officeDocument/2006/math">
+                                <m:sSub>
+                                  <m:sSubPr>
+                                    <m:ctrlPr>
+                                      <a:rPr lang="en-US" b="0" i="1" smtClean="0">
+                                        <a:latin typeface="Cambria Math" panose="02040503050406030204" pitchFamily="18" charset="0"/>
+                                      </a:rPr>
+                                    </m:ctrlPr>
+                                  </m:sSubPr>
+                                  <m:e>
+                                    <m:r>
+                                      <a:rPr lang="en-US" b="0" i="1" smtClean="0">
+                                        <a:latin typeface="Cambria Math" panose="02040503050406030204" pitchFamily="18" charset="0"/>
+                                      </a:rPr>
+                                      <m:t>𝑝</m:t>
+                                    </m:r>
+                                  </m:e>
+                                  <m:sub>
+                                    <m:r>
+                                      <a:rPr lang="en-US" b="0" i="1" smtClean="0">
+                                        <a:latin typeface="Cambria Math" panose="02040503050406030204" pitchFamily="18" charset="0"/>
+                                      </a:rPr>
+                                      <m:t>𝑧</m:t>
+                                    </m:r>
+                                  </m:sub>
+                                </m:sSub>
+                                <m:r>
+                                  <a:rPr lang="en-US" b="0" i="0" smtClean="0">
+                                    <a:latin typeface="Cambria Math" panose="02040503050406030204" pitchFamily="18" charset="0"/>
+                                  </a:rPr>
+                                  <m:t>=</m:t>
+                                </m:r>
+                                <m:r>
+                                  <a:rPr lang="en-US" b="0" i="1" smtClean="0">
+                                    <a:latin typeface="Cambria Math" panose="02040503050406030204" pitchFamily="18" charset="0"/>
+                                  </a:rPr>
+                                  <m:t>𝑝</m:t>
+                                </m:r>
+                                <m:sSup>
+                                  <m:sSupPr>
+                                    <m:ctrlPr>
+                                      <a:rPr lang="en-US" b="0" i="1" smtClean="0">
+                                        <a:latin typeface="Cambria Math" panose="02040503050406030204" pitchFamily="18" charset="0"/>
+                                      </a:rPr>
+                                    </m:ctrlPr>
+                                  </m:sSupPr>
+                                  <m:e>
+                                    <m:d>
+                                      <m:dPr>
+                                        <m:ctrlPr>
+                                          <a:rPr lang="en-US" b="0" i="1" smtClean="0">
+                                            <a:latin typeface="Cambria Math" panose="02040503050406030204" pitchFamily="18" charset="0"/>
+                                          </a:rPr>
+                                        </m:ctrlPr>
+                                      </m:dPr>
+                                      <m:e>
+                                        <m:r>
+                                          <a:rPr lang="en-US" b="0" i="1" smtClean="0">
+                                            <a:latin typeface="Cambria Math" panose="02040503050406030204" pitchFamily="18" charset="0"/>
+                                          </a:rPr>
+                                          <m:t>1−</m:t>
+                                        </m:r>
+                                        <m:r>
+                                          <a:rPr lang="en-US" b="0" i="1" smtClean="0">
+                                            <a:latin typeface="Cambria Math" panose="02040503050406030204" pitchFamily="18" charset="0"/>
+                                          </a:rPr>
+                                          <m:t>𝑝</m:t>
+                                        </m:r>
+                                      </m:e>
+                                    </m:d>
+                                  </m:e>
+                                  <m:sup>
+                                    <m:r>
+                                      <a:rPr lang="en-US" b="0" i="1" smtClean="0">
+                                        <a:latin typeface="Cambria Math" panose="02040503050406030204" pitchFamily="18" charset="0"/>
+                                      </a:rPr>
+                                      <m:t>2</m:t>
+                                    </m:r>
+                                  </m:sup>
+                                </m:sSup>
+                              </m:oMath>
+                            </m:oMathPara>
+                          </a14:m>
+                          <a:endParaRPr lang="en-GB" dirty="0"/>
+                        </a:p>
+                        <a:p>
+                          <a:endParaRPr lang="en-GB" dirty="0"/>
+                        </a:p>
+                      </a:txBody>
+                      <a:tcPr/>
+                    </a:tc>
+                    <a:extLst>
+                      <a:ext uri="{0D108BD9-81ED-4DB2-BD59-A6C34878D82A}">
+                        <a16:rowId xmlns:a16="http://schemas.microsoft.com/office/drawing/2014/main" val="1979163642"/>
+                      </a:ext>
+                    </a:extLst>
+                  </a:tr>
+                </a:tbl>
+              </a:graphicData>
+            </a:graphic>
+          </p:graphicFrame>
+        </mc:Choice>
+        <mc:Fallback>
+          <p:graphicFrame>
+            <p:nvGraphicFramePr>
+              <p:cNvPr id="4" name="Table 3"/>
+              <p:cNvGraphicFramePr>
+                <a:graphicFrameLocks noGrp="1"/>
+              </p:cNvGraphicFramePr>
+              <p:nvPr/>
+            </p:nvGraphicFramePr>
+            <p:xfrm>
+              <a:off x="4451231" y="1903563"/>
+              <a:ext cx="4646762" cy="2530416"/>
+            </p:xfrm>
+            <a:graphic>
+              <a:graphicData uri="http://schemas.openxmlformats.org/drawingml/2006/table">
+                <a:tbl>
+                  <a:tblPr firstRow="1" bandRow="1">
+                    <a:tableStyleId>{5C22544A-7EE6-4342-B048-85BDC9FD1C3A}</a:tableStyleId>
+                  </a:tblPr>
+                  <a:tblGrid>
+                    <a:gridCol w="2544792">
+                      <a:extLst>
+                        <a:ext uri="{9D8B030D-6E8A-4147-A177-3AD203B41FA5}">
+                          <a16:colId xmlns:a16="http://schemas.microsoft.com/office/drawing/2014/main" val="1685379409"/>
+                        </a:ext>
+                      </a:extLst>
+                    </a:gridCol>
+                    <a:gridCol w="2101970">
+                      <a:extLst>
+                        <a:ext uri="{9D8B030D-6E8A-4147-A177-3AD203B41FA5}">
+                          <a16:colId xmlns:a16="http://schemas.microsoft.com/office/drawing/2014/main" val="2760055028"/>
+                        </a:ext>
+                      </a:extLst>
+                    </a:gridCol>
+                  </a:tblGrid>
+                  <a:tr h="625128">
+                    <a:tc>
+                      <a:txBody>
+                        <a:bodyPr/>
+                        <a:lstStyle/>
+                        <a:p>
+                          <a:pPr algn="ctr"/>
+                          <a:r>
+                            <a:rPr lang="en-US" dirty="0" smtClean="0"/>
+                            <a:t>Event</a:t>
+                          </a:r>
+                        </a:p>
+                      </a:txBody>
+                      <a:tcPr/>
+                    </a:tc>
+                    <a:tc>
+                      <a:txBody>
+                        <a:bodyPr/>
+                        <a:lstStyle/>
+                        <a:p>
+                          <a:pPr algn="ctr"/>
+                          <a:r>
+                            <a:rPr lang="en-US" dirty="0" smtClean="0"/>
+                            <a:t>Probability</a:t>
+                          </a:r>
+                          <a:endParaRPr lang="en-GB" dirty="0"/>
+                        </a:p>
+                      </a:txBody>
+                      <a:tcPr/>
+                    </a:tc>
+                    <a:extLst>
+                      <a:ext uri="{0D108BD9-81ED-4DB2-BD59-A6C34878D82A}">
+                        <a16:rowId xmlns:a16="http://schemas.microsoft.com/office/drawing/2014/main" val="3488912155"/>
+                      </a:ext>
+                    </a:extLst>
+                  </a:tr>
+                  <a:tr h="625128">
+                    <a:tc>
+                      <a:txBody>
+                        <a:bodyPr/>
+                        <a:lstStyle/>
+                        <a:p>
+                          <a:endParaRPr lang="en-US"/>
+                        </a:p>
+                      </a:txBody>
+                      <a:tcPr>
+                        <a:blipFill>
+                          <a:blip r:embed="rId3"/>
+                          <a:stretch>
+                            <a:fillRect l="-239" t="-104854" r="-83493" b="-210680"/>
+                          </a:stretch>
+                        </a:blipFill>
+                      </a:tcPr>
+                    </a:tc>
+                    <a:tc>
+                      <a:txBody>
+                        <a:bodyPr/>
+                        <a:lstStyle/>
+                        <a:p>
+                          <a:endParaRPr lang="en-US"/>
+                        </a:p>
+                      </a:txBody>
+                      <a:tcPr>
+                        <a:blipFill>
+                          <a:blip r:embed="rId3"/>
+                          <a:stretch>
+                            <a:fillRect l="-121449" t="-104854" r="-1159" b="-210680"/>
+                          </a:stretch>
+                        </a:blipFill>
+                      </a:tcPr>
+                    </a:tc>
+                    <a:extLst>
+                      <a:ext uri="{0D108BD9-81ED-4DB2-BD59-A6C34878D82A}">
+                        <a16:rowId xmlns:a16="http://schemas.microsoft.com/office/drawing/2014/main" val="3489489442"/>
+                      </a:ext>
+                    </a:extLst>
+                  </a:tr>
+                  <a:tr h="640080">
+                    <a:tc>
+                      <a:txBody>
+                        <a:bodyPr/>
+                        <a:lstStyle/>
+                        <a:p>
+                          <a:endParaRPr lang="en-US"/>
+                        </a:p>
+                      </a:txBody>
+                      <a:tcPr>
+                        <a:blipFill>
+                          <a:blip r:embed="rId3"/>
+                          <a:stretch>
+                            <a:fillRect l="-239" t="-200952" r="-83493" b="-106667"/>
+                          </a:stretch>
+                        </a:blipFill>
+                      </a:tcPr>
+                    </a:tc>
+                    <a:tc>
+                      <a:txBody>
+                        <a:bodyPr/>
+                        <a:lstStyle/>
+                        <a:p>
+                          <a:endParaRPr lang="en-US"/>
+                        </a:p>
+                      </a:txBody>
+                      <a:tcPr>
+                        <a:blipFill>
+                          <a:blip r:embed="rId3"/>
+                          <a:stretch>
+                            <a:fillRect l="-121449" t="-200952" r="-1159" b="-106667"/>
+                          </a:stretch>
+                        </a:blipFill>
+                      </a:tcPr>
+                    </a:tc>
+                    <a:extLst>
+                      <a:ext uri="{0D108BD9-81ED-4DB2-BD59-A6C34878D82A}">
+                        <a16:rowId xmlns:a16="http://schemas.microsoft.com/office/drawing/2014/main" val="3820406972"/>
+                      </a:ext>
+                    </a:extLst>
+                  </a:tr>
+                  <a:tr h="640080">
+                    <a:tc>
+                      <a:txBody>
+                        <a:bodyPr/>
+                        <a:lstStyle/>
+                        <a:p>
+                          <a:endParaRPr lang="en-US"/>
+                        </a:p>
+                      </a:txBody>
+                      <a:tcPr>
+                        <a:blipFill>
+                          <a:blip r:embed="rId3"/>
+                          <a:stretch>
+                            <a:fillRect l="-239" t="-300952" r="-83493" b="-6667"/>
+                          </a:stretch>
+                        </a:blipFill>
+                      </a:tcPr>
+                    </a:tc>
+                    <a:tc>
+                      <a:txBody>
+                        <a:bodyPr/>
+                        <a:lstStyle/>
+                        <a:p>
+                          <a:endParaRPr lang="en-US"/>
+                        </a:p>
+                      </a:txBody>
+                      <a:tcPr>
+                        <a:blipFill>
+                          <a:blip r:embed="rId3"/>
+                          <a:stretch>
+                            <a:fillRect l="-121449" t="-300952" r="-1159" b="-6667"/>
+                          </a:stretch>
+                        </a:blipFill>
+                      </a:tcPr>
+                    </a:tc>
+                    <a:extLst>
+                      <a:ext uri="{0D108BD9-81ED-4DB2-BD59-A6C34878D82A}">
+                        <a16:rowId xmlns:a16="http://schemas.microsoft.com/office/drawing/2014/main" val="1979163642"/>
+                      </a:ext>
+                    </a:extLst>
+                  </a:tr>
+                </a:tbl>
+              </a:graphicData>
+            </a:graphic>
+          </p:graphicFrame>
+        </mc:Fallback>
+      </mc:AlternateContent>
+      <mc:AlternateContent xmlns:mc="http://schemas.openxmlformats.org/markup-compatibility/2006">
+        <mc:Choice xmlns:a14="http://schemas.microsoft.com/office/drawing/2010/main" Requires="a14">
+          <p:sp>
+            <p:nvSpPr>
+              <p:cNvPr id="5" name="TextBox 4"/>
+              <p:cNvSpPr txBox="1"/>
+              <p:nvPr/>
+            </p:nvSpPr>
+            <p:spPr>
+              <a:xfrm>
+                <a:off x="4731589" y="1181819"/>
+                <a:ext cx="4336211" cy="1015663"/>
+              </a:xfrm>
+              <a:prstGeom prst="rect">
+                <a:avLst/>
+              </a:prstGeom>
+              <a:noFill/>
+            </p:spPr>
+            <p:txBody>
+              <a:bodyPr wrap="square" rtlCol="0">
+                <a:spAutoFit/>
+              </a:bodyPr>
+              <a:lstStyle/>
+              <a:p>
+                <a:pPr algn="ctr"/>
+                <a:r>
+                  <a:rPr lang="en-US" sz="2000" b="1" dirty="0"/>
+                  <a:t>Probability of detection </a:t>
+                </a:r>
+                <a14:m>
+                  <m:oMath xmlns:m="http://schemas.openxmlformats.org/officeDocument/2006/math">
+                    <m:sSub>
+                      <m:sSubPr>
+                        <m:ctrlPr>
+                          <a:rPr lang="en-US" sz="2000" b="1" i="1">
+                            <a:latin typeface="Cambria Math" panose="02040503050406030204" pitchFamily="18" charset="0"/>
+                          </a:rPr>
+                        </m:ctrlPr>
+                      </m:sSubPr>
+                      <m:e>
+                        <m:r>
+                          <a:rPr lang="en-US" sz="2000" b="1" i="1">
+                            <a:latin typeface="Cambria Math" panose="02040503050406030204" pitchFamily="18" charset="0"/>
+                          </a:rPr>
+                          <m:t>𝑫</m:t>
+                        </m:r>
+                      </m:e>
+                      <m:sub>
+                        <m:r>
+                          <a:rPr lang="en-US" sz="2000" b="1" i="1">
+                            <a:latin typeface="Cambria Math" panose="02040503050406030204" pitchFamily="18" charset="0"/>
+                          </a:rPr>
+                          <m:t>𝒛</m:t>
+                        </m:r>
+                      </m:sub>
+                    </m:sSub>
+                    <m:r>
+                      <a:rPr lang="en-US" sz="2000" b="1" i="1">
+                        <a:latin typeface="Cambria Math" panose="02040503050406030204" pitchFamily="18" charset="0"/>
+                      </a:rPr>
+                      <m:t>=</m:t>
+                    </m:r>
+                    <m:r>
+                      <a:rPr lang="en-US" sz="2000" b="1" i="1">
+                        <a:latin typeface="Cambria Math" panose="02040503050406030204" pitchFamily="18" charset="0"/>
+                      </a:rPr>
+                      <m:t>𝟏</m:t>
+                    </m:r>
+                  </m:oMath>
+                </a14:m>
+                <a:r>
+                  <a:rPr lang="en-GB" sz="2000" b="1" dirty="0"/>
+                  <a:t> in pass </a:t>
+                </a:r>
+                <a14:m>
+                  <m:oMath xmlns:m="http://schemas.openxmlformats.org/officeDocument/2006/math">
+                    <m:r>
+                      <a:rPr lang="en-US" sz="2000" b="1" i="1">
+                        <a:latin typeface="Cambria Math" panose="02040503050406030204" pitchFamily="18" charset="0"/>
+                      </a:rPr>
+                      <m:t>𝒛</m:t>
+                    </m:r>
+                  </m:oMath>
+                </a14:m>
+                <a:endParaRPr lang="en-GB" sz="2000" b="1" dirty="0"/>
+              </a:p>
+              <a:p>
+                <a:pPr algn="ctr"/>
+                <a:endParaRPr lang="en-GB" sz="2000" b="1" dirty="0"/>
+              </a:p>
+            </p:txBody>
+          </p:sp>
+        </mc:Choice>
+        <mc:Fallback>
+          <p:sp>
+            <p:nvSpPr>
+              <p:cNvPr id="5" name="TextBox 4"/>
+              <p:cNvSpPr txBox="1">
+                <a:spLocks noRot="1" noChangeAspect="1" noMove="1" noResize="1" noEditPoints="1" noAdjustHandles="1" noChangeArrowheads="1" noChangeShapeType="1" noTextEdit="1"/>
+              </p:cNvSpPr>
+              <p:nvPr/>
+            </p:nvSpPr>
+            <p:spPr>
+              <a:xfrm>
+                <a:off x="4731589" y="1181819"/>
+                <a:ext cx="4336211" cy="1015663"/>
+              </a:xfrm>
+              <a:prstGeom prst="rect">
+                <a:avLst/>
+              </a:prstGeom>
+              <a:blipFill>
+                <a:blip r:embed="rId4"/>
+                <a:stretch>
+                  <a:fillRect l="-983" t="-3614" r="-1966"/>
+                </a:stretch>
+              </a:blipFill>
+            </p:spPr>
+            <p:txBody>
+              <a:bodyPr/>
+              <a:lstStyle/>
+              <a:p>
+                <a:r>
+                  <a:rPr lang="en-GB">
+                    <a:noFill/>
+                  </a:rPr>
+                  <a:t> </a:t>
+                </a:r>
+              </a:p>
+            </p:txBody>
+          </p:sp>
+        </mc:Fallback>
+      </mc:AlternateContent>
+    </p:spTree>
+    <p:extLst>
+      <p:ext uri="{BB962C8B-B14F-4D97-AF65-F5344CB8AC3E}">
+        <p14:creationId xmlns:p14="http://schemas.microsoft.com/office/powerpoint/2010/main" val="4271249773"/>
+      </p:ext>
+    </p:extLst>
+  </p:cSld>
+  <p:clrMapOvr>
+    <a:masterClrMapping/>
+  </p:clrMapOvr>
+  <p:timing>
+    <p:tnLst>
+      <p:par>
+        <p:cTn id="1" dur="indefinite" restart="never" nodeType="tmRoot"/>
+      </p:par>
+    </p:tnLst>
+  </p:timing>
+</p:sld>
+</file>
+
+<file path=ppt/slides/slide6.xml><?xml version="1.0" encoding="utf-8"?>
+<p:sld xmlns:a="http://schemas.openxmlformats.org/drawingml/2006/main" xmlns:r="http://schemas.openxmlformats.org/officeDocument/2006/relationships" xmlns:p="http://schemas.openxmlformats.org/presentationml/2006/main">
+  <p:cSld>
+    <p:spTree>
+      <p:nvGrpSpPr>
+        <p:cNvPr id="1" name=""/>
+        <p:cNvGrpSpPr/>
+        <p:nvPr/>
+      </p:nvGrpSpPr>
+      <p:grpSpPr>
+        <a:xfrm>
+          <a:off x="0" y="0"/>
+          <a:ext cx="0" cy="0"/>
+          <a:chOff x="0" y="0"/>
+          <a:chExt cx="0" cy="0"/>
+        </a:xfrm>
+      </p:grpSpPr>
+      <p:sp>
+        <p:nvSpPr>
+          <p:cNvPr id="2" name="Title 1"/>
+          <p:cNvSpPr>
+            <a:spLocks noGrp="1"/>
+          </p:cNvSpPr>
+          <p:nvPr>
+            <p:ph type="title"/>
+          </p:nvPr>
+        </p:nvSpPr>
+        <p:spPr/>
+        <p:txBody>
+          <a:bodyPr/>
+          <a:lstStyle/>
+          <a:p>
+            <a:r>
+              <a:rPr lang="en-US" dirty="0"/>
+              <a:t>Stream networks</a:t>
+            </a:r>
+            <a:endParaRPr lang="en-GB" dirty="0"/>
+          </a:p>
+        </p:txBody>
+      </p:sp>
+      <p:sp>
+        <p:nvSpPr>
+          <p:cNvPr id="3" name="Content Placeholder 2"/>
+          <p:cNvSpPr>
+            <a:spLocks noGrp="1"/>
+          </p:cNvSpPr>
+          <p:nvPr>
+            <p:ph idx="1"/>
+          </p:nvPr>
+        </p:nvSpPr>
+        <p:spPr>
+          <a:xfrm>
+            <a:off x="76200" y="838199"/>
+            <a:ext cx="8991600" cy="1241439"/>
           </a:xfrm>
         </p:spPr>
         <p:txBody>
@@ -4762,7 +6822,17 @@
             </a:pPr>
             <a:r>
               <a:rPr lang="en-US" dirty="0" smtClean="0"/>
-              <a:t>Define an directed acyclic graph (DAG) for network</a:t>
+              <a:t>How to define spatial model on streams?</a:t>
+            </a:r>
+          </a:p>
+          <a:p>
+            <a:r>
+              <a:rPr lang="en-US" dirty="0" smtClean="0"/>
+              <a:t>Define </a:t>
+            </a:r>
+            <a:r>
+              <a:rPr lang="en-US" dirty="0" smtClean="0"/>
+              <a:t>an directed acyclic graph (DAG) for network</a:t>
             </a:r>
             <a:endParaRPr lang="en-GB" dirty="0"/>
           </a:p>
@@ -4790,7 +6860,7 @@
         </p:blipFill>
         <p:spPr>
           <a:xfrm>
-            <a:off x="4071668" y="1613140"/>
+            <a:off x="4076699" y="2079639"/>
             <a:ext cx="4882213" cy="2647375"/>
           </a:xfrm>
           <a:prstGeom prst="rect">
@@ -4814,13 +6884,13 @@
               <p:nvPr>
                 <p:extLst>
                   <p:ext uri="{D42A27DB-BD31-4B8C-83A1-F6EECF244321}">
-                    <p14:modId xmlns:p14="http://schemas.microsoft.com/office/powerpoint/2010/main" val="1113132150"/>
+                    <p14:modId xmlns:p14="http://schemas.microsoft.com/office/powerpoint/2010/main" val="1693379820"/>
                   </p:ext>
                 </p:extLst>
               </p:nvPr>
             </p:nvGraphicFramePr>
             <p:xfrm>
-              <a:off x="71169" y="1752600"/>
+              <a:off x="76200" y="2219099"/>
               <a:ext cx="3664068" cy="4638901"/>
             </p:xfrm>
             <a:graphic>
@@ -5866,13 +7936,13 @@
               <p:nvPr>
                 <p:extLst>
                   <p:ext uri="{D42A27DB-BD31-4B8C-83A1-F6EECF244321}">
-                    <p14:modId xmlns:p14="http://schemas.microsoft.com/office/powerpoint/2010/main" val="1113132150"/>
+                    <p14:modId xmlns:p14="http://schemas.microsoft.com/office/powerpoint/2010/main" val="1693379820"/>
                   </p:ext>
                 </p:extLst>
               </p:nvPr>
             </p:nvGraphicFramePr>
             <p:xfrm>
-              <a:off x="71169" y="1752600"/>
+              <a:off x="76200" y="2219099"/>
               <a:ext cx="3664068" cy="4638901"/>
             </p:xfrm>
             <a:graphic>
@@ -5917,7 +7987,7 @@
                         <a:blipFill>
                           <a:blip r:embed="rId3"/>
                           <a:stretch>
-                            <a:fillRect l="-498" t="-11957" r="-201493" b="-753261"/>
+                            <a:fillRect l="-498" t="-11957" r="-201493" b="-752174"/>
                           </a:stretch>
                         </a:blipFill>
                       </a:tcPr>
@@ -5934,7 +8004,7 @@
                         <a:blipFill>
                           <a:blip r:embed="rId3"/>
                           <a:stretch>
-                            <a:fillRect l="-101000" t="-11957" r="-102500" b="-753261"/>
+                            <a:fillRect l="-101000" t="-11957" r="-102500" b="-752174"/>
                           </a:stretch>
                         </a:blipFill>
                       </a:tcPr>
@@ -5951,7 +8021,7 @@
                         <a:blipFill>
                           <a:blip r:embed="rId3"/>
                           <a:stretch>
-                            <a:fillRect l="-200000" t="-11957" r="-1990" b="-753261"/>
+                            <a:fillRect l="-200000" t="-11957" r="-1990" b="-752174"/>
                           </a:stretch>
                         </a:blipFill>
                       </a:tcPr>
@@ -6744,7 +8814,7 @@
         </p:nvSpPr>
         <p:spPr>
           <a:xfrm>
-            <a:off x="5115464" y="1613140"/>
+            <a:off x="5120495" y="2079639"/>
             <a:ext cx="215661" cy="369332"/>
           </a:xfrm>
           <a:prstGeom prst="rect">
@@ -6774,7 +8844,7 @@
         </p:nvSpPr>
         <p:spPr>
           <a:xfrm>
-            <a:off x="7453223" y="2355011"/>
+            <a:off x="7458254" y="2821510"/>
             <a:ext cx="534837" cy="369332"/>
           </a:xfrm>
           <a:prstGeom prst="rect">
@@ -6816,7 +8886,7 @@
 </p:sld>
 </file>
 
-<file path=ppt/slides/slide5.xml><?xml version="1.0" encoding="utf-8"?>
+<file path=ppt/slides/slide7.xml><?xml version="1.0" encoding="utf-8"?>
 <p:sld xmlns:a="http://schemas.openxmlformats.org/drawingml/2006/main" xmlns:r="http://schemas.openxmlformats.org/officeDocument/2006/relationships" xmlns:p="http://schemas.openxmlformats.org/presentationml/2006/main">
   <p:cSld>
     <p:spTree>
@@ -6870,12 +8940,14 @@
             </p:nvSpPr>
             <p:spPr>
               <a:xfrm>
-                <a:off x="3735236" y="838200"/>
-                <a:ext cx="5332563" cy="5943600"/>
+                <a:off x="3735236" y="1589370"/>
+                <a:ext cx="5332563" cy="5268629"/>
               </a:xfrm>
             </p:spPr>
             <p:txBody>
-              <a:bodyPr/>
+              <a:bodyPr>
+                <a:normAutofit lnSpcReduction="10000"/>
+              </a:bodyPr>
               <a:lstStyle/>
               <a:p>
                 <a:pPr marL="0" indent="0">
@@ -6982,7 +9054,14 @@
                                     <a:latin typeface="Cambria Math" panose="02040503050406030204" pitchFamily="18" charset="0"/>
                                     <a:ea typeface="Cambria Math" panose="02040503050406030204" pitchFamily="18" charset="0"/>
                                   </a:rPr>
-                                  <m:t>𝑁𝑜𝑟𝑚𝑎𝑙</m:t>
+                                  <m:t>𝑁</m:t>
+                                </m:r>
+                                <m:r>
+                                  <a:rPr lang="en-US" b="0" i="1" smtClean="0">
+                                    <a:latin typeface="Cambria Math" panose="02040503050406030204" pitchFamily="18" charset="0"/>
+                                    <a:ea typeface="Cambria Math" panose="02040503050406030204" pitchFamily="18" charset="0"/>
+                                  </a:rPr>
+                                  <m:t>𝑜𝑟𝑚𝑎𝑙</m:t>
                                 </m:r>
                                 <m:r>
                                   <a:rPr lang="en-US" b="0" i="1" smtClean="0">
@@ -7590,8 +9669,8 @@
             </p:nvSpPr>
             <p:spPr>
               <a:xfrm>
-                <a:off x="3735236" y="838200"/>
-                <a:ext cx="5332563" cy="5943600"/>
+                <a:off x="3735236" y="1589370"/>
+                <a:ext cx="5332563" cy="5268629"/>
               </a:xfrm>
               <a:blipFill>
                 <a:blip r:embed="rId2"/>
@@ -7619,20 +9698,20 @@
         <mc:Choice xmlns:a14="http://schemas.microsoft.com/office/drawing/2010/main" Requires="a14">
           <p:graphicFrame>
             <p:nvGraphicFramePr>
-              <p:cNvPr id="4" name="Table 3"/>
+              <p:cNvPr id="6" name="Table 5"/>
               <p:cNvGraphicFramePr>
                 <a:graphicFrameLocks noGrp="1"/>
               </p:cNvGraphicFramePr>
               <p:nvPr>
                 <p:extLst>
                   <p:ext uri="{D42A27DB-BD31-4B8C-83A1-F6EECF244321}">
-                    <p14:modId xmlns:p14="http://schemas.microsoft.com/office/powerpoint/2010/main" val="4017208120"/>
+                    <p14:modId xmlns:p14="http://schemas.microsoft.com/office/powerpoint/2010/main" val="442551982"/>
                   </p:ext>
                 </p:extLst>
               </p:nvPr>
             </p:nvGraphicFramePr>
             <p:xfrm>
-              <a:off x="71169" y="1752600"/>
+              <a:off x="76200" y="2219099"/>
               <a:ext cx="3664068" cy="4638901"/>
             </p:xfrm>
             <a:graphic>
@@ -8671,20 +10750,20 @@
         <mc:Fallback>
           <p:graphicFrame>
             <p:nvGraphicFramePr>
-              <p:cNvPr id="4" name="Table 3"/>
+              <p:cNvPr id="6" name="Table 5"/>
               <p:cNvGraphicFramePr>
                 <a:graphicFrameLocks noGrp="1"/>
               </p:cNvGraphicFramePr>
               <p:nvPr>
                 <p:extLst>
                   <p:ext uri="{D42A27DB-BD31-4B8C-83A1-F6EECF244321}">
-                    <p14:modId xmlns:p14="http://schemas.microsoft.com/office/powerpoint/2010/main" val="4017208120"/>
+                    <p14:modId xmlns:p14="http://schemas.microsoft.com/office/powerpoint/2010/main" val="442551982"/>
                   </p:ext>
                 </p:extLst>
               </p:nvPr>
             </p:nvGraphicFramePr>
             <p:xfrm>
-              <a:off x="71169" y="1752600"/>
+              <a:off x="76200" y="2219099"/>
               <a:ext cx="3664068" cy="4638901"/>
             </p:xfrm>
             <a:graphic>
@@ -8729,7 +10808,7 @@
                         <a:blipFill>
                           <a:blip r:embed="rId3"/>
                           <a:stretch>
-                            <a:fillRect l="-498" t="-11957" r="-201493" b="-753261"/>
+                            <a:fillRect l="-498" t="-11957" r="-201493" b="-752174"/>
                           </a:stretch>
                         </a:blipFill>
                       </a:tcPr>
@@ -8746,7 +10825,7 @@
                         <a:blipFill>
                           <a:blip r:embed="rId3"/>
                           <a:stretch>
-                            <a:fillRect l="-101000" t="-11957" r="-102500" b="-753261"/>
+                            <a:fillRect l="-101000" t="-11957" r="-102500" b="-752174"/>
                           </a:stretch>
                         </a:blipFill>
                       </a:tcPr>
@@ -8763,7 +10842,7 @@
                         <a:blipFill>
                           <a:blip r:embed="rId3"/>
                           <a:stretch>
-                            <a:fillRect l="-200000" t="-11957" r="-1990" b="-753261"/>
+                            <a:fillRect l="-200000" t="-11957" r="-1990" b="-752174"/>
                           </a:stretch>
                         </a:blipFill>
                       </a:tcPr>
@@ -9550,7 +11629,7 @@
       </mc:AlternateContent>
       <p:sp>
         <p:nvSpPr>
-          <p:cNvPr id="5" name="Content Placeholder 2"/>
+          <p:cNvPr id="7" name="Content Placeholder 2"/>
           <p:cNvSpPr txBox="1">
             <a:spLocks/>
           </p:cNvSpPr>
@@ -9558,8 +11637,8 @@
         </p:nvSpPr>
         <p:spPr>
           <a:xfrm>
-            <a:off x="76200" y="838200"/>
-            <a:ext cx="8991600" cy="705928"/>
+            <a:off x="76200" y="838199"/>
+            <a:ext cx="8991600" cy="1241439"/>
           </a:xfrm>
           <a:prstGeom prst="rect">
             <a:avLst/>
@@ -9728,6 +11807,12 @@
             </a:pPr>
             <a:r>
               <a:rPr lang="en-US" smtClean="0"/>
+              <a:t>How to define spatial model on streams?</a:t>
+            </a:r>
+          </a:p>
+          <a:p>
+            <a:r>
+              <a:rPr lang="en-US" smtClean="0"/>
               <a:t>Define an directed acyclic graph (DAG) for network</a:t>
             </a:r>
             <a:endParaRPr lang="en-GB" dirty="0"/>
@@ -9754,7 +11839,7 @@
 </p:sld>
 </file>
 
-<file path=ppt/slides/slide6.xml><?xml version="1.0" encoding="utf-8"?>
+<file path=ppt/slides/slide8.xml><?xml version="1.0" encoding="utf-8"?>
 <p:sld xmlns:a="http://schemas.openxmlformats.org/drawingml/2006/main" xmlns:r="http://schemas.openxmlformats.org/officeDocument/2006/relationships" xmlns:p="http://schemas.openxmlformats.org/presentationml/2006/main">
   <p:cSld>
     <p:spTree>
@@ -9808,8 +11893,8 @@
             </p:nvSpPr>
             <p:spPr>
               <a:xfrm>
-                <a:off x="76200" y="838200"/>
-                <a:ext cx="8991599" cy="5943600"/>
+                <a:off x="76200" y="2079638"/>
+                <a:ext cx="8991599" cy="4702162"/>
               </a:xfrm>
             </p:spPr>
             <p:txBody>
@@ -9821,15 +11906,13 @@
                 <a:pPr marL="0" indent="0">
                   <a:buNone/>
                 </a:pPr>
-                <a:endParaRPr lang="en-US" dirty="0" smtClean="0"/>
-              </a:p>
-              <a:p>
-                <a:pPr marL="0" indent="0">
-                  <a:buNone/>
-                </a:pPr>
                 <a:r>
                   <a:rPr lang="en-US" dirty="0" smtClean="0"/>
-                  <a:t>Approach:</a:t>
+                  <a:t>Approach</a:t>
+                </a:r>
+                <a:r>
+                  <a:rPr lang="en-US" dirty="0" smtClean="0"/>
+                  <a:t>:</a:t>
                 </a:r>
               </a:p>
               <a:p>
@@ -9922,7 +12005,14 @@
                                     <a:latin typeface="Cambria Math" panose="02040503050406030204" pitchFamily="18" charset="0"/>
                                     <a:ea typeface="Cambria Math" panose="02040503050406030204" pitchFamily="18" charset="0"/>
                                   </a:rPr>
-                                  <m:t>𝑁𝑜𝑟𝑚𝑎𝑙</m:t>
+                                  <m:t>𝑁</m:t>
+                                </m:r>
+                                <m:r>
+                                  <a:rPr lang="en-US" b="0" i="1" smtClean="0">
+                                    <a:latin typeface="Cambria Math" panose="02040503050406030204" pitchFamily="18" charset="0"/>
+                                    <a:ea typeface="Cambria Math" panose="02040503050406030204" pitchFamily="18" charset="0"/>
+                                  </a:rPr>
+                                  <m:t>𝑜𝑟𝑚𝑎𝑙</m:t>
                                 </m:r>
                                 <m:r>
                                   <a:rPr lang="en-US" b="0" i="1" smtClean="0">
@@ -10236,14 +12326,7 @@
                                             <a:latin typeface="Cambria Math" panose="02040503050406030204" pitchFamily="18" charset="0"/>
                                             <a:ea typeface="Cambria Math" panose="02040503050406030204" pitchFamily="18" charset="0"/>
                                           </a:rPr>
-                                          <m:t>−</m:t>
-                                        </m:r>
-                                        <m:r>
-                                          <a:rPr lang="en-US" i="1">
-                                            <a:latin typeface="Cambria Math" panose="02040503050406030204" pitchFamily="18" charset="0"/>
-                                            <a:ea typeface="Cambria Math" panose="02040503050406030204" pitchFamily="18" charset="0"/>
-                                          </a:rPr>
-                                          <m:t>2</m:t>
+                                          <m:t>−2</m:t>
                                         </m:r>
                                         <m:r>
                                           <a:rPr lang="en-US" i="1">
@@ -10353,7 +12436,22 @@
                 <a:pPr lvl="1"/>
                 <a:r>
                   <a:rPr lang="en-US" dirty="0" smtClean="0"/>
-                  <a:t>… because it is first-order Markov when moving along the network</a:t>
+                  <a:t>Because </a:t>
+                </a:r>
+                <a:r>
+                  <a:rPr lang="en-US" dirty="0" smtClean="0"/>
+                  <a:t>it is first-order Markov when moving along the </a:t>
+                </a:r>
+                <a:r>
+                  <a:rPr lang="en-US" dirty="0" smtClean="0"/>
+                  <a:t>network…</a:t>
+                </a:r>
+              </a:p>
+              <a:p>
+                <a:pPr lvl="1"/>
+                <a:r>
+                  <a:rPr lang="en-US" dirty="0" smtClean="0"/>
+                  <a:t>… but I could find it written anywhere</a:t>
                 </a:r>
                 <a:endParaRPr lang="en-GB" dirty="0"/>
               </a:p>
@@ -10373,13 +12471,13 @@
             </p:nvSpPr>
             <p:spPr>
               <a:xfrm>
-                <a:off x="76200" y="838200"/>
-                <a:ext cx="8991599" cy="5943600"/>
+                <a:off x="76200" y="2079638"/>
+                <a:ext cx="8991599" cy="4702162"/>
               </a:xfrm>
               <a:blipFill>
                 <a:blip r:embed="rId2"/>
                 <a:stretch>
-                  <a:fillRect l="-1085"/>
+                  <a:fillRect l="-1085" t="-1813"/>
                 </a:stretch>
               </a:blipFill>
             </p:spPr>
@@ -10400,7 +12498,7 @@
       </mc:AlternateContent>
       <p:sp>
         <p:nvSpPr>
-          <p:cNvPr id="5" name="Content Placeholder 2"/>
+          <p:cNvPr id="6" name="Content Placeholder 2"/>
           <p:cNvSpPr txBox="1">
             <a:spLocks/>
           </p:cNvSpPr>
@@ -10408,8 +12506,8 @@
         </p:nvSpPr>
         <p:spPr>
           <a:xfrm>
-            <a:off x="76200" y="838200"/>
-            <a:ext cx="8991600" cy="705928"/>
+            <a:off x="76200" y="838199"/>
+            <a:ext cx="8991600" cy="1241439"/>
           </a:xfrm>
           <a:prstGeom prst="rect">
             <a:avLst/>
@@ -10577,7 +12675,13 @@
               <a:buNone/>
             </a:pPr>
             <a:r>
-              <a:rPr lang="en-US" smtClean="0"/>
+              <a:rPr lang="en-US" dirty="0" smtClean="0"/>
+              <a:t>How to define spatial model on streams?</a:t>
+            </a:r>
+          </a:p>
+          <a:p>
+            <a:r>
+              <a:rPr lang="en-US" dirty="0" smtClean="0"/>
               <a:t>Define an directed acyclic graph (DAG) for network</a:t>
             </a:r>
             <a:endParaRPr lang="en-GB" dirty="0"/>
@@ -10604,7 +12708,7 @@
 </p:sld>
 </file>
 
-<file path=ppt/slides/slide7.xml><?xml version="1.0" encoding="utf-8"?>
+<file path=ppt/slides/slide9.xml><?xml version="1.0" encoding="utf-8"?>
 <p:sld xmlns:a="http://schemas.openxmlformats.org/drawingml/2006/main" xmlns:r="http://schemas.openxmlformats.org/officeDocument/2006/relationships" xmlns:p="http://schemas.openxmlformats.org/presentationml/2006/main">
   <p:cSld>
     <p:spTree>
@@ -10656,8 +12760,8 @@
         </p:nvSpPr>
         <p:spPr>
           <a:xfrm>
-            <a:off x="76200" y="838200"/>
-            <a:ext cx="8991599" cy="5943600"/>
+            <a:off x="76200" y="1752600"/>
+            <a:ext cx="8991599" cy="5029200"/>
           </a:xfrm>
         </p:spPr>
         <p:txBody>
@@ -10690,7 +12794,7 @@
       </p:sp>
       <p:sp>
         <p:nvSpPr>
-          <p:cNvPr id="5" name="Content Placeholder 2"/>
+          <p:cNvPr id="6" name="Content Placeholder 2"/>
           <p:cNvSpPr txBox="1">
             <a:spLocks/>
           </p:cNvSpPr>
@@ -10698,8 +12802,8 @@
         </p:nvSpPr>
         <p:spPr>
           <a:xfrm>
-            <a:off x="76200" y="838200"/>
-            <a:ext cx="8991600" cy="705928"/>
+            <a:off x="76200" y="838199"/>
+            <a:ext cx="8991600" cy="1241439"/>
           </a:xfrm>
           <a:prstGeom prst="rect">
             <a:avLst/>
@@ -10868,6 +12972,12 @@
             </a:pPr>
             <a:r>
               <a:rPr lang="en-US" smtClean="0"/>
+              <a:t>How to define spatial model on streams?</a:t>
+            </a:r>
+          </a:p>
+          <a:p>
+            <a:r>
+              <a:rPr lang="en-US" smtClean="0"/>
               <a:t>Define an directed acyclic graph (DAG) for network</a:t>
             </a:r>
             <a:endParaRPr lang="en-GB" dirty="0"/>
@@ -10878,296 +12988,6 @@
     <p:extLst>
       <p:ext uri="{BB962C8B-B14F-4D97-AF65-F5344CB8AC3E}">
         <p14:creationId xmlns:p14="http://schemas.microsoft.com/office/powerpoint/2010/main" val="922300635"/>
-      </p:ext>
-    </p:extLst>
-  </p:cSld>
-  <p:clrMapOvr>
-    <a:masterClrMapping/>
-  </p:clrMapOvr>
-  <p:timing>
-    <p:tnLst>
-      <p:par>
-        <p:cTn id="1" dur="indefinite" restart="never" nodeType="tmRoot"/>
-      </p:par>
-    </p:tnLst>
-  </p:timing>
-</p:sld>
-</file>
-
-<file path=ppt/slides/slide8.xml><?xml version="1.0" encoding="utf-8"?>
-<p:sld xmlns:a="http://schemas.openxmlformats.org/drawingml/2006/main" xmlns:r="http://schemas.openxmlformats.org/officeDocument/2006/relationships" xmlns:p="http://schemas.openxmlformats.org/presentationml/2006/main">
-  <p:cSld>
-    <p:spTree>
-      <p:nvGrpSpPr>
-        <p:cNvPr id="1" name=""/>
-        <p:cNvGrpSpPr/>
-        <p:nvPr/>
-      </p:nvGrpSpPr>
-      <p:grpSpPr>
-        <a:xfrm>
-          <a:off x="0" y="0"/>
-          <a:ext cx="0" cy="0"/>
-          <a:chOff x="0" y="0"/>
-          <a:chExt cx="0" cy="0"/>
-        </a:xfrm>
-      </p:grpSpPr>
-      <p:sp>
-        <p:nvSpPr>
-          <p:cNvPr id="2" name="Title 1"/>
-          <p:cNvSpPr>
-            <a:spLocks noGrp="1"/>
-          </p:cNvSpPr>
-          <p:nvPr>
-            <p:ph type="title"/>
-          </p:nvPr>
-        </p:nvSpPr>
-        <p:spPr/>
-        <p:txBody>
-          <a:bodyPr/>
-          <a:lstStyle/>
-          <a:p>
-            <a:r>
-              <a:rPr lang="en-US" dirty="0"/>
-              <a:t>Stream networks</a:t>
-            </a:r>
-            <a:endParaRPr lang="en-GB" dirty="0"/>
-          </a:p>
-        </p:txBody>
-      </p:sp>
-      <p:sp>
-        <p:nvSpPr>
-          <p:cNvPr id="3" name="Content Placeholder 2"/>
-          <p:cNvSpPr>
-            <a:spLocks noGrp="1"/>
-          </p:cNvSpPr>
-          <p:nvPr>
-            <p:ph idx="1"/>
-          </p:nvPr>
-        </p:nvSpPr>
-        <p:spPr>
-          <a:xfrm>
-            <a:off x="76200" y="838200"/>
-            <a:ext cx="8991599" cy="5943600"/>
-          </a:xfrm>
-        </p:spPr>
-        <p:txBody>
-          <a:bodyPr>
-            <a:normAutofit/>
-          </a:bodyPr>
-          <a:lstStyle/>
-          <a:p>
-            <a:pPr marL="0" indent="0">
-              <a:buNone/>
-            </a:pPr>
-            <a:endParaRPr lang="en-US" dirty="0" smtClean="0"/>
-          </a:p>
-          <a:p>
-            <a:pPr marL="0" indent="0">
-              <a:buNone/>
-            </a:pPr>
-            <a:endParaRPr lang="en-US" dirty="0"/>
-          </a:p>
-          <a:p>
-            <a:pPr marL="0" indent="0">
-              <a:buNone/>
-            </a:pPr>
-            <a:r>
-              <a:rPr lang="en-US" dirty="0" smtClean="0"/>
-              <a:t>[see code to confirm that both approaches give same result]</a:t>
-            </a:r>
-          </a:p>
-        </p:txBody>
-      </p:sp>
-      <p:sp>
-        <p:nvSpPr>
-          <p:cNvPr id="5" name="Content Placeholder 2"/>
-          <p:cNvSpPr txBox="1">
-            <a:spLocks/>
-          </p:cNvSpPr>
-          <p:nvPr/>
-        </p:nvSpPr>
-        <p:spPr>
-          <a:xfrm>
-            <a:off x="76200" y="838200"/>
-            <a:ext cx="8991600" cy="705928"/>
-          </a:xfrm>
-          <a:prstGeom prst="rect">
-            <a:avLst/>
-          </a:prstGeom>
-        </p:spPr>
-        <p:txBody>
-          <a:bodyPr vert="horz" lIns="91440" tIns="45720" rIns="91440" bIns="45720" rtlCol="0">
-            <a:normAutofit/>
-          </a:bodyPr>
-          <a:lstStyle>
-            <a:lvl1pPr marL="342900" indent="-342900" algn="l" defTabSz="914400" rtl="0" eaLnBrk="1" latinLnBrk="0" hangingPunct="1">
-              <a:spcBef>
-                <a:spcPts val="600"/>
-              </a:spcBef>
-              <a:spcAft>
-                <a:spcPts val="600"/>
-              </a:spcAft>
-              <a:buFont typeface="Arial" pitchFamily="34" charset="0"/>
-              <a:buChar char="•"/>
-              <a:defRPr sz="2800" kern="1200">
-                <a:solidFill>
-                  <a:schemeClr val="tx1"/>
-                </a:solidFill>
-                <a:latin typeface="+mn-lt"/>
-                <a:ea typeface="+mn-ea"/>
-                <a:cs typeface="+mn-cs"/>
-              </a:defRPr>
-            </a:lvl1pPr>
-            <a:lvl2pPr marL="742950" indent="-285750" algn="l" defTabSz="914400" rtl="0" eaLnBrk="1" latinLnBrk="0" hangingPunct="1">
-              <a:spcBef>
-                <a:spcPts val="600"/>
-              </a:spcBef>
-              <a:spcAft>
-                <a:spcPts val="600"/>
-              </a:spcAft>
-              <a:buFont typeface="Arial" pitchFamily="34" charset="0"/>
-              <a:buChar char="–"/>
-              <a:defRPr sz="2400" kern="1200">
-                <a:solidFill>
-                  <a:schemeClr val="tx1"/>
-                </a:solidFill>
-                <a:latin typeface="+mn-lt"/>
-                <a:ea typeface="+mn-ea"/>
-                <a:cs typeface="+mn-cs"/>
-              </a:defRPr>
-            </a:lvl2pPr>
-            <a:lvl3pPr marL="1143000" indent="-228600" algn="l" defTabSz="914400" rtl="0" eaLnBrk="1" latinLnBrk="0" hangingPunct="1">
-              <a:spcBef>
-                <a:spcPts val="600"/>
-              </a:spcBef>
-              <a:spcAft>
-                <a:spcPts val="600"/>
-              </a:spcAft>
-              <a:buFont typeface="Arial" pitchFamily="34" charset="0"/>
-              <a:buChar char="•"/>
-              <a:defRPr sz="2000" kern="1200">
-                <a:solidFill>
-                  <a:schemeClr val="tx1"/>
-                </a:solidFill>
-                <a:latin typeface="+mn-lt"/>
-                <a:ea typeface="+mn-ea"/>
-                <a:cs typeface="+mn-cs"/>
-              </a:defRPr>
-            </a:lvl3pPr>
-            <a:lvl4pPr marL="1600200" indent="-228600" algn="l" defTabSz="914400" rtl="0" eaLnBrk="1" latinLnBrk="0" hangingPunct="1">
-              <a:spcBef>
-                <a:spcPts val="600"/>
-              </a:spcBef>
-              <a:spcAft>
-                <a:spcPts val="600"/>
-              </a:spcAft>
-              <a:buFont typeface="Arial" pitchFamily="34" charset="0"/>
-              <a:buChar char="–"/>
-              <a:defRPr sz="1800" kern="1200">
-                <a:solidFill>
-                  <a:schemeClr val="tx1"/>
-                </a:solidFill>
-                <a:latin typeface="+mn-lt"/>
-                <a:ea typeface="+mn-ea"/>
-                <a:cs typeface="+mn-cs"/>
-              </a:defRPr>
-            </a:lvl4pPr>
-            <a:lvl5pPr marL="2057400" indent="-228600" algn="l" defTabSz="914400" rtl="0" eaLnBrk="1" latinLnBrk="0" hangingPunct="1">
-              <a:spcBef>
-                <a:spcPts val="600"/>
-              </a:spcBef>
-              <a:spcAft>
-                <a:spcPts val="600"/>
-              </a:spcAft>
-              <a:buFont typeface="Arial" pitchFamily="34" charset="0"/>
-              <a:buChar char="»"/>
-              <a:defRPr sz="1800" kern="1200">
-                <a:solidFill>
-                  <a:schemeClr val="tx1"/>
-                </a:solidFill>
-                <a:latin typeface="+mn-lt"/>
-                <a:ea typeface="+mn-ea"/>
-                <a:cs typeface="+mn-cs"/>
-              </a:defRPr>
-            </a:lvl5pPr>
-            <a:lvl6pPr marL="2514600" indent="-228600" algn="l" defTabSz="914400" rtl="0" eaLnBrk="1" latinLnBrk="0" hangingPunct="1">
-              <a:spcBef>
-                <a:spcPct val="20000"/>
-              </a:spcBef>
-              <a:buFont typeface="Arial" pitchFamily="34" charset="0"/>
-              <a:buChar char="•"/>
-              <a:defRPr sz="2000" kern="1200">
-                <a:solidFill>
-                  <a:schemeClr val="tx1"/>
-                </a:solidFill>
-                <a:latin typeface="+mn-lt"/>
-                <a:ea typeface="+mn-ea"/>
-                <a:cs typeface="+mn-cs"/>
-              </a:defRPr>
-            </a:lvl6pPr>
-            <a:lvl7pPr marL="2971800" indent="-228600" algn="l" defTabSz="914400" rtl="0" eaLnBrk="1" latinLnBrk="0" hangingPunct="1">
-              <a:spcBef>
-                <a:spcPct val="20000"/>
-              </a:spcBef>
-              <a:buFont typeface="Arial" pitchFamily="34" charset="0"/>
-              <a:buChar char="•"/>
-              <a:defRPr sz="2000" kern="1200">
-                <a:solidFill>
-                  <a:schemeClr val="tx1"/>
-                </a:solidFill>
-                <a:latin typeface="+mn-lt"/>
-                <a:ea typeface="+mn-ea"/>
-                <a:cs typeface="+mn-cs"/>
-              </a:defRPr>
-            </a:lvl7pPr>
-            <a:lvl8pPr marL="3429000" indent="-228600" algn="l" defTabSz="914400" rtl="0" eaLnBrk="1" latinLnBrk="0" hangingPunct="1">
-              <a:spcBef>
-                <a:spcPct val="20000"/>
-              </a:spcBef>
-              <a:buFont typeface="Arial" pitchFamily="34" charset="0"/>
-              <a:buChar char="•"/>
-              <a:defRPr sz="2000" kern="1200">
-                <a:solidFill>
-                  <a:schemeClr val="tx1"/>
-                </a:solidFill>
-                <a:latin typeface="+mn-lt"/>
-                <a:ea typeface="+mn-ea"/>
-                <a:cs typeface="+mn-cs"/>
-              </a:defRPr>
-            </a:lvl8pPr>
-            <a:lvl9pPr marL="3886200" indent="-228600" algn="l" defTabSz="914400" rtl="0" eaLnBrk="1" latinLnBrk="0" hangingPunct="1">
-              <a:spcBef>
-                <a:spcPct val="20000"/>
-              </a:spcBef>
-              <a:buFont typeface="Arial" pitchFamily="34" charset="0"/>
-              <a:buChar char="•"/>
-              <a:defRPr sz="2000" kern="1200">
-                <a:solidFill>
-                  <a:schemeClr val="tx1"/>
-                </a:solidFill>
-                <a:latin typeface="+mn-lt"/>
-                <a:ea typeface="+mn-ea"/>
-                <a:cs typeface="+mn-cs"/>
-              </a:defRPr>
-            </a:lvl9pPr>
-          </a:lstStyle>
-          <a:p>
-            <a:pPr marL="0" indent="0">
-              <a:buFont typeface="Arial" pitchFamily="34" charset="0"/>
-              <a:buNone/>
-            </a:pPr>
-            <a:r>
-              <a:rPr lang="en-US" smtClean="0"/>
-              <a:t>Define an directed acyclic graph (DAG) for network</a:t>
-            </a:r>
-            <a:endParaRPr lang="en-GB" dirty="0"/>
-          </a:p>
-        </p:txBody>
-      </p:sp>
-    </p:spTree>
-    <p:extLst>
-      <p:ext uri="{BB962C8B-B14F-4D97-AF65-F5344CB8AC3E}">
-        <p14:creationId xmlns:p14="http://schemas.microsoft.com/office/powerpoint/2010/main" val="3791673848"/>
       </p:ext>
     </p:extLst>
   </p:cSld>

</xml_diff>

<commit_message>
one new slide for Week 9 lecture
</commit_message>
<xml_diff>
--- a/Week 9 -- Movement and network models/Lecture 9/Lecture 9 -- stream network.pptx
+++ b/Week 9 -- Movement and network models/Lecture 9/Lecture 9 -- stream network.pptx
@@ -5,7 +5,7 @@
     <p:sldMasterId id="2147483672" r:id="rId1"/>
   </p:sldMasterIdLst>
   <p:notesMasterIdLst>
-    <p:notesMasterId r:id="rId13"/>
+    <p:notesMasterId r:id="rId14"/>
   </p:notesMasterIdLst>
   <p:sldIdLst>
     <p:sldId id="266" r:id="rId2"/>
@@ -13,12 +13,13 @@
     <p:sldId id="282" r:id="rId4"/>
     <p:sldId id="290" r:id="rId5"/>
     <p:sldId id="291" r:id="rId6"/>
-    <p:sldId id="283" r:id="rId7"/>
-    <p:sldId id="286" r:id="rId8"/>
-    <p:sldId id="287" r:id="rId9"/>
-    <p:sldId id="288" r:id="rId10"/>
-    <p:sldId id="289" r:id="rId11"/>
-    <p:sldId id="292" r:id="rId12"/>
+    <p:sldId id="293" r:id="rId7"/>
+    <p:sldId id="283" r:id="rId8"/>
+    <p:sldId id="286" r:id="rId9"/>
+    <p:sldId id="287" r:id="rId10"/>
+    <p:sldId id="288" r:id="rId11"/>
+    <p:sldId id="289" r:id="rId12"/>
+    <p:sldId id="292" r:id="rId13"/>
   </p:sldIdLst>
   <p:sldSz cx="9144000" cy="6858000" type="screen4x3"/>
   <p:notesSz cx="6858000" cy="9144000"/>
@@ -3500,6 +3501,21 @@
             </a:r>
           </a:p>
           <a:p>
+            <a:pPr marL="342900" indent="-342900" algn="l">
+              <a:buFont typeface="Arial" panose="020B0604020202020204" pitchFamily="34" charset="0"/>
+              <a:buChar char="•"/>
+            </a:pPr>
+            <a:r>
+              <a:rPr lang="en-US" dirty="0" smtClean="0"/>
+              <a:t>Implement and explore model to estimate spatial variation in </a:t>
+            </a:r>
+            <a:r>
+              <a:rPr lang="en-US" smtClean="0"/>
+              <a:t>detection probability</a:t>
+            </a:r>
+            <a:endParaRPr lang="en-US" dirty="0" smtClean="0"/>
+          </a:p>
+          <a:p>
             <a:pPr algn="l"/>
             <a:endParaRPr lang="en-US" dirty="0" smtClean="0"/>
           </a:p>
@@ -3604,8 +3620,8 @@
         </p:nvSpPr>
         <p:spPr>
           <a:xfrm>
-            <a:off x="76200" y="1923690"/>
-            <a:ext cx="8991599" cy="4858109"/>
+            <a:off x="76200" y="1752600"/>
+            <a:ext cx="8991599" cy="5029200"/>
           </a:xfrm>
         </p:spPr>
         <p:txBody>
@@ -3631,7 +3647,7 @@
             </a:pPr>
             <a:r>
               <a:rPr lang="en-US" dirty="0" smtClean="0"/>
-              <a:t>[see code to confirm that both approaches give same result]</a:t>
+              <a:t>[see code to check Q calculation using TMB inner hessian]</a:t>
             </a:r>
           </a:p>
         </p:txBody>
@@ -3831,7 +3847,7 @@
     </p:spTree>
     <p:extLst>
       <p:ext uri="{BB962C8B-B14F-4D97-AF65-F5344CB8AC3E}">
-        <p14:creationId xmlns:p14="http://schemas.microsoft.com/office/powerpoint/2010/main" val="3791673848"/>
+        <p14:creationId xmlns:p14="http://schemas.microsoft.com/office/powerpoint/2010/main" val="922300635"/>
       </p:ext>
     </p:extLst>
   </p:cSld>
@@ -3888,8 +3904,304 @@
           </a:p>
         </p:txBody>
       </p:sp>
-      <mc:AlternateContent xmlns:mc="http://schemas.openxmlformats.org/markup-compatibility/2006">
-        <mc:Choice xmlns:a14="http://schemas.microsoft.com/office/drawing/2010/main" Requires="a14">
+      <p:sp>
+        <p:nvSpPr>
+          <p:cNvPr id="3" name="Content Placeholder 2"/>
+          <p:cNvSpPr>
+            <a:spLocks noGrp="1"/>
+          </p:cNvSpPr>
+          <p:nvPr>
+            <p:ph idx="1"/>
+          </p:nvPr>
+        </p:nvSpPr>
+        <p:spPr>
+          <a:xfrm>
+            <a:off x="76200" y="1923690"/>
+            <a:ext cx="8991599" cy="4858109"/>
+          </a:xfrm>
+        </p:spPr>
+        <p:txBody>
+          <a:bodyPr>
+            <a:normAutofit/>
+          </a:bodyPr>
+          <a:lstStyle/>
+          <a:p>
+            <a:pPr marL="0" indent="0">
+              <a:buNone/>
+            </a:pPr>
+            <a:endParaRPr lang="en-US" dirty="0" smtClean="0"/>
+          </a:p>
+          <a:p>
+            <a:pPr marL="0" indent="0">
+              <a:buNone/>
+            </a:pPr>
+            <a:endParaRPr lang="en-US" dirty="0"/>
+          </a:p>
+          <a:p>
+            <a:pPr marL="0" indent="0">
+              <a:buNone/>
+            </a:pPr>
+            <a:r>
+              <a:rPr lang="en-US" dirty="0" smtClean="0"/>
+              <a:t>[see code to confirm that both approaches give same result]</a:t>
+            </a:r>
+          </a:p>
+        </p:txBody>
+      </p:sp>
+      <p:sp>
+        <p:nvSpPr>
+          <p:cNvPr id="6" name="Content Placeholder 2"/>
+          <p:cNvSpPr txBox="1">
+            <a:spLocks/>
+          </p:cNvSpPr>
+          <p:nvPr/>
+        </p:nvSpPr>
+        <p:spPr>
+          <a:xfrm>
+            <a:off x="76200" y="838199"/>
+            <a:ext cx="8991600" cy="1241439"/>
+          </a:xfrm>
+          <a:prstGeom prst="rect">
+            <a:avLst/>
+          </a:prstGeom>
+        </p:spPr>
+        <p:txBody>
+          <a:bodyPr vert="horz" lIns="91440" tIns="45720" rIns="91440" bIns="45720" rtlCol="0">
+            <a:normAutofit/>
+          </a:bodyPr>
+          <a:lstStyle>
+            <a:lvl1pPr marL="342900" indent="-342900" algn="l" defTabSz="914400" rtl="0" eaLnBrk="1" latinLnBrk="0" hangingPunct="1">
+              <a:spcBef>
+                <a:spcPts val="600"/>
+              </a:spcBef>
+              <a:spcAft>
+                <a:spcPts val="600"/>
+              </a:spcAft>
+              <a:buFont typeface="Arial" pitchFamily="34" charset="0"/>
+              <a:buChar char="•"/>
+              <a:defRPr sz="2800" kern="1200">
+                <a:solidFill>
+                  <a:schemeClr val="tx1"/>
+                </a:solidFill>
+                <a:latin typeface="+mn-lt"/>
+                <a:ea typeface="+mn-ea"/>
+                <a:cs typeface="+mn-cs"/>
+              </a:defRPr>
+            </a:lvl1pPr>
+            <a:lvl2pPr marL="742950" indent="-285750" algn="l" defTabSz="914400" rtl="0" eaLnBrk="1" latinLnBrk="0" hangingPunct="1">
+              <a:spcBef>
+                <a:spcPts val="600"/>
+              </a:spcBef>
+              <a:spcAft>
+                <a:spcPts val="600"/>
+              </a:spcAft>
+              <a:buFont typeface="Arial" pitchFamily="34" charset="0"/>
+              <a:buChar char="–"/>
+              <a:defRPr sz="2400" kern="1200">
+                <a:solidFill>
+                  <a:schemeClr val="tx1"/>
+                </a:solidFill>
+                <a:latin typeface="+mn-lt"/>
+                <a:ea typeface="+mn-ea"/>
+                <a:cs typeface="+mn-cs"/>
+              </a:defRPr>
+            </a:lvl2pPr>
+            <a:lvl3pPr marL="1143000" indent="-228600" algn="l" defTabSz="914400" rtl="0" eaLnBrk="1" latinLnBrk="0" hangingPunct="1">
+              <a:spcBef>
+                <a:spcPts val="600"/>
+              </a:spcBef>
+              <a:spcAft>
+                <a:spcPts val="600"/>
+              </a:spcAft>
+              <a:buFont typeface="Arial" pitchFamily="34" charset="0"/>
+              <a:buChar char="•"/>
+              <a:defRPr sz="2000" kern="1200">
+                <a:solidFill>
+                  <a:schemeClr val="tx1"/>
+                </a:solidFill>
+                <a:latin typeface="+mn-lt"/>
+                <a:ea typeface="+mn-ea"/>
+                <a:cs typeface="+mn-cs"/>
+              </a:defRPr>
+            </a:lvl3pPr>
+            <a:lvl4pPr marL="1600200" indent="-228600" algn="l" defTabSz="914400" rtl="0" eaLnBrk="1" latinLnBrk="0" hangingPunct="1">
+              <a:spcBef>
+                <a:spcPts val="600"/>
+              </a:spcBef>
+              <a:spcAft>
+                <a:spcPts val="600"/>
+              </a:spcAft>
+              <a:buFont typeface="Arial" pitchFamily="34" charset="0"/>
+              <a:buChar char="–"/>
+              <a:defRPr sz="1800" kern="1200">
+                <a:solidFill>
+                  <a:schemeClr val="tx1"/>
+                </a:solidFill>
+                <a:latin typeface="+mn-lt"/>
+                <a:ea typeface="+mn-ea"/>
+                <a:cs typeface="+mn-cs"/>
+              </a:defRPr>
+            </a:lvl4pPr>
+            <a:lvl5pPr marL="2057400" indent="-228600" algn="l" defTabSz="914400" rtl="0" eaLnBrk="1" latinLnBrk="0" hangingPunct="1">
+              <a:spcBef>
+                <a:spcPts val="600"/>
+              </a:spcBef>
+              <a:spcAft>
+                <a:spcPts val="600"/>
+              </a:spcAft>
+              <a:buFont typeface="Arial" pitchFamily="34" charset="0"/>
+              <a:buChar char="»"/>
+              <a:defRPr sz="1800" kern="1200">
+                <a:solidFill>
+                  <a:schemeClr val="tx1"/>
+                </a:solidFill>
+                <a:latin typeface="+mn-lt"/>
+                <a:ea typeface="+mn-ea"/>
+                <a:cs typeface="+mn-cs"/>
+              </a:defRPr>
+            </a:lvl5pPr>
+            <a:lvl6pPr marL="2514600" indent="-228600" algn="l" defTabSz="914400" rtl="0" eaLnBrk="1" latinLnBrk="0" hangingPunct="1">
+              <a:spcBef>
+                <a:spcPct val="20000"/>
+              </a:spcBef>
+              <a:buFont typeface="Arial" pitchFamily="34" charset="0"/>
+              <a:buChar char="•"/>
+              <a:defRPr sz="2000" kern="1200">
+                <a:solidFill>
+                  <a:schemeClr val="tx1"/>
+                </a:solidFill>
+                <a:latin typeface="+mn-lt"/>
+                <a:ea typeface="+mn-ea"/>
+                <a:cs typeface="+mn-cs"/>
+              </a:defRPr>
+            </a:lvl6pPr>
+            <a:lvl7pPr marL="2971800" indent="-228600" algn="l" defTabSz="914400" rtl="0" eaLnBrk="1" latinLnBrk="0" hangingPunct="1">
+              <a:spcBef>
+                <a:spcPct val="20000"/>
+              </a:spcBef>
+              <a:buFont typeface="Arial" pitchFamily="34" charset="0"/>
+              <a:buChar char="•"/>
+              <a:defRPr sz="2000" kern="1200">
+                <a:solidFill>
+                  <a:schemeClr val="tx1"/>
+                </a:solidFill>
+                <a:latin typeface="+mn-lt"/>
+                <a:ea typeface="+mn-ea"/>
+                <a:cs typeface="+mn-cs"/>
+              </a:defRPr>
+            </a:lvl7pPr>
+            <a:lvl8pPr marL="3429000" indent="-228600" algn="l" defTabSz="914400" rtl="0" eaLnBrk="1" latinLnBrk="0" hangingPunct="1">
+              <a:spcBef>
+                <a:spcPct val="20000"/>
+              </a:spcBef>
+              <a:buFont typeface="Arial" pitchFamily="34" charset="0"/>
+              <a:buChar char="•"/>
+              <a:defRPr sz="2000" kern="1200">
+                <a:solidFill>
+                  <a:schemeClr val="tx1"/>
+                </a:solidFill>
+                <a:latin typeface="+mn-lt"/>
+                <a:ea typeface="+mn-ea"/>
+                <a:cs typeface="+mn-cs"/>
+              </a:defRPr>
+            </a:lvl8pPr>
+            <a:lvl9pPr marL="3886200" indent="-228600" algn="l" defTabSz="914400" rtl="0" eaLnBrk="1" latinLnBrk="0" hangingPunct="1">
+              <a:spcBef>
+                <a:spcPct val="20000"/>
+              </a:spcBef>
+              <a:buFont typeface="Arial" pitchFamily="34" charset="0"/>
+              <a:buChar char="•"/>
+              <a:defRPr sz="2000" kern="1200">
+                <a:solidFill>
+                  <a:schemeClr val="tx1"/>
+                </a:solidFill>
+                <a:latin typeface="+mn-lt"/>
+                <a:ea typeface="+mn-ea"/>
+                <a:cs typeface="+mn-cs"/>
+              </a:defRPr>
+            </a:lvl9pPr>
+          </a:lstStyle>
+          <a:p>
+            <a:pPr marL="0" indent="0">
+              <a:buFont typeface="Arial" pitchFamily="34" charset="0"/>
+              <a:buNone/>
+            </a:pPr>
+            <a:r>
+              <a:rPr lang="en-US" smtClean="0"/>
+              <a:t>How to define spatial model on streams?</a:t>
+            </a:r>
+          </a:p>
+          <a:p>
+            <a:r>
+              <a:rPr lang="en-US" smtClean="0"/>
+              <a:t>Define an directed acyclic graph (DAG) for network</a:t>
+            </a:r>
+            <a:endParaRPr lang="en-GB" dirty="0"/>
+          </a:p>
+        </p:txBody>
+      </p:sp>
+    </p:spTree>
+    <p:extLst>
+      <p:ext uri="{BB962C8B-B14F-4D97-AF65-F5344CB8AC3E}">
+        <p14:creationId xmlns:p14="http://schemas.microsoft.com/office/powerpoint/2010/main" val="3791673848"/>
+      </p:ext>
+    </p:extLst>
+  </p:cSld>
+  <p:clrMapOvr>
+    <a:masterClrMapping/>
+  </p:clrMapOvr>
+  <p:timing>
+    <p:tnLst>
+      <p:par>
+        <p:cTn id="1" dur="indefinite" restart="never" nodeType="tmRoot"/>
+      </p:par>
+    </p:tnLst>
+  </p:timing>
+</p:sld>
+</file>
+
+<file path=ppt/slides/slide12.xml><?xml version="1.0" encoding="utf-8"?>
+<p:sld xmlns:a="http://schemas.openxmlformats.org/drawingml/2006/main" xmlns:r="http://schemas.openxmlformats.org/officeDocument/2006/relationships" xmlns:p="http://schemas.openxmlformats.org/presentationml/2006/main">
+  <p:cSld>
+    <p:spTree>
+      <p:nvGrpSpPr>
+        <p:cNvPr id="1" name=""/>
+        <p:cNvGrpSpPr/>
+        <p:nvPr/>
+      </p:nvGrpSpPr>
+      <p:grpSpPr>
+        <a:xfrm>
+          <a:off x="0" y="0"/>
+          <a:ext cx="0" cy="0"/>
+          <a:chOff x="0" y="0"/>
+          <a:chExt cx="0" cy="0"/>
+        </a:xfrm>
+      </p:grpSpPr>
+      <p:sp>
+        <p:nvSpPr>
+          <p:cNvPr id="2" name="Title 1"/>
+          <p:cNvSpPr>
+            <a:spLocks noGrp="1"/>
+          </p:cNvSpPr>
+          <p:nvPr>
+            <p:ph type="title"/>
+          </p:nvPr>
+        </p:nvSpPr>
+        <p:spPr/>
+        <p:txBody>
+          <a:bodyPr/>
+          <a:lstStyle/>
+          <a:p>
+            <a:r>
+              <a:rPr lang="en-US" dirty="0"/>
+              <a:t>Stream networks</a:t>
+            </a:r>
+            <a:endParaRPr lang="en-GB" dirty="0"/>
+          </a:p>
+        </p:txBody>
+      </p:sp>
+      <mc:AlternateContent xmlns:mc="http://schemas.openxmlformats.org/markup-compatibility/2006" xmlns:a14="http://schemas.microsoft.com/office/drawing/2010/main">
+        <mc:Choice Requires="a14">
           <p:sp>
             <p:nvSpPr>
               <p:cNvPr id="3" name="Content Placeholder 2"/>
@@ -3930,12 +4242,11 @@
                   <a:rPr lang="en-US" dirty="0" smtClean="0"/>
                   <a:t> using stream-network distance</a:t>
                 </a:r>
-                <a:endParaRPr lang="en-US" dirty="0" smtClean="0"/>
               </a:p>
             </p:txBody>
           </p:sp>
         </mc:Choice>
-        <mc:Fallback>
+        <mc:Fallback xmlns="">
           <p:sp>
             <p:nvSpPr>
               <p:cNvPr id="3" name="Content Placeholder 2"/>
@@ -5454,7 +5765,6 @@
               <a:rPr lang="en-US" dirty="0" smtClean="0"/>
               <a:t>…</a:t>
             </a:r>
-            <a:endParaRPr lang="en-US" dirty="0" smtClean="0"/>
           </a:p>
           <a:p>
             <a:endParaRPr lang="en-US" dirty="0" smtClean="0"/>
@@ -5521,8 +5831,8 @@
           </a:p>
         </p:txBody>
       </p:sp>
-      <mc:AlternateContent xmlns:mc="http://schemas.openxmlformats.org/markup-compatibility/2006">
-        <mc:Choice xmlns:a14="http://schemas.microsoft.com/office/drawing/2010/main" Requires="a14">
+      <mc:AlternateContent xmlns:mc="http://schemas.openxmlformats.org/markup-compatibility/2006" xmlns:a14="http://schemas.microsoft.com/office/drawing/2010/main">
+        <mc:Choice Requires="a14">
           <p:sp>
             <p:nvSpPr>
               <p:cNvPr id="3" name="Content Placeholder 2"/>
@@ -5582,7 +5892,6 @@
                   <a:rPr lang="en-US" dirty="0" smtClean="0"/>
                   <a:t> for stream fishes</a:t>
                 </a:r>
-                <a:endParaRPr lang="en-US" dirty="0" smtClean="0"/>
               </a:p>
               <a:p>
                 <a:pPr marL="0" indent="0">
@@ -5625,15 +5934,7 @@
                 <a:pPr lvl="1"/>
                 <a:r>
                   <a:rPr lang="en-US" dirty="0" smtClean="0"/>
-                  <a:t>Assum</a:t>
-                </a:r>
-                <a:r>
-                  <a:rPr lang="en-US" dirty="0" smtClean="0"/>
-                  <a:t>ptions</a:t>
-                </a:r>
-                <a:r>
-                  <a:rPr lang="en-US" dirty="0" smtClean="0"/>
-                  <a:t> </a:t>
+                  <a:t>Assumptions </a:t>
                 </a:r>
               </a:p>
               <a:p>
@@ -5647,18 +5948,13 @@
                 <a:pPr lvl="2"/>
                 <a:r>
                   <a:rPr lang="en-US" dirty="0" smtClean="0"/>
-                  <a:t>Individuals </a:t>
+                  <a:t>Individuals have an equal exposure to each sampling pass</a:t>
                 </a:r>
-                <a:r>
-                  <a:rPr lang="en-US" dirty="0" smtClean="0"/>
-                  <a:t>have an equal exposure to each sampling pass</a:t>
-                </a:r>
-                <a:endParaRPr lang="en-US" dirty="0" smtClean="0"/>
               </a:p>
             </p:txBody>
           </p:sp>
         </mc:Choice>
-        <mc:Fallback>
+        <mc:Fallback xmlns="">
           <p:sp>
             <p:nvSpPr>
               <p:cNvPr id="3" name="Content Placeholder 2"/>
@@ -5696,8 +5992,8 @@
           </p:sp>
         </mc:Fallback>
       </mc:AlternateContent>
-      <mc:AlternateContent xmlns:mc="http://schemas.openxmlformats.org/markup-compatibility/2006">
-        <mc:Choice xmlns:a14="http://schemas.microsoft.com/office/drawing/2010/main" Requires="a14">
+      <mc:AlternateContent xmlns:mc="http://schemas.openxmlformats.org/markup-compatibility/2006" xmlns:a14="http://schemas.microsoft.com/office/drawing/2010/main">
+        <mc:Choice Requires="a14">
           <p:graphicFrame>
             <p:nvGraphicFramePr>
               <p:cNvPr id="4" name="Table 3"/>
@@ -5774,6 +6070,7 @@
                         <a:bodyPr/>
                         <a:lstStyle/>
                         <a:p>
+                          <a:pPr/>
                           <a14:m>
                             <m:oMathPara xmlns:m="http://schemas.openxmlformats.org/officeDocument/2006/math">
                               <m:oMathParaPr>
@@ -5830,13 +6127,7 @@
                                   <a:rPr lang="en-US" b="0" i="1" smtClean="0">
                                     <a:latin typeface="Cambria Math" panose="02040503050406030204" pitchFamily="18" charset="0"/>
                                   </a:rPr>
-                                  <m:t>=1</m:t>
-                                </m:r>
-                                <m:r>
-                                  <a:rPr lang="en-US" b="0" i="1" smtClean="0">
-                                    <a:latin typeface="Cambria Math" panose="02040503050406030204" pitchFamily="18" charset="0"/>
-                                  </a:rPr>
-                                  <m:t>)</m:t>
+                                  <m:t>=1)</m:t>
                                 </m:r>
                               </m:oMath>
                             </m:oMathPara>
@@ -5851,6 +6142,7 @@
                         <a:bodyPr/>
                         <a:lstStyle/>
                         <a:p>
+                          <a:pPr/>
                           <a14:m>
                             <m:oMathPara xmlns:m="http://schemas.openxmlformats.org/officeDocument/2006/math">
                               <m:oMathParaPr>
@@ -5914,6 +6206,7 @@
                         <a:bodyPr/>
                         <a:lstStyle/>
                         <a:p>
+                          <a:pPr/>
                           <a14:m>
                             <m:oMathPara xmlns:m="http://schemas.openxmlformats.org/officeDocument/2006/math">
                               <m:oMathParaPr>
@@ -6007,13 +6300,7 @@
                                   <a:rPr lang="en-US" b="0" i="1" smtClean="0">
                                     <a:latin typeface="Cambria Math" panose="02040503050406030204" pitchFamily="18" charset="0"/>
                                   </a:rPr>
-                                  <m:t>=0</m:t>
-                                </m:r>
-                                <m:r>
-                                  <a:rPr lang="en-US" b="0" i="1" smtClean="0">
-                                    <a:latin typeface="Cambria Math" panose="02040503050406030204" pitchFamily="18" charset="0"/>
-                                  </a:rPr>
-                                  <m:t>)</m:t>
+                                  <m:t>=0)</m:t>
                                 </m:r>
                               </m:oMath>
                             </m:oMathPara>
@@ -6223,13 +6510,7 @@
                                   <a:rPr lang="en-US" b="0" i="1" smtClean="0">
                                     <a:latin typeface="Cambria Math" panose="02040503050406030204" pitchFamily="18" charset="0"/>
                                   </a:rPr>
-                                  <m:t>=0</m:t>
-                                </m:r>
-                                <m:r>
-                                  <a:rPr lang="en-US" b="0" i="1" smtClean="0">
-                                    <a:latin typeface="Cambria Math" panose="02040503050406030204" pitchFamily="18" charset="0"/>
-                                  </a:rPr>
-                                  <m:t>,</m:t>
+                                  <m:t>=0,</m:t>
                                 </m:r>
                                 <m:sSub>
                                   <m:sSubPr>
@@ -6405,7 +6686,7 @@
             </a:graphic>
           </p:graphicFrame>
         </mc:Choice>
-        <mc:Fallback>
+        <mc:Fallback xmlns="">
           <p:graphicFrame>
             <p:nvGraphicFramePr>
               <p:cNvPr id="4" name="Table 3"/>
@@ -6605,8 +6886,8 @@
           </p:graphicFrame>
         </mc:Fallback>
       </mc:AlternateContent>
-      <mc:AlternateContent xmlns:mc="http://schemas.openxmlformats.org/markup-compatibility/2006">
-        <mc:Choice xmlns:a14="http://schemas.microsoft.com/office/drawing/2010/main" Requires="a14">
+      <mc:AlternateContent xmlns:mc="http://schemas.openxmlformats.org/markup-compatibility/2006" xmlns:a14="http://schemas.microsoft.com/office/drawing/2010/main">
+        <mc:Choice Requires="a14">
           <p:sp>
             <p:nvSpPr>
               <p:cNvPr id="5" name="TextBox 4"/>
@@ -6698,7 +6979,7 @@
             </p:txBody>
           </p:sp>
         </mc:Choice>
-        <mc:Fallback>
+        <mc:Fallback xmlns="">
           <p:sp>
             <p:nvSpPr>
               <p:cNvPr id="5" name="TextBox 4"/>
@@ -6809,6 +7090,1159 @@
         </p:nvSpPr>
         <p:spPr>
           <a:xfrm>
+            <a:off x="76201" y="838200"/>
+            <a:ext cx="4375030" cy="5943600"/>
+          </a:xfrm>
+        </p:spPr>
+        <p:txBody>
+          <a:bodyPr>
+            <a:normAutofit/>
+          </a:bodyPr>
+          <a:lstStyle/>
+          <a:p>
+            <a:pPr marL="0" indent="0">
+              <a:buNone/>
+            </a:pPr>
+            <a:r>
+              <a:rPr lang="en-US" dirty="0" smtClean="0"/>
+              <a:t>Triple-pass </a:t>
+            </a:r>
+            <a:r>
+              <a:rPr lang="en-US" dirty="0" smtClean="0"/>
+              <a:t>depletion</a:t>
+            </a:r>
+            <a:endParaRPr lang="en-US" dirty="0" smtClean="0"/>
+          </a:p>
+        </p:txBody>
+      </p:sp>
+      <mc:AlternateContent xmlns:mc="http://schemas.openxmlformats.org/markup-compatibility/2006" xmlns:a14="http://schemas.microsoft.com/office/drawing/2010/main">
+        <mc:Choice Requires="a14">
+          <p:graphicFrame>
+            <p:nvGraphicFramePr>
+              <p:cNvPr id="4" name="Table 3"/>
+              <p:cNvGraphicFramePr>
+                <a:graphicFrameLocks noGrp="1"/>
+              </p:cNvGraphicFramePr>
+              <p:nvPr/>
+            </p:nvGraphicFramePr>
+            <p:xfrm>
+              <a:off x="4451231" y="1903563"/>
+              <a:ext cx="4646762" cy="2530416"/>
+            </p:xfrm>
+            <a:graphic>
+              <a:graphicData uri="http://schemas.openxmlformats.org/drawingml/2006/table">
+                <a:tbl>
+                  <a:tblPr firstRow="1" bandRow="1">
+                    <a:tableStyleId>{5C22544A-7EE6-4342-B048-85BDC9FD1C3A}</a:tableStyleId>
+                  </a:tblPr>
+                  <a:tblGrid>
+                    <a:gridCol w="2544792">
+                      <a:extLst>
+                        <a:ext uri="{9D8B030D-6E8A-4147-A177-3AD203B41FA5}">
+                          <a16:colId xmlns:a16="http://schemas.microsoft.com/office/drawing/2014/main" val="1685379409"/>
+                        </a:ext>
+                      </a:extLst>
+                    </a:gridCol>
+                    <a:gridCol w="2101970">
+                      <a:extLst>
+                        <a:ext uri="{9D8B030D-6E8A-4147-A177-3AD203B41FA5}">
+                          <a16:colId xmlns:a16="http://schemas.microsoft.com/office/drawing/2014/main" val="2760055028"/>
+                        </a:ext>
+                      </a:extLst>
+                    </a:gridCol>
+                  </a:tblGrid>
+                  <a:tr h="625128">
+                    <a:tc>
+                      <a:txBody>
+                        <a:bodyPr/>
+                        <a:lstStyle/>
+                        <a:p>
+                          <a:pPr algn="ctr"/>
+                          <a:r>
+                            <a:rPr lang="en-US" dirty="0" smtClean="0"/>
+                            <a:t>Event</a:t>
+                          </a:r>
+                        </a:p>
+                      </a:txBody>
+                      <a:tcPr/>
+                    </a:tc>
+                    <a:tc>
+                      <a:txBody>
+                        <a:bodyPr/>
+                        <a:lstStyle/>
+                        <a:p>
+                          <a:pPr algn="ctr"/>
+                          <a:r>
+                            <a:rPr lang="en-US" dirty="0" smtClean="0"/>
+                            <a:t>Probability</a:t>
+                          </a:r>
+                          <a:endParaRPr lang="en-GB" dirty="0"/>
+                        </a:p>
+                      </a:txBody>
+                      <a:tcPr/>
+                    </a:tc>
+                    <a:extLst>
+                      <a:ext uri="{0D108BD9-81ED-4DB2-BD59-A6C34878D82A}">
+                        <a16:rowId xmlns:a16="http://schemas.microsoft.com/office/drawing/2014/main" val="3488912155"/>
+                      </a:ext>
+                    </a:extLst>
+                  </a:tr>
+                  <a:tr h="625128">
+                    <a:tc>
+                      <a:txBody>
+                        <a:bodyPr/>
+                        <a:lstStyle/>
+                        <a:p>
+                          <a:pPr/>
+                          <a14:m>
+                            <m:oMathPara xmlns:m="http://schemas.openxmlformats.org/officeDocument/2006/math">
+                              <m:oMathParaPr>
+                                <m:jc m:val="centerGroup"/>
+                              </m:oMathParaPr>
+                              <m:oMath xmlns:m="http://schemas.openxmlformats.org/officeDocument/2006/math">
+                                <m:r>
+                                  <m:rPr>
+                                    <m:sty m:val="p"/>
+                                  </m:rPr>
+                                  <a:rPr lang="en-US" b="0" i="0" smtClean="0">
+                                    <a:latin typeface="Cambria Math" panose="02040503050406030204" pitchFamily="18" charset="0"/>
+                                  </a:rPr>
+                                  <m:t>Pr</m:t>
+                                </m:r>
+                                <m:r>
+                                  <a:rPr lang="en-US" b="0" i="1" smtClean="0">
+                                    <a:latin typeface="Cambria Math" panose="02040503050406030204" pitchFamily="18" charset="0"/>
+                                  </a:rPr>
+                                  <m:t>⁡(</m:t>
+                                </m:r>
+                                <m:sSub>
+                                  <m:sSubPr>
+                                    <m:ctrlPr>
+                                      <a:rPr lang="en-US" b="0" i="1" smtClean="0">
+                                        <a:latin typeface="Cambria Math" panose="02040503050406030204" pitchFamily="18" charset="0"/>
+                                      </a:rPr>
+                                    </m:ctrlPr>
+                                  </m:sSubPr>
+                                  <m:e>
+                                    <m:r>
+                                      <a:rPr lang="en-US" b="0" i="1" smtClean="0">
+                                        <a:latin typeface="Cambria Math" panose="02040503050406030204" pitchFamily="18" charset="0"/>
+                                      </a:rPr>
+                                      <m:t>𝐷</m:t>
+                                    </m:r>
+                                  </m:e>
+                                  <m:sub>
+                                    <m:r>
+                                      <a:rPr lang="en-US" b="0" i="1" smtClean="0">
+                                        <a:latin typeface="Cambria Math" panose="02040503050406030204" pitchFamily="18" charset="0"/>
+                                      </a:rPr>
+                                      <m:t>𝑧</m:t>
+                                    </m:r>
+                                    <m:r>
+                                      <a:rPr lang="en-US" b="0" i="1" smtClean="0">
+                                        <a:latin typeface="Cambria Math" panose="02040503050406030204" pitchFamily="18" charset="0"/>
+                                      </a:rPr>
+                                      <m:t>=1</m:t>
+                                    </m:r>
+                                  </m:sub>
+                                </m:sSub>
+                                <m:r>
+                                  <a:rPr lang="en-US" b="0" i="1" smtClean="0">
+                                    <a:latin typeface="Cambria Math" panose="02040503050406030204" pitchFamily="18" charset="0"/>
+                                  </a:rPr>
+                                  <m:t>=1)</m:t>
+                                </m:r>
+                              </m:oMath>
+                            </m:oMathPara>
+                          </a14:m>
+                          <a:endParaRPr lang="en-GB" dirty="0"/>
+                        </a:p>
+                      </a:txBody>
+                      <a:tcPr/>
+                    </a:tc>
+                    <a:tc>
+                      <a:txBody>
+                        <a:bodyPr/>
+                        <a:lstStyle/>
+                        <a:p>
+                          <a:pPr/>
+                          <a14:m>
+                            <m:oMathPara xmlns:m="http://schemas.openxmlformats.org/officeDocument/2006/math">
+                              <m:oMathParaPr>
+                                <m:jc m:val="centerGroup"/>
+                              </m:oMathParaPr>
+                              <m:oMath xmlns:m="http://schemas.openxmlformats.org/officeDocument/2006/math">
+                                <m:sSub>
+                                  <m:sSubPr>
+                                    <m:ctrlPr>
+                                      <a:rPr lang="en-US" b="0" i="1" smtClean="0">
+                                        <a:latin typeface="Cambria Math" panose="02040503050406030204" pitchFamily="18" charset="0"/>
+                                      </a:rPr>
+                                    </m:ctrlPr>
+                                  </m:sSubPr>
+                                  <m:e>
+                                    <m:r>
+                                      <a:rPr lang="en-US" b="0" i="1" smtClean="0">
+                                        <a:latin typeface="Cambria Math" panose="02040503050406030204" pitchFamily="18" charset="0"/>
+                                      </a:rPr>
+                                      <m:t>𝑝</m:t>
+                                    </m:r>
+                                  </m:e>
+                                  <m:sub>
+                                    <m:r>
+                                      <a:rPr lang="en-US" b="0" i="1" smtClean="0">
+                                        <a:latin typeface="Cambria Math" panose="02040503050406030204" pitchFamily="18" charset="0"/>
+                                      </a:rPr>
+                                      <m:t>1</m:t>
+                                    </m:r>
+                                  </m:sub>
+                                </m:sSub>
+                                <m:r>
+                                  <a:rPr lang="en-US" b="0" i="0" smtClean="0">
+                                    <a:latin typeface="Cambria Math" panose="02040503050406030204" pitchFamily="18" charset="0"/>
+                                  </a:rPr>
+                                  <m:t>=</m:t>
+                                </m:r>
+                                <m:r>
+                                  <a:rPr lang="en-US" b="0" i="1" smtClean="0">
+                                    <a:latin typeface="Cambria Math" panose="02040503050406030204" pitchFamily="18" charset="0"/>
+                                  </a:rPr>
+                                  <m:t>𝑝</m:t>
+                                </m:r>
+                              </m:oMath>
+                            </m:oMathPara>
+                          </a14:m>
+                          <a:endParaRPr lang="en-GB" dirty="0"/>
+                        </a:p>
+                      </a:txBody>
+                      <a:tcPr/>
+                    </a:tc>
+                    <a:extLst>
+                      <a:ext uri="{0D108BD9-81ED-4DB2-BD59-A6C34878D82A}">
+                        <a16:rowId xmlns:a16="http://schemas.microsoft.com/office/drawing/2014/main" val="3489489442"/>
+                      </a:ext>
+                    </a:extLst>
+                  </a:tr>
+                  <a:tr h="625128">
+                    <a:tc>
+                      <a:txBody>
+                        <a:bodyPr/>
+                        <a:lstStyle/>
+                        <a:p>
+                          <a:pPr/>
+                          <a14:m>
+                            <m:oMathPara xmlns:m="http://schemas.openxmlformats.org/officeDocument/2006/math">
+                              <m:oMathParaPr>
+                                <m:jc m:val="centerGroup"/>
+                              </m:oMathParaPr>
+                              <m:oMath xmlns:m="http://schemas.openxmlformats.org/officeDocument/2006/math">
+                                <m:r>
+                                  <m:rPr>
+                                    <m:sty m:val="p"/>
+                                  </m:rPr>
+                                  <a:rPr lang="en-US" b="0" i="0" smtClean="0">
+                                    <a:latin typeface="Cambria Math" panose="02040503050406030204" pitchFamily="18" charset="0"/>
+                                  </a:rPr>
+                                  <m:t>Pr</m:t>
+                                </m:r>
+                                <m:r>
+                                  <a:rPr lang="en-US" b="0" i="1" smtClean="0">
+                                    <a:latin typeface="Cambria Math" panose="02040503050406030204" pitchFamily="18" charset="0"/>
+                                  </a:rPr>
+                                  <m:t>⁡(</m:t>
+                                </m:r>
+                                <m:sSub>
+                                  <m:sSubPr>
+                                    <m:ctrlPr>
+                                      <a:rPr lang="en-US" b="0" i="1" smtClean="0">
+                                        <a:latin typeface="Cambria Math" panose="02040503050406030204" pitchFamily="18" charset="0"/>
+                                      </a:rPr>
+                                    </m:ctrlPr>
+                                  </m:sSubPr>
+                                  <m:e>
+                                    <m:r>
+                                      <a:rPr lang="en-US" b="0" i="1" smtClean="0">
+                                        <a:latin typeface="Cambria Math" panose="02040503050406030204" pitchFamily="18" charset="0"/>
+                                      </a:rPr>
+                                      <m:t>𝐷</m:t>
+                                    </m:r>
+                                  </m:e>
+                                  <m:sub>
+                                    <m:r>
+                                      <a:rPr lang="en-US" b="0" i="1" smtClean="0">
+                                        <a:latin typeface="Cambria Math" panose="02040503050406030204" pitchFamily="18" charset="0"/>
+                                      </a:rPr>
+                                      <m:t>𝑧</m:t>
+                                    </m:r>
+                                    <m:r>
+                                      <a:rPr lang="en-US" b="0" i="1" smtClean="0">
+                                        <a:latin typeface="Cambria Math" panose="02040503050406030204" pitchFamily="18" charset="0"/>
+                                      </a:rPr>
+                                      <m:t>=2</m:t>
+                                    </m:r>
+                                  </m:sub>
+                                </m:sSub>
+                                <m:r>
+                                  <a:rPr lang="en-US" b="0" i="1" smtClean="0">
+                                    <a:latin typeface="Cambria Math" panose="02040503050406030204" pitchFamily="18" charset="0"/>
+                                  </a:rPr>
+                                  <m:t>=1|</m:t>
+                                </m:r>
+                                <m:sSub>
+                                  <m:sSubPr>
+                                    <m:ctrlPr>
+                                      <a:rPr lang="en-US" b="0" i="1" smtClean="0">
+                                        <a:latin typeface="Cambria Math" panose="02040503050406030204" pitchFamily="18" charset="0"/>
+                                      </a:rPr>
+                                    </m:ctrlPr>
+                                  </m:sSubPr>
+                                  <m:e>
+                                    <m:r>
+                                      <a:rPr lang="en-US" b="0" i="1" smtClean="0">
+                                        <a:latin typeface="Cambria Math" panose="02040503050406030204" pitchFamily="18" charset="0"/>
+                                      </a:rPr>
+                                      <m:t>𝐷</m:t>
+                                    </m:r>
+                                  </m:e>
+                                  <m:sub>
+                                    <m:r>
+                                      <a:rPr lang="en-US" b="0" i="1" smtClean="0">
+                                        <a:latin typeface="Cambria Math" panose="02040503050406030204" pitchFamily="18" charset="0"/>
+                                      </a:rPr>
+                                      <m:t>𝑧</m:t>
+                                    </m:r>
+                                    <m:r>
+                                      <a:rPr lang="en-US" b="0" i="1" smtClean="0">
+                                        <a:latin typeface="Cambria Math" panose="02040503050406030204" pitchFamily="18" charset="0"/>
+                                      </a:rPr>
+                                      <m:t>=1</m:t>
+                                    </m:r>
+                                  </m:sub>
+                                </m:sSub>
+                                <m:r>
+                                  <a:rPr lang="en-US" b="0" i="1" smtClean="0">
+                                    <a:latin typeface="Cambria Math" panose="02040503050406030204" pitchFamily="18" charset="0"/>
+                                  </a:rPr>
+                                  <m:t>=0)</m:t>
+                                </m:r>
+                              </m:oMath>
+                            </m:oMathPara>
+                          </a14:m>
+                          <a:endParaRPr lang="en-GB" dirty="0"/>
+                        </a:p>
+                      </a:txBody>
+                      <a:tcPr/>
+                    </a:tc>
+                    <a:tc>
+                      <a:txBody>
+                        <a:bodyPr/>
+                        <a:lstStyle/>
+                        <a:p>
+                          <a:pPr marL="0" marR="0" lvl="0" indent="0" algn="l" defTabSz="914400" rtl="0" eaLnBrk="1" fontAlgn="auto" latinLnBrk="0" hangingPunct="1">
+                            <a:lnSpc>
+                              <a:spcPct val="100000"/>
+                            </a:lnSpc>
+                            <a:spcBef>
+                              <a:spcPts val="0"/>
+                            </a:spcBef>
+                            <a:spcAft>
+                              <a:spcPts val="0"/>
+                            </a:spcAft>
+                            <a:buClrTx/>
+                            <a:buSzTx/>
+                            <a:buFontTx/>
+                            <a:buNone/>
+                            <a:tabLst/>
+                            <a:defRPr/>
+                          </a:pPr>
+                          <a14:m>
+                            <m:oMathPara xmlns:m="http://schemas.openxmlformats.org/officeDocument/2006/math">
+                              <m:oMathParaPr>
+                                <m:jc m:val="centerGroup"/>
+                              </m:oMathParaPr>
+                              <m:oMath xmlns:m="http://schemas.openxmlformats.org/officeDocument/2006/math">
+                                <m:sSub>
+                                  <m:sSubPr>
+                                    <m:ctrlPr>
+                                      <a:rPr lang="en-US" b="0" i="1" smtClean="0">
+                                        <a:latin typeface="Cambria Math" panose="02040503050406030204" pitchFamily="18" charset="0"/>
+                                      </a:rPr>
+                                    </m:ctrlPr>
+                                  </m:sSubPr>
+                                  <m:e>
+                                    <m:r>
+                                      <a:rPr lang="en-US" b="0" i="1" smtClean="0">
+                                        <a:latin typeface="Cambria Math" panose="02040503050406030204" pitchFamily="18" charset="0"/>
+                                      </a:rPr>
+                                      <m:t>𝑝</m:t>
+                                    </m:r>
+                                  </m:e>
+                                  <m:sub>
+                                    <m:r>
+                                      <a:rPr lang="en-US" b="0" i="1" smtClean="0">
+                                        <a:latin typeface="Cambria Math" panose="02040503050406030204" pitchFamily="18" charset="0"/>
+                                      </a:rPr>
+                                      <m:t>𝑧</m:t>
+                                    </m:r>
+                                  </m:sub>
+                                </m:sSub>
+                                <m:r>
+                                  <a:rPr lang="en-US" b="0" i="0" smtClean="0">
+                                    <a:latin typeface="Cambria Math" panose="02040503050406030204" pitchFamily="18" charset="0"/>
+                                  </a:rPr>
+                                  <m:t>=</m:t>
+                                </m:r>
+                                <m:r>
+                                  <a:rPr lang="en-US" b="0" i="1" smtClean="0">
+                                    <a:latin typeface="Cambria Math" panose="02040503050406030204" pitchFamily="18" charset="0"/>
+                                  </a:rPr>
+                                  <m:t>𝑝</m:t>
+                                </m:r>
+                                <m:r>
+                                  <a:rPr lang="en-US" b="0" i="1" smtClean="0">
+                                    <a:latin typeface="Cambria Math" panose="02040503050406030204" pitchFamily="18" charset="0"/>
+                                  </a:rPr>
+                                  <m:t>(1−</m:t>
+                                </m:r>
+                                <m:r>
+                                  <a:rPr lang="en-US" b="0" i="1" smtClean="0">
+                                    <a:latin typeface="Cambria Math" panose="02040503050406030204" pitchFamily="18" charset="0"/>
+                                  </a:rPr>
+                                  <m:t>𝑝</m:t>
+                                </m:r>
+                                <m:r>
+                                  <a:rPr lang="en-US" b="0" i="1" smtClean="0">
+                                    <a:latin typeface="Cambria Math" panose="02040503050406030204" pitchFamily="18" charset="0"/>
+                                  </a:rPr>
+                                  <m:t>)</m:t>
+                                </m:r>
+                              </m:oMath>
+                            </m:oMathPara>
+                          </a14:m>
+                          <a:endParaRPr lang="en-GB" dirty="0"/>
+                        </a:p>
+                        <a:p>
+                          <a:endParaRPr lang="en-GB" dirty="0"/>
+                        </a:p>
+                      </a:txBody>
+                      <a:tcPr/>
+                    </a:tc>
+                    <a:extLst>
+                      <a:ext uri="{0D108BD9-81ED-4DB2-BD59-A6C34878D82A}">
+                        <a16:rowId xmlns:a16="http://schemas.microsoft.com/office/drawing/2014/main" val="3820406972"/>
+                      </a:ext>
+                    </a:extLst>
+                  </a:tr>
+                  <a:tr h="625128">
+                    <a:tc>
+                      <a:txBody>
+                        <a:bodyPr/>
+                        <a:lstStyle/>
+                        <a:p>
+                          <a:pPr/>
+                          <a14:m>
+                            <m:oMathPara xmlns:m="http://schemas.openxmlformats.org/officeDocument/2006/math">
+                              <m:oMathParaPr>
+                                <m:jc m:val="centerGroup"/>
+                              </m:oMathParaPr>
+                              <m:oMath xmlns:m="http://schemas.openxmlformats.org/officeDocument/2006/math">
+                                <m:r>
+                                  <m:rPr>
+                                    <m:sty m:val="p"/>
+                                  </m:rPr>
+                                  <a:rPr lang="en-US" b="0" i="0" smtClean="0">
+                                    <a:latin typeface="Cambria Math" panose="02040503050406030204" pitchFamily="18" charset="0"/>
+                                  </a:rPr>
+                                  <m:t>Pr</m:t>
+                                </m:r>
+                                <m:r>
+                                  <a:rPr lang="en-US" b="0" i="1" smtClean="0">
+                                    <a:latin typeface="Cambria Math" panose="02040503050406030204" pitchFamily="18" charset="0"/>
+                                  </a:rPr>
+                                  <m:t>⁡(</m:t>
+                                </m:r>
+                                <m:sSub>
+                                  <m:sSubPr>
+                                    <m:ctrlPr>
+                                      <a:rPr lang="en-US" b="0" i="1" smtClean="0">
+                                        <a:latin typeface="Cambria Math" panose="02040503050406030204" pitchFamily="18" charset="0"/>
+                                      </a:rPr>
+                                    </m:ctrlPr>
+                                  </m:sSubPr>
+                                  <m:e>
+                                    <m:r>
+                                      <a:rPr lang="en-US" b="0" i="1" smtClean="0">
+                                        <a:latin typeface="Cambria Math" panose="02040503050406030204" pitchFamily="18" charset="0"/>
+                                      </a:rPr>
+                                      <m:t>𝐷</m:t>
+                                    </m:r>
+                                  </m:e>
+                                  <m:sub>
+                                    <m:r>
+                                      <a:rPr lang="en-US" b="0" i="1" smtClean="0">
+                                        <a:latin typeface="Cambria Math" panose="02040503050406030204" pitchFamily="18" charset="0"/>
+                                      </a:rPr>
+                                      <m:t>𝑧</m:t>
+                                    </m:r>
+                                    <m:r>
+                                      <a:rPr lang="en-US" b="0" i="1" smtClean="0">
+                                        <a:latin typeface="Cambria Math" panose="02040503050406030204" pitchFamily="18" charset="0"/>
+                                      </a:rPr>
+                                      <m:t>=3</m:t>
+                                    </m:r>
+                                  </m:sub>
+                                </m:sSub>
+                                <m:r>
+                                  <a:rPr lang="en-US" b="0" i="1" smtClean="0">
+                                    <a:latin typeface="Cambria Math" panose="02040503050406030204" pitchFamily="18" charset="0"/>
+                                  </a:rPr>
+                                  <m:t>=1|</m:t>
+                                </m:r>
+                                <m:sSub>
+                                  <m:sSubPr>
+                                    <m:ctrlPr>
+                                      <a:rPr lang="en-US" b="0" i="1" smtClean="0">
+                                        <a:latin typeface="Cambria Math" panose="02040503050406030204" pitchFamily="18" charset="0"/>
+                                      </a:rPr>
+                                    </m:ctrlPr>
+                                  </m:sSubPr>
+                                  <m:e>
+                                    <m:r>
+                                      <a:rPr lang="en-US" b="0" i="1" smtClean="0">
+                                        <a:latin typeface="Cambria Math" panose="02040503050406030204" pitchFamily="18" charset="0"/>
+                                      </a:rPr>
+                                      <m:t>𝐷</m:t>
+                                    </m:r>
+                                  </m:e>
+                                  <m:sub>
+                                    <m:r>
+                                      <a:rPr lang="en-US" b="0" i="1" smtClean="0">
+                                        <a:latin typeface="Cambria Math" panose="02040503050406030204" pitchFamily="18" charset="0"/>
+                                      </a:rPr>
+                                      <m:t>𝑧</m:t>
+                                    </m:r>
+                                    <m:r>
+                                      <a:rPr lang="en-US" b="0" i="1" smtClean="0">
+                                        <a:latin typeface="Cambria Math" panose="02040503050406030204" pitchFamily="18" charset="0"/>
+                                      </a:rPr>
+                                      <m:t>=1</m:t>
+                                    </m:r>
+                                  </m:sub>
+                                </m:sSub>
+                                <m:r>
+                                  <a:rPr lang="en-US" b="0" i="1" smtClean="0">
+                                    <a:latin typeface="Cambria Math" panose="02040503050406030204" pitchFamily="18" charset="0"/>
+                                  </a:rPr>
+                                  <m:t>=0,</m:t>
+                                </m:r>
+                                <m:sSub>
+                                  <m:sSubPr>
+                                    <m:ctrlPr>
+                                      <a:rPr lang="en-US" b="0" i="1" smtClean="0">
+                                        <a:latin typeface="Cambria Math" panose="02040503050406030204" pitchFamily="18" charset="0"/>
+                                      </a:rPr>
+                                    </m:ctrlPr>
+                                  </m:sSubPr>
+                                  <m:e>
+                                    <m:r>
+                                      <a:rPr lang="en-US" b="0" i="1" smtClean="0">
+                                        <a:latin typeface="Cambria Math" panose="02040503050406030204" pitchFamily="18" charset="0"/>
+                                      </a:rPr>
+                                      <m:t>𝐷</m:t>
+                                    </m:r>
+                                  </m:e>
+                                  <m:sub>
+                                    <m:r>
+                                      <a:rPr lang="en-US" b="0" i="1" smtClean="0">
+                                        <a:latin typeface="Cambria Math" panose="02040503050406030204" pitchFamily="18" charset="0"/>
+                                      </a:rPr>
+                                      <m:t>𝑧</m:t>
+                                    </m:r>
+                                    <m:r>
+                                      <a:rPr lang="en-US" b="0" i="1" smtClean="0">
+                                        <a:latin typeface="Cambria Math" panose="02040503050406030204" pitchFamily="18" charset="0"/>
+                                      </a:rPr>
+                                      <m:t>=2</m:t>
+                                    </m:r>
+                                  </m:sub>
+                                </m:sSub>
+                                <m:r>
+                                  <a:rPr lang="en-US" b="0" i="1" smtClean="0">
+                                    <a:latin typeface="Cambria Math" panose="02040503050406030204" pitchFamily="18" charset="0"/>
+                                  </a:rPr>
+                                  <m:t>=0)</m:t>
+                                </m:r>
+                              </m:oMath>
+                            </m:oMathPara>
+                          </a14:m>
+                          <a:endParaRPr lang="en-GB" dirty="0"/>
+                        </a:p>
+                      </a:txBody>
+                      <a:tcPr/>
+                    </a:tc>
+                    <a:tc>
+                      <a:txBody>
+                        <a:bodyPr/>
+                        <a:lstStyle/>
+                        <a:p>
+                          <a:pPr marL="0" marR="0" lvl="0" indent="0" algn="l" defTabSz="914400" rtl="0" eaLnBrk="1" fontAlgn="auto" latinLnBrk="0" hangingPunct="1">
+                            <a:lnSpc>
+                              <a:spcPct val="100000"/>
+                            </a:lnSpc>
+                            <a:spcBef>
+                              <a:spcPts val="0"/>
+                            </a:spcBef>
+                            <a:spcAft>
+                              <a:spcPts val="0"/>
+                            </a:spcAft>
+                            <a:buClrTx/>
+                            <a:buSzTx/>
+                            <a:buFontTx/>
+                            <a:buNone/>
+                            <a:tabLst/>
+                            <a:defRPr/>
+                          </a:pPr>
+                          <a14:m>
+                            <m:oMathPara xmlns:m="http://schemas.openxmlformats.org/officeDocument/2006/math">
+                              <m:oMathParaPr>
+                                <m:jc m:val="centerGroup"/>
+                              </m:oMathParaPr>
+                              <m:oMath xmlns:m="http://schemas.openxmlformats.org/officeDocument/2006/math">
+                                <m:sSub>
+                                  <m:sSubPr>
+                                    <m:ctrlPr>
+                                      <a:rPr lang="en-US" b="0" i="1" smtClean="0">
+                                        <a:latin typeface="Cambria Math" panose="02040503050406030204" pitchFamily="18" charset="0"/>
+                                      </a:rPr>
+                                    </m:ctrlPr>
+                                  </m:sSubPr>
+                                  <m:e>
+                                    <m:r>
+                                      <a:rPr lang="en-US" b="0" i="1" smtClean="0">
+                                        <a:latin typeface="Cambria Math" panose="02040503050406030204" pitchFamily="18" charset="0"/>
+                                      </a:rPr>
+                                      <m:t>𝑝</m:t>
+                                    </m:r>
+                                  </m:e>
+                                  <m:sub>
+                                    <m:r>
+                                      <a:rPr lang="en-US" b="0" i="1" smtClean="0">
+                                        <a:latin typeface="Cambria Math" panose="02040503050406030204" pitchFamily="18" charset="0"/>
+                                      </a:rPr>
+                                      <m:t>𝑧</m:t>
+                                    </m:r>
+                                  </m:sub>
+                                </m:sSub>
+                                <m:r>
+                                  <a:rPr lang="en-US" b="0" i="0" smtClean="0">
+                                    <a:latin typeface="Cambria Math" panose="02040503050406030204" pitchFamily="18" charset="0"/>
+                                  </a:rPr>
+                                  <m:t>=</m:t>
+                                </m:r>
+                                <m:r>
+                                  <a:rPr lang="en-US" b="0" i="1" smtClean="0">
+                                    <a:latin typeface="Cambria Math" panose="02040503050406030204" pitchFamily="18" charset="0"/>
+                                  </a:rPr>
+                                  <m:t>𝑝</m:t>
+                                </m:r>
+                                <m:sSup>
+                                  <m:sSupPr>
+                                    <m:ctrlPr>
+                                      <a:rPr lang="en-US" b="0" i="1" smtClean="0">
+                                        <a:latin typeface="Cambria Math" panose="02040503050406030204" pitchFamily="18" charset="0"/>
+                                      </a:rPr>
+                                    </m:ctrlPr>
+                                  </m:sSupPr>
+                                  <m:e>
+                                    <m:d>
+                                      <m:dPr>
+                                        <m:ctrlPr>
+                                          <a:rPr lang="en-US" b="0" i="1" smtClean="0">
+                                            <a:latin typeface="Cambria Math" panose="02040503050406030204" pitchFamily="18" charset="0"/>
+                                          </a:rPr>
+                                        </m:ctrlPr>
+                                      </m:dPr>
+                                      <m:e>
+                                        <m:r>
+                                          <a:rPr lang="en-US" b="0" i="1" smtClean="0">
+                                            <a:latin typeface="Cambria Math" panose="02040503050406030204" pitchFamily="18" charset="0"/>
+                                          </a:rPr>
+                                          <m:t>1−</m:t>
+                                        </m:r>
+                                        <m:r>
+                                          <a:rPr lang="en-US" b="0" i="1" smtClean="0">
+                                            <a:latin typeface="Cambria Math" panose="02040503050406030204" pitchFamily="18" charset="0"/>
+                                          </a:rPr>
+                                          <m:t>𝑝</m:t>
+                                        </m:r>
+                                      </m:e>
+                                    </m:d>
+                                  </m:e>
+                                  <m:sup>
+                                    <m:r>
+                                      <a:rPr lang="en-US" b="0" i="1" smtClean="0">
+                                        <a:latin typeface="Cambria Math" panose="02040503050406030204" pitchFamily="18" charset="0"/>
+                                      </a:rPr>
+                                      <m:t>2</m:t>
+                                    </m:r>
+                                  </m:sup>
+                                </m:sSup>
+                              </m:oMath>
+                            </m:oMathPara>
+                          </a14:m>
+                          <a:endParaRPr lang="en-GB" dirty="0"/>
+                        </a:p>
+                        <a:p>
+                          <a:endParaRPr lang="en-GB" dirty="0"/>
+                        </a:p>
+                      </a:txBody>
+                      <a:tcPr/>
+                    </a:tc>
+                    <a:extLst>
+                      <a:ext uri="{0D108BD9-81ED-4DB2-BD59-A6C34878D82A}">
+                        <a16:rowId xmlns:a16="http://schemas.microsoft.com/office/drawing/2014/main" val="1979163642"/>
+                      </a:ext>
+                    </a:extLst>
+                  </a:tr>
+                </a:tbl>
+              </a:graphicData>
+            </a:graphic>
+          </p:graphicFrame>
+        </mc:Choice>
+        <mc:Fallback xmlns="">
+          <p:graphicFrame>
+            <p:nvGraphicFramePr>
+              <p:cNvPr id="4" name="Table 3"/>
+              <p:cNvGraphicFramePr>
+                <a:graphicFrameLocks noGrp="1"/>
+              </p:cNvGraphicFramePr>
+              <p:nvPr/>
+            </p:nvGraphicFramePr>
+            <p:xfrm>
+              <a:off x="4451231" y="1903563"/>
+              <a:ext cx="4646762" cy="2530416"/>
+            </p:xfrm>
+            <a:graphic>
+              <a:graphicData uri="http://schemas.openxmlformats.org/drawingml/2006/table">
+                <a:tbl>
+                  <a:tblPr firstRow="1" bandRow="1">
+                    <a:tableStyleId>{5C22544A-7EE6-4342-B048-85BDC9FD1C3A}</a:tableStyleId>
+                  </a:tblPr>
+                  <a:tblGrid>
+                    <a:gridCol w="2544792">
+                      <a:extLst>
+                        <a:ext uri="{9D8B030D-6E8A-4147-A177-3AD203B41FA5}">
+                          <a16:colId xmlns:a16="http://schemas.microsoft.com/office/drawing/2014/main" val="1685379409"/>
+                        </a:ext>
+                      </a:extLst>
+                    </a:gridCol>
+                    <a:gridCol w="2101970">
+                      <a:extLst>
+                        <a:ext uri="{9D8B030D-6E8A-4147-A177-3AD203B41FA5}">
+                          <a16:colId xmlns:a16="http://schemas.microsoft.com/office/drawing/2014/main" val="2760055028"/>
+                        </a:ext>
+                      </a:extLst>
+                    </a:gridCol>
+                  </a:tblGrid>
+                  <a:tr h="625128">
+                    <a:tc>
+                      <a:txBody>
+                        <a:bodyPr/>
+                        <a:lstStyle/>
+                        <a:p>
+                          <a:pPr algn="ctr"/>
+                          <a:r>
+                            <a:rPr lang="en-US" dirty="0" smtClean="0"/>
+                            <a:t>Event</a:t>
+                          </a:r>
+                        </a:p>
+                      </a:txBody>
+                      <a:tcPr/>
+                    </a:tc>
+                    <a:tc>
+                      <a:txBody>
+                        <a:bodyPr/>
+                        <a:lstStyle/>
+                        <a:p>
+                          <a:pPr algn="ctr"/>
+                          <a:r>
+                            <a:rPr lang="en-US" dirty="0" smtClean="0"/>
+                            <a:t>Probability</a:t>
+                          </a:r>
+                          <a:endParaRPr lang="en-GB" dirty="0"/>
+                        </a:p>
+                      </a:txBody>
+                      <a:tcPr/>
+                    </a:tc>
+                    <a:extLst>
+                      <a:ext uri="{0D108BD9-81ED-4DB2-BD59-A6C34878D82A}">
+                        <a16:rowId xmlns:a16="http://schemas.microsoft.com/office/drawing/2014/main" val="3488912155"/>
+                      </a:ext>
+                    </a:extLst>
+                  </a:tr>
+                  <a:tr h="625128">
+                    <a:tc>
+                      <a:txBody>
+                        <a:bodyPr/>
+                        <a:lstStyle/>
+                        <a:p>
+                          <a:endParaRPr lang="en-US"/>
+                        </a:p>
+                      </a:txBody>
+                      <a:tcPr>
+                        <a:blipFill>
+                          <a:blip r:embed="rId3"/>
+                          <a:stretch>
+                            <a:fillRect l="-239" t="-104854" r="-83493" b="-210680"/>
+                          </a:stretch>
+                        </a:blipFill>
+                      </a:tcPr>
+                    </a:tc>
+                    <a:tc>
+                      <a:txBody>
+                        <a:bodyPr/>
+                        <a:lstStyle/>
+                        <a:p>
+                          <a:endParaRPr lang="en-US"/>
+                        </a:p>
+                      </a:txBody>
+                      <a:tcPr>
+                        <a:blipFill>
+                          <a:blip r:embed="rId3"/>
+                          <a:stretch>
+                            <a:fillRect l="-121449" t="-104854" r="-1159" b="-210680"/>
+                          </a:stretch>
+                        </a:blipFill>
+                      </a:tcPr>
+                    </a:tc>
+                    <a:extLst>
+                      <a:ext uri="{0D108BD9-81ED-4DB2-BD59-A6C34878D82A}">
+                        <a16:rowId xmlns:a16="http://schemas.microsoft.com/office/drawing/2014/main" val="3489489442"/>
+                      </a:ext>
+                    </a:extLst>
+                  </a:tr>
+                  <a:tr h="640080">
+                    <a:tc>
+                      <a:txBody>
+                        <a:bodyPr/>
+                        <a:lstStyle/>
+                        <a:p>
+                          <a:endParaRPr lang="en-US"/>
+                        </a:p>
+                      </a:txBody>
+                      <a:tcPr>
+                        <a:blipFill>
+                          <a:blip r:embed="rId3"/>
+                          <a:stretch>
+                            <a:fillRect l="-239" t="-200952" r="-83493" b="-106667"/>
+                          </a:stretch>
+                        </a:blipFill>
+                      </a:tcPr>
+                    </a:tc>
+                    <a:tc>
+                      <a:txBody>
+                        <a:bodyPr/>
+                        <a:lstStyle/>
+                        <a:p>
+                          <a:endParaRPr lang="en-US"/>
+                        </a:p>
+                      </a:txBody>
+                      <a:tcPr>
+                        <a:blipFill>
+                          <a:blip r:embed="rId3"/>
+                          <a:stretch>
+                            <a:fillRect l="-121449" t="-200952" r="-1159" b="-106667"/>
+                          </a:stretch>
+                        </a:blipFill>
+                      </a:tcPr>
+                    </a:tc>
+                    <a:extLst>
+                      <a:ext uri="{0D108BD9-81ED-4DB2-BD59-A6C34878D82A}">
+                        <a16:rowId xmlns:a16="http://schemas.microsoft.com/office/drawing/2014/main" val="3820406972"/>
+                      </a:ext>
+                    </a:extLst>
+                  </a:tr>
+                  <a:tr h="640080">
+                    <a:tc>
+                      <a:txBody>
+                        <a:bodyPr/>
+                        <a:lstStyle/>
+                        <a:p>
+                          <a:endParaRPr lang="en-US"/>
+                        </a:p>
+                      </a:txBody>
+                      <a:tcPr>
+                        <a:blipFill>
+                          <a:blip r:embed="rId3"/>
+                          <a:stretch>
+                            <a:fillRect l="-239" t="-300952" r="-83493" b="-6667"/>
+                          </a:stretch>
+                        </a:blipFill>
+                      </a:tcPr>
+                    </a:tc>
+                    <a:tc>
+                      <a:txBody>
+                        <a:bodyPr/>
+                        <a:lstStyle/>
+                        <a:p>
+                          <a:endParaRPr lang="en-US"/>
+                        </a:p>
+                      </a:txBody>
+                      <a:tcPr>
+                        <a:blipFill>
+                          <a:blip r:embed="rId3"/>
+                          <a:stretch>
+                            <a:fillRect l="-121449" t="-300952" r="-1159" b="-6667"/>
+                          </a:stretch>
+                        </a:blipFill>
+                      </a:tcPr>
+                    </a:tc>
+                    <a:extLst>
+                      <a:ext uri="{0D108BD9-81ED-4DB2-BD59-A6C34878D82A}">
+                        <a16:rowId xmlns:a16="http://schemas.microsoft.com/office/drawing/2014/main" val="1979163642"/>
+                      </a:ext>
+                    </a:extLst>
+                  </a:tr>
+                </a:tbl>
+              </a:graphicData>
+            </a:graphic>
+          </p:graphicFrame>
+        </mc:Fallback>
+      </mc:AlternateContent>
+      <mc:AlternateContent xmlns:mc="http://schemas.openxmlformats.org/markup-compatibility/2006" xmlns:a14="http://schemas.microsoft.com/office/drawing/2010/main">
+        <mc:Choice Requires="a14">
+          <p:sp>
+            <p:nvSpPr>
+              <p:cNvPr id="5" name="TextBox 4"/>
+              <p:cNvSpPr txBox="1"/>
+              <p:nvPr/>
+            </p:nvSpPr>
+            <p:spPr>
+              <a:xfrm>
+                <a:off x="4731589" y="1181819"/>
+                <a:ext cx="4336211" cy="1015663"/>
+              </a:xfrm>
+              <a:prstGeom prst="rect">
+                <a:avLst/>
+              </a:prstGeom>
+              <a:noFill/>
+            </p:spPr>
+            <p:txBody>
+              <a:bodyPr wrap="square" rtlCol="0">
+                <a:spAutoFit/>
+              </a:bodyPr>
+              <a:lstStyle/>
+              <a:p>
+                <a:pPr algn="ctr"/>
+                <a:r>
+                  <a:rPr lang="en-US" sz="2000" b="1" dirty="0"/>
+                  <a:t>Probability of detection </a:t>
+                </a:r>
+                <a14:m>
+                  <m:oMath xmlns:m="http://schemas.openxmlformats.org/officeDocument/2006/math">
+                    <m:sSub>
+                      <m:sSubPr>
+                        <m:ctrlPr>
+                          <a:rPr lang="en-US" sz="2000" b="1" i="1">
+                            <a:latin typeface="Cambria Math" panose="02040503050406030204" pitchFamily="18" charset="0"/>
+                          </a:rPr>
+                        </m:ctrlPr>
+                      </m:sSubPr>
+                      <m:e>
+                        <m:r>
+                          <a:rPr lang="en-US" sz="2000" b="1" i="1">
+                            <a:latin typeface="Cambria Math" panose="02040503050406030204" pitchFamily="18" charset="0"/>
+                          </a:rPr>
+                          <m:t>𝑫</m:t>
+                        </m:r>
+                      </m:e>
+                      <m:sub>
+                        <m:r>
+                          <a:rPr lang="en-US" sz="2000" b="1" i="1">
+                            <a:latin typeface="Cambria Math" panose="02040503050406030204" pitchFamily="18" charset="0"/>
+                          </a:rPr>
+                          <m:t>𝒛</m:t>
+                        </m:r>
+                      </m:sub>
+                    </m:sSub>
+                    <m:r>
+                      <a:rPr lang="en-US" sz="2000" b="1" i="1">
+                        <a:latin typeface="Cambria Math" panose="02040503050406030204" pitchFamily="18" charset="0"/>
+                      </a:rPr>
+                      <m:t>=</m:t>
+                    </m:r>
+                    <m:r>
+                      <a:rPr lang="en-US" sz="2000" b="1" i="1">
+                        <a:latin typeface="Cambria Math" panose="02040503050406030204" pitchFamily="18" charset="0"/>
+                      </a:rPr>
+                      <m:t>𝟏</m:t>
+                    </m:r>
+                  </m:oMath>
+                </a14:m>
+                <a:r>
+                  <a:rPr lang="en-GB" sz="2000" b="1" dirty="0"/>
+                  <a:t> in pass </a:t>
+                </a:r>
+                <a14:m>
+                  <m:oMath xmlns:m="http://schemas.openxmlformats.org/officeDocument/2006/math">
+                    <m:r>
+                      <a:rPr lang="en-US" sz="2000" b="1" i="1">
+                        <a:latin typeface="Cambria Math" panose="02040503050406030204" pitchFamily="18" charset="0"/>
+                      </a:rPr>
+                      <m:t>𝒛</m:t>
+                    </m:r>
+                  </m:oMath>
+                </a14:m>
+                <a:endParaRPr lang="en-GB" sz="2000" b="1" dirty="0"/>
+              </a:p>
+              <a:p>
+                <a:pPr algn="ctr"/>
+                <a:endParaRPr lang="en-GB" sz="2000" b="1" dirty="0"/>
+              </a:p>
+            </p:txBody>
+          </p:sp>
+        </mc:Choice>
+        <mc:Fallback xmlns="">
+          <p:sp>
+            <p:nvSpPr>
+              <p:cNvPr id="5" name="TextBox 4"/>
+              <p:cNvSpPr txBox="1">
+                <a:spLocks noRot="1" noChangeAspect="1" noMove="1" noResize="1" noEditPoints="1" noAdjustHandles="1" noChangeArrowheads="1" noChangeShapeType="1" noTextEdit="1"/>
+              </p:cNvSpPr>
+              <p:nvPr/>
+            </p:nvSpPr>
+            <p:spPr>
+              <a:xfrm>
+                <a:off x="4731589" y="1181819"/>
+                <a:ext cx="4336211" cy="1015663"/>
+              </a:xfrm>
+              <a:prstGeom prst="rect">
+                <a:avLst/>
+              </a:prstGeom>
+              <a:blipFill>
+                <a:blip r:embed="rId4"/>
+                <a:stretch>
+                  <a:fillRect l="-983" t="-3614" r="-1966"/>
+                </a:stretch>
+              </a:blipFill>
+            </p:spPr>
+            <p:txBody>
+              <a:bodyPr/>
+              <a:lstStyle/>
+              <a:p>
+                <a:r>
+                  <a:rPr lang="en-GB">
+                    <a:noFill/>
+                  </a:rPr>
+                  <a:t> </a:t>
+                </a:r>
+              </a:p>
+            </p:txBody>
+          </p:sp>
+        </mc:Fallback>
+      </mc:AlternateContent>
+      <p:pic>
+        <p:nvPicPr>
+          <p:cNvPr id="6" name="Picture 5"/>
+          <p:cNvPicPr>
+            <a:picLocks noChangeAspect="1"/>
+          </p:cNvPicPr>
+          <p:nvPr/>
+        </p:nvPicPr>
+        <p:blipFill>
+          <a:blip r:embed="rId5">
+            <a:extLst>
+              <a:ext uri="{28A0092B-C50C-407E-A947-70E740481C1C}">
+                <a14:useLocalDpi xmlns:a14="http://schemas.microsoft.com/office/drawing/2010/main" val="0"/>
+              </a:ext>
+            </a:extLst>
+          </a:blip>
+          <a:stretch>
+            <a:fillRect/>
+          </a:stretch>
+        </p:blipFill>
+        <p:spPr>
+          <a:xfrm>
+            <a:off x="76200" y="1689650"/>
+            <a:ext cx="4322961" cy="4322961"/>
+          </a:xfrm>
+          <a:prstGeom prst="rect">
+            <a:avLst/>
+          </a:prstGeom>
+        </p:spPr>
+      </p:pic>
+    </p:spTree>
+    <p:extLst>
+      <p:ext uri="{BB962C8B-B14F-4D97-AF65-F5344CB8AC3E}">
+        <p14:creationId xmlns:p14="http://schemas.microsoft.com/office/powerpoint/2010/main" val="712519791"/>
+      </p:ext>
+    </p:extLst>
+  </p:cSld>
+  <p:clrMapOvr>
+    <a:masterClrMapping/>
+  </p:clrMapOvr>
+  <p:timing>
+    <p:tnLst>
+      <p:par>
+        <p:cTn id="1" dur="indefinite" restart="never" nodeType="tmRoot"/>
+      </p:par>
+    </p:tnLst>
+  </p:timing>
+</p:sld>
+</file>
+
+<file path=ppt/slides/slide7.xml><?xml version="1.0" encoding="utf-8"?>
+<p:sld xmlns:a="http://schemas.openxmlformats.org/drawingml/2006/main" xmlns:r="http://schemas.openxmlformats.org/officeDocument/2006/relationships" xmlns:p="http://schemas.openxmlformats.org/presentationml/2006/main">
+  <p:cSld>
+    <p:spTree>
+      <p:nvGrpSpPr>
+        <p:cNvPr id="1" name=""/>
+        <p:cNvGrpSpPr/>
+        <p:nvPr/>
+      </p:nvGrpSpPr>
+      <p:grpSpPr>
+        <a:xfrm>
+          <a:off x="0" y="0"/>
+          <a:ext cx="0" cy="0"/>
+          <a:chOff x="0" y="0"/>
+          <a:chExt cx="0" cy="0"/>
+        </a:xfrm>
+      </p:grpSpPr>
+      <p:sp>
+        <p:nvSpPr>
+          <p:cNvPr id="2" name="Title 1"/>
+          <p:cNvSpPr>
+            <a:spLocks noGrp="1"/>
+          </p:cNvSpPr>
+          <p:nvPr>
+            <p:ph type="title"/>
+          </p:nvPr>
+        </p:nvSpPr>
+        <p:spPr/>
+        <p:txBody>
+          <a:bodyPr/>
+          <a:lstStyle/>
+          <a:p>
+            <a:r>
+              <a:rPr lang="en-US" dirty="0"/>
+              <a:t>Stream networks</a:t>
+            </a:r>
+            <a:endParaRPr lang="en-GB" dirty="0"/>
+          </a:p>
+        </p:txBody>
+      </p:sp>
+      <p:sp>
+        <p:nvSpPr>
+          <p:cNvPr id="3" name="Content Placeholder 2"/>
+          <p:cNvSpPr>
+            <a:spLocks noGrp="1"/>
+          </p:cNvSpPr>
+          <p:nvPr>
+            <p:ph idx="1"/>
+          </p:nvPr>
+        </p:nvSpPr>
+        <p:spPr>
+          <a:xfrm>
             <a:off x="76200" y="838199"/>
             <a:ext cx="8991600" cy="1241439"/>
           </a:xfrm>
@@ -6828,11 +8262,7 @@
           <a:p>
             <a:r>
               <a:rPr lang="en-US" dirty="0" smtClean="0"/>
-              <a:t>Define </a:t>
-            </a:r>
-            <a:r>
-              <a:rPr lang="en-US" dirty="0" smtClean="0"/>
-              <a:t>an directed acyclic graph (DAG) for network</a:t>
+              <a:t>Define an directed acyclic graph (DAG) for network</a:t>
             </a:r>
             <a:endParaRPr lang="en-GB" dirty="0"/>
           </a:p>
@@ -6873,8 +8303,8 @@
           </a:ln>
         </p:spPr>
       </p:pic>
-      <mc:AlternateContent xmlns:mc="http://schemas.openxmlformats.org/markup-compatibility/2006">
-        <mc:Choice xmlns:a14="http://schemas.microsoft.com/office/drawing/2010/main" Requires="a14">
+      <mc:AlternateContent xmlns:mc="http://schemas.openxmlformats.org/markup-compatibility/2006" xmlns:a14="http://schemas.microsoft.com/office/drawing/2010/main">
+        <mc:Choice Requires="a14">
           <p:graphicFrame>
             <p:nvGraphicFramePr>
               <p:cNvPr id="6" name="Table 5"/>
@@ -7926,7 +9356,7 @@
             </a:graphic>
           </p:graphicFrame>
         </mc:Choice>
-        <mc:Fallback>
+        <mc:Fallback xmlns="">
           <p:graphicFrame>
             <p:nvGraphicFramePr>
               <p:cNvPr id="6" name="Table 5"/>
@@ -8886,7 +10316,7 @@
 </p:sld>
 </file>
 
-<file path=ppt/slides/slide7.xml><?xml version="1.0" encoding="utf-8"?>
+<file path=ppt/slides/slide8.xml><?xml version="1.0" encoding="utf-8"?>
 <p:sld xmlns:a="http://schemas.openxmlformats.org/drawingml/2006/main" xmlns:r="http://schemas.openxmlformats.org/officeDocument/2006/relationships" xmlns:p="http://schemas.openxmlformats.org/presentationml/2006/main">
   <p:cSld>
     <p:spTree>
@@ -8926,8 +10356,8 @@
           </a:p>
         </p:txBody>
       </p:sp>
-      <mc:AlternateContent xmlns:mc="http://schemas.openxmlformats.org/markup-compatibility/2006">
-        <mc:Choice xmlns:a14="http://schemas.microsoft.com/office/drawing/2010/main" Requires="a14">
+      <mc:AlternateContent xmlns:mc="http://schemas.openxmlformats.org/markup-compatibility/2006" xmlns:a14="http://schemas.microsoft.com/office/drawing/2010/main">
+        <mc:Choice Requires="a14">
           <p:sp>
             <p:nvSpPr>
               <p:cNvPr id="3" name="Content Placeholder 2"/>
@@ -9656,7 +11086,7 @@
             </p:txBody>
           </p:sp>
         </mc:Choice>
-        <mc:Fallback>
+        <mc:Fallback xmlns="">
           <p:sp>
             <p:nvSpPr>
               <p:cNvPr id="3" name="Content Placeholder 2"/>
@@ -9694,8 +11124,8 @@
           </p:sp>
         </mc:Fallback>
       </mc:AlternateContent>
-      <mc:AlternateContent xmlns:mc="http://schemas.openxmlformats.org/markup-compatibility/2006">
-        <mc:Choice xmlns:a14="http://schemas.microsoft.com/office/drawing/2010/main" Requires="a14">
+      <mc:AlternateContent xmlns:mc="http://schemas.openxmlformats.org/markup-compatibility/2006" xmlns:a14="http://schemas.microsoft.com/office/drawing/2010/main">
+        <mc:Choice Requires="a14">
           <p:graphicFrame>
             <p:nvGraphicFramePr>
               <p:cNvPr id="6" name="Table 5"/>
@@ -10747,7 +12177,7 @@
             </a:graphic>
           </p:graphicFrame>
         </mc:Choice>
-        <mc:Fallback>
+        <mc:Fallback xmlns="">
           <p:graphicFrame>
             <p:nvGraphicFramePr>
               <p:cNvPr id="6" name="Table 5"/>
@@ -11839,7 +13269,7 @@
 </p:sld>
 </file>
 
-<file path=ppt/slides/slide8.xml><?xml version="1.0" encoding="utf-8"?>
+<file path=ppt/slides/slide9.xml><?xml version="1.0" encoding="utf-8"?>
 <p:sld xmlns:a="http://schemas.openxmlformats.org/drawingml/2006/main" xmlns:r="http://schemas.openxmlformats.org/officeDocument/2006/relationships" xmlns:p="http://schemas.openxmlformats.org/presentationml/2006/main">
   <p:cSld>
     <p:spTree>
@@ -11879,8 +13309,8 @@
           </a:p>
         </p:txBody>
       </p:sp>
-      <mc:AlternateContent xmlns:mc="http://schemas.openxmlformats.org/markup-compatibility/2006">
-        <mc:Choice xmlns:a14="http://schemas.microsoft.com/office/drawing/2010/main" Requires="a14">
+      <mc:AlternateContent xmlns:mc="http://schemas.openxmlformats.org/markup-compatibility/2006" xmlns:a14="http://schemas.microsoft.com/office/drawing/2010/main">
+        <mc:Choice Requires="a14">
           <p:sp>
             <p:nvSpPr>
               <p:cNvPr id="3" name="Content Placeholder 2"/>
@@ -11908,11 +13338,7 @@
                 </a:pPr>
                 <a:r>
                   <a:rPr lang="en-US" dirty="0" smtClean="0"/>
-                  <a:t>Approach</a:t>
-                </a:r>
-                <a:r>
-                  <a:rPr lang="en-US" dirty="0" smtClean="0"/>
-                  <a:t>:</a:t>
+                  <a:t>Approach:</a:t>
                 </a:r>
               </a:p>
               <a:p>
@@ -12436,15 +13862,7 @@
                 <a:pPr lvl="1"/>
                 <a:r>
                   <a:rPr lang="en-US" dirty="0" smtClean="0"/>
-                  <a:t>Because </a:t>
-                </a:r>
-                <a:r>
-                  <a:rPr lang="en-US" dirty="0" smtClean="0"/>
-                  <a:t>it is first-order Markov when moving along the </a:t>
-                </a:r>
-                <a:r>
-                  <a:rPr lang="en-US" dirty="0" smtClean="0"/>
-                  <a:t>network…</a:t>
+                  <a:t>Because it is first-order Markov when moving along the network…</a:t>
                 </a:r>
               </a:p>
               <a:p>
@@ -12458,7 +13876,7 @@
             </p:txBody>
           </p:sp>
         </mc:Choice>
-        <mc:Fallback>
+        <mc:Fallback xmlns="">
           <p:sp>
             <p:nvSpPr>
               <p:cNvPr id="3" name="Content Placeholder 2"/>
@@ -12692,302 +14110,6 @@
     <p:extLst>
       <p:ext uri="{BB962C8B-B14F-4D97-AF65-F5344CB8AC3E}">
         <p14:creationId xmlns:p14="http://schemas.microsoft.com/office/powerpoint/2010/main" val="2510696956"/>
-      </p:ext>
-    </p:extLst>
-  </p:cSld>
-  <p:clrMapOvr>
-    <a:masterClrMapping/>
-  </p:clrMapOvr>
-  <p:timing>
-    <p:tnLst>
-      <p:par>
-        <p:cTn id="1" dur="indefinite" restart="never" nodeType="tmRoot"/>
-      </p:par>
-    </p:tnLst>
-  </p:timing>
-</p:sld>
-</file>
-
-<file path=ppt/slides/slide9.xml><?xml version="1.0" encoding="utf-8"?>
-<p:sld xmlns:a="http://schemas.openxmlformats.org/drawingml/2006/main" xmlns:r="http://schemas.openxmlformats.org/officeDocument/2006/relationships" xmlns:p="http://schemas.openxmlformats.org/presentationml/2006/main">
-  <p:cSld>
-    <p:spTree>
-      <p:nvGrpSpPr>
-        <p:cNvPr id="1" name=""/>
-        <p:cNvGrpSpPr/>
-        <p:nvPr/>
-      </p:nvGrpSpPr>
-      <p:grpSpPr>
-        <a:xfrm>
-          <a:off x="0" y="0"/>
-          <a:ext cx="0" cy="0"/>
-          <a:chOff x="0" y="0"/>
-          <a:chExt cx="0" cy="0"/>
-        </a:xfrm>
-      </p:grpSpPr>
-      <p:sp>
-        <p:nvSpPr>
-          <p:cNvPr id="2" name="Title 1"/>
-          <p:cNvSpPr>
-            <a:spLocks noGrp="1"/>
-          </p:cNvSpPr>
-          <p:nvPr>
-            <p:ph type="title"/>
-          </p:nvPr>
-        </p:nvSpPr>
-        <p:spPr/>
-        <p:txBody>
-          <a:bodyPr/>
-          <a:lstStyle/>
-          <a:p>
-            <a:r>
-              <a:rPr lang="en-US" dirty="0"/>
-              <a:t>Stream networks</a:t>
-            </a:r>
-            <a:endParaRPr lang="en-GB" dirty="0"/>
-          </a:p>
-        </p:txBody>
-      </p:sp>
-      <p:sp>
-        <p:nvSpPr>
-          <p:cNvPr id="3" name="Content Placeholder 2"/>
-          <p:cNvSpPr>
-            <a:spLocks noGrp="1"/>
-          </p:cNvSpPr>
-          <p:nvPr>
-            <p:ph idx="1"/>
-          </p:nvPr>
-        </p:nvSpPr>
-        <p:spPr>
-          <a:xfrm>
-            <a:off x="76200" y="1752600"/>
-            <a:ext cx="8991599" cy="5029200"/>
-          </a:xfrm>
-        </p:spPr>
-        <p:txBody>
-          <a:bodyPr>
-            <a:normAutofit/>
-          </a:bodyPr>
-          <a:lstStyle/>
-          <a:p>
-            <a:pPr marL="0" indent="0">
-              <a:buNone/>
-            </a:pPr>
-            <a:endParaRPr lang="en-US" dirty="0" smtClean="0"/>
-          </a:p>
-          <a:p>
-            <a:pPr marL="0" indent="0">
-              <a:buNone/>
-            </a:pPr>
-            <a:endParaRPr lang="en-US" dirty="0"/>
-          </a:p>
-          <a:p>
-            <a:pPr marL="0" indent="0">
-              <a:buNone/>
-            </a:pPr>
-            <a:r>
-              <a:rPr lang="en-US" dirty="0" smtClean="0"/>
-              <a:t>[see code to check Q calculation using TMB inner hessian]</a:t>
-            </a:r>
-          </a:p>
-        </p:txBody>
-      </p:sp>
-      <p:sp>
-        <p:nvSpPr>
-          <p:cNvPr id="6" name="Content Placeholder 2"/>
-          <p:cNvSpPr txBox="1">
-            <a:spLocks/>
-          </p:cNvSpPr>
-          <p:nvPr/>
-        </p:nvSpPr>
-        <p:spPr>
-          <a:xfrm>
-            <a:off x="76200" y="838199"/>
-            <a:ext cx="8991600" cy="1241439"/>
-          </a:xfrm>
-          <a:prstGeom prst="rect">
-            <a:avLst/>
-          </a:prstGeom>
-        </p:spPr>
-        <p:txBody>
-          <a:bodyPr vert="horz" lIns="91440" tIns="45720" rIns="91440" bIns="45720" rtlCol="0">
-            <a:normAutofit/>
-          </a:bodyPr>
-          <a:lstStyle>
-            <a:lvl1pPr marL="342900" indent="-342900" algn="l" defTabSz="914400" rtl="0" eaLnBrk="1" latinLnBrk="0" hangingPunct="1">
-              <a:spcBef>
-                <a:spcPts val="600"/>
-              </a:spcBef>
-              <a:spcAft>
-                <a:spcPts val="600"/>
-              </a:spcAft>
-              <a:buFont typeface="Arial" pitchFamily="34" charset="0"/>
-              <a:buChar char="•"/>
-              <a:defRPr sz="2800" kern="1200">
-                <a:solidFill>
-                  <a:schemeClr val="tx1"/>
-                </a:solidFill>
-                <a:latin typeface="+mn-lt"/>
-                <a:ea typeface="+mn-ea"/>
-                <a:cs typeface="+mn-cs"/>
-              </a:defRPr>
-            </a:lvl1pPr>
-            <a:lvl2pPr marL="742950" indent="-285750" algn="l" defTabSz="914400" rtl="0" eaLnBrk="1" latinLnBrk="0" hangingPunct="1">
-              <a:spcBef>
-                <a:spcPts val="600"/>
-              </a:spcBef>
-              <a:spcAft>
-                <a:spcPts val="600"/>
-              </a:spcAft>
-              <a:buFont typeface="Arial" pitchFamily="34" charset="0"/>
-              <a:buChar char="–"/>
-              <a:defRPr sz="2400" kern="1200">
-                <a:solidFill>
-                  <a:schemeClr val="tx1"/>
-                </a:solidFill>
-                <a:latin typeface="+mn-lt"/>
-                <a:ea typeface="+mn-ea"/>
-                <a:cs typeface="+mn-cs"/>
-              </a:defRPr>
-            </a:lvl2pPr>
-            <a:lvl3pPr marL="1143000" indent="-228600" algn="l" defTabSz="914400" rtl="0" eaLnBrk="1" latinLnBrk="0" hangingPunct="1">
-              <a:spcBef>
-                <a:spcPts val="600"/>
-              </a:spcBef>
-              <a:spcAft>
-                <a:spcPts val="600"/>
-              </a:spcAft>
-              <a:buFont typeface="Arial" pitchFamily="34" charset="0"/>
-              <a:buChar char="•"/>
-              <a:defRPr sz="2000" kern="1200">
-                <a:solidFill>
-                  <a:schemeClr val="tx1"/>
-                </a:solidFill>
-                <a:latin typeface="+mn-lt"/>
-                <a:ea typeface="+mn-ea"/>
-                <a:cs typeface="+mn-cs"/>
-              </a:defRPr>
-            </a:lvl3pPr>
-            <a:lvl4pPr marL="1600200" indent="-228600" algn="l" defTabSz="914400" rtl="0" eaLnBrk="1" latinLnBrk="0" hangingPunct="1">
-              <a:spcBef>
-                <a:spcPts val="600"/>
-              </a:spcBef>
-              <a:spcAft>
-                <a:spcPts val="600"/>
-              </a:spcAft>
-              <a:buFont typeface="Arial" pitchFamily="34" charset="0"/>
-              <a:buChar char="–"/>
-              <a:defRPr sz="1800" kern="1200">
-                <a:solidFill>
-                  <a:schemeClr val="tx1"/>
-                </a:solidFill>
-                <a:latin typeface="+mn-lt"/>
-                <a:ea typeface="+mn-ea"/>
-                <a:cs typeface="+mn-cs"/>
-              </a:defRPr>
-            </a:lvl4pPr>
-            <a:lvl5pPr marL="2057400" indent="-228600" algn="l" defTabSz="914400" rtl="0" eaLnBrk="1" latinLnBrk="0" hangingPunct="1">
-              <a:spcBef>
-                <a:spcPts val="600"/>
-              </a:spcBef>
-              <a:spcAft>
-                <a:spcPts val="600"/>
-              </a:spcAft>
-              <a:buFont typeface="Arial" pitchFamily="34" charset="0"/>
-              <a:buChar char="»"/>
-              <a:defRPr sz="1800" kern="1200">
-                <a:solidFill>
-                  <a:schemeClr val="tx1"/>
-                </a:solidFill>
-                <a:latin typeface="+mn-lt"/>
-                <a:ea typeface="+mn-ea"/>
-                <a:cs typeface="+mn-cs"/>
-              </a:defRPr>
-            </a:lvl5pPr>
-            <a:lvl6pPr marL="2514600" indent="-228600" algn="l" defTabSz="914400" rtl="0" eaLnBrk="1" latinLnBrk="0" hangingPunct="1">
-              <a:spcBef>
-                <a:spcPct val="20000"/>
-              </a:spcBef>
-              <a:buFont typeface="Arial" pitchFamily="34" charset="0"/>
-              <a:buChar char="•"/>
-              <a:defRPr sz="2000" kern="1200">
-                <a:solidFill>
-                  <a:schemeClr val="tx1"/>
-                </a:solidFill>
-                <a:latin typeface="+mn-lt"/>
-                <a:ea typeface="+mn-ea"/>
-                <a:cs typeface="+mn-cs"/>
-              </a:defRPr>
-            </a:lvl6pPr>
-            <a:lvl7pPr marL="2971800" indent="-228600" algn="l" defTabSz="914400" rtl="0" eaLnBrk="1" latinLnBrk="0" hangingPunct="1">
-              <a:spcBef>
-                <a:spcPct val="20000"/>
-              </a:spcBef>
-              <a:buFont typeface="Arial" pitchFamily="34" charset="0"/>
-              <a:buChar char="•"/>
-              <a:defRPr sz="2000" kern="1200">
-                <a:solidFill>
-                  <a:schemeClr val="tx1"/>
-                </a:solidFill>
-                <a:latin typeface="+mn-lt"/>
-                <a:ea typeface="+mn-ea"/>
-                <a:cs typeface="+mn-cs"/>
-              </a:defRPr>
-            </a:lvl7pPr>
-            <a:lvl8pPr marL="3429000" indent="-228600" algn="l" defTabSz="914400" rtl="0" eaLnBrk="1" latinLnBrk="0" hangingPunct="1">
-              <a:spcBef>
-                <a:spcPct val="20000"/>
-              </a:spcBef>
-              <a:buFont typeface="Arial" pitchFamily="34" charset="0"/>
-              <a:buChar char="•"/>
-              <a:defRPr sz="2000" kern="1200">
-                <a:solidFill>
-                  <a:schemeClr val="tx1"/>
-                </a:solidFill>
-                <a:latin typeface="+mn-lt"/>
-                <a:ea typeface="+mn-ea"/>
-                <a:cs typeface="+mn-cs"/>
-              </a:defRPr>
-            </a:lvl8pPr>
-            <a:lvl9pPr marL="3886200" indent="-228600" algn="l" defTabSz="914400" rtl="0" eaLnBrk="1" latinLnBrk="0" hangingPunct="1">
-              <a:spcBef>
-                <a:spcPct val="20000"/>
-              </a:spcBef>
-              <a:buFont typeface="Arial" pitchFamily="34" charset="0"/>
-              <a:buChar char="•"/>
-              <a:defRPr sz="2000" kern="1200">
-                <a:solidFill>
-                  <a:schemeClr val="tx1"/>
-                </a:solidFill>
-                <a:latin typeface="+mn-lt"/>
-                <a:ea typeface="+mn-ea"/>
-                <a:cs typeface="+mn-cs"/>
-              </a:defRPr>
-            </a:lvl9pPr>
-          </a:lstStyle>
-          <a:p>
-            <a:pPr marL="0" indent="0">
-              <a:buFont typeface="Arial" pitchFamily="34" charset="0"/>
-              <a:buNone/>
-            </a:pPr>
-            <a:r>
-              <a:rPr lang="en-US" smtClean="0"/>
-              <a:t>How to define spatial model on streams?</a:t>
-            </a:r>
-          </a:p>
-          <a:p>
-            <a:r>
-              <a:rPr lang="en-US" smtClean="0"/>
-              <a:t>Define an directed acyclic graph (DAG) for network</a:t>
-            </a:r>
-            <a:endParaRPr lang="en-GB" dirty="0"/>
-          </a:p>
-        </p:txBody>
-      </p:sp>
-    </p:spTree>
-    <p:extLst>
-      <p:ext uri="{BB962C8B-B14F-4D97-AF65-F5344CB8AC3E}">
-        <p14:creationId xmlns:p14="http://schemas.microsoft.com/office/powerpoint/2010/main" val="922300635"/>
       </p:ext>
     </p:extLst>
   </p:cSld>

</xml_diff>

<commit_message>
changes after class for Week 9 lecture
</commit_message>
<xml_diff>
--- a/Week 9 -- Movement and network models/Lecture 9/Lecture 9 -- stream network.pptx
+++ b/Week 9 -- Movement and network models/Lecture 9/Lecture 9 -- stream network.pptx
@@ -7105,13 +7105,8 @@
             </a:pPr>
             <a:r>
               <a:rPr lang="en-US" dirty="0" smtClean="0"/>
-              <a:t>Triple-pass </a:t>
+              <a:t>Triple-pass depletion</a:t>
             </a:r>
-            <a:r>
-              <a:rPr lang="en-US" dirty="0" smtClean="0"/>
-              <a:t>depletion</a:t>
-            </a:r>
-            <a:endParaRPr lang="en-US" dirty="0" smtClean="0"/>
           </a:p>
         </p:txBody>
       </p:sp>

</xml_diff>